<commit_message>
fix: updated api with fake data
</commit_message>
<xml_diff>
--- a/Slide/Projeto everis -  Criando uma API REST com .Net Core.pptx
+++ b/Slide/Projeto everis -  Criando uma API REST com .Net Core.pptx
@@ -5,61 +5,62 @@
     <p:sldMasterId id="2147483648" r:id="rId1"/>
   </p:sldMasterIdLst>
   <p:notesMasterIdLst>
-    <p:notesMasterId r:id="rId23"/>
+    <p:notesMasterId r:id="rId24"/>
   </p:notesMasterIdLst>
   <p:sldIdLst>
     <p:sldId id="258" r:id="rId2"/>
     <p:sldId id="260" r:id="rId3"/>
     <p:sldId id="261" r:id="rId4"/>
     <p:sldId id="262" r:id="rId5"/>
-    <p:sldId id="270" r:id="rId6"/>
-    <p:sldId id="273" r:id="rId7"/>
+    <p:sldId id="273" r:id="rId6"/>
+    <p:sldId id="270" r:id="rId7"/>
     <p:sldId id="271" r:id="rId8"/>
     <p:sldId id="274" r:id="rId9"/>
     <p:sldId id="272" r:id="rId10"/>
-    <p:sldId id="264" r:id="rId11"/>
-    <p:sldId id="263" r:id="rId12"/>
-    <p:sldId id="265" r:id="rId13"/>
-    <p:sldId id="266" r:id="rId14"/>
-    <p:sldId id="275" r:id="rId15"/>
-    <p:sldId id="276" r:id="rId16"/>
-    <p:sldId id="277" r:id="rId17"/>
-    <p:sldId id="278" r:id="rId18"/>
-    <p:sldId id="279" r:id="rId19"/>
-    <p:sldId id="280" r:id="rId20"/>
-    <p:sldId id="281" r:id="rId21"/>
-    <p:sldId id="269" r:id="rId22"/>
+    <p:sldId id="282" r:id="rId11"/>
+    <p:sldId id="264" r:id="rId12"/>
+    <p:sldId id="263" r:id="rId13"/>
+    <p:sldId id="265" r:id="rId14"/>
+    <p:sldId id="266" r:id="rId15"/>
+    <p:sldId id="275" r:id="rId16"/>
+    <p:sldId id="276" r:id="rId17"/>
+    <p:sldId id="277" r:id="rId18"/>
+    <p:sldId id="278" r:id="rId19"/>
+    <p:sldId id="279" r:id="rId20"/>
+    <p:sldId id="280" r:id="rId21"/>
+    <p:sldId id="281" r:id="rId22"/>
+    <p:sldId id="269" r:id="rId23"/>
   </p:sldIdLst>
   <p:sldSz cx="9144000" cy="5143500" type="screen16x9"/>
   <p:notesSz cx="6858000" cy="9144000"/>
   <p:embeddedFontLst>
     <p:embeddedFont>
       <p:font typeface="Calibri" panose="020F0502020204030204" pitchFamily="34" charset="0"/>
-      <p:regular r:id="rId24"/>
-      <p:bold r:id="rId25"/>
-      <p:italic r:id="rId26"/>
-      <p:boldItalic r:id="rId27"/>
+      <p:regular r:id="rId25"/>
+      <p:bold r:id="rId26"/>
+      <p:italic r:id="rId27"/>
+      <p:boldItalic r:id="rId28"/>
     </p:embeddedFont>
     <p:embeddedFont>
       <p:font typeface="Century Gothic" panose="020B0502020202020204" pitchFamily="34" charset="0"/>
-      <p:regular r:id="rId28"/>
-      <p:bold r:id="rId29"/>
-      <p:italic r:id="rId30"/>
-      <p:boldItalic r:id="rId31"/>
+      <p:regular r:id="rId29"/>
+      <p:bold r:id="rId30"/>
+      <p:italic r:id="rId31"/>
+      <p:boldItalic r:id="rId32"/>
     </p:embeddedFont>
     <p:embeddedFont>
       <p:font typeface="Proxima Nova" panose="020B0604020202020204" charset="0"/>
-      <p:regular r:id="rId32"/>
-      <p:bold r:id="rId33"/>
-      <p:italic r:id="rId34"/>
-      <p:boldItalic r:id="rId35"/>
+      <p:regular r:id="rId33"/>
+      <p:bold r:id="rId34"/>
+      <p:italic r:id="rId35"/>
+      <p:boldItalic r:id="rId36"/>
     </p:embeddedFont>
     <p:embeddedFont>
       <p:font typeface="Roboto" panose="02000000000000000000" pitchFamily="2" charset="0"/>
-      <p:regular r:id="rId36"/>
-      <p:bold r:id="rId37"/>
-      <p:italic r:id="rId38"/>
-      <p:boldItalic r:id="rId39"/>
+      <p:regular r:id="rId37"/>
+      <p:bold r:id="rId38"/>
+      <p:italic r:id="rId39"/>
+      <p:boldItalic r:id="rId40"/>
     </p:embeddedFont>
   </p:embeddedFontLst>
   <p:defaultTextStyle>
@@ -307,7 +308,7 @@
       </p15:sldGuideLst>
     </p:ext>
     <p:ext uri="http://customooxmlschemas.google.com/">
-      <go:slidesCustomData xmlns="" xmlns:mc="http://schemas.openxmlformats.org/markup-compatibility/2006" xmlns:mv="urn:schemas-microsoft-com:mac:vml" xmlns:c="http://schemas.openxmlformats.org/drawingml/2006/chart" xmlns:dgm="http://schemas.openxmlformats.org/drawingml/2006/diagram" xmlns:o="urn:schemas-microsoft-com:office:office" xmlns:v="urn:schemas-microsoft-com:vml" xmlns:pvml="urn:schemas-microsoft-com:office:powerpoint" xmlns:com="http://schemas.openxmlformats.org/drawingml/2006/compatibility" xmlns:p14="http://schemas.microsoft.com/office/powerpoint/2010/main" xmlns:p15="http://schemas.microsoft.com/office/powerpoint/2012/main" xmlns:ahyp="http://schemas.microsoft.com/office/drawing/2018/hyperlinkcolor" xmlns:go="http://customooxmlschemas.google.com/" r:id="rId40" roundtripDataSignature="AMtx7mhLG0qHwc5KaOFWU3d3cgClDfJ2aA=="/>
+      <go:slidesCustomData xmlns:go="http://customooxmlschemas.google.com/" xmlns:ahyp="http://schemas.microsoft.com/office/drawing/2018/hyperlinkcolor" xmlns:p15="http://schemas.microsoft.com/office/powerpoint/2012/main" xmlns:p14="http://schemas.microsoft.com/office/powerpoint/2010/main" xmlns:com="http://schemas.openxmlformats.org/drawingml/2006/compatibility" xmlns:pvml="urn:schemas-microsoft-com:office:powerpoint" xmlns:v="urn:schemas-microsoft-com:vml" xmlns:o="urn:schemas-microsoft-com:office:office" xmlns:dgm="http://schemas.openxmlformats.org/drawingml/2006/diagram" xmlns:c="http://schemas.openxmlformats.org/drawingml/2006/chart" xmlns:mv="urn:schemas-microsoft-com:mac:vml" xmlns:mc="http://schemas.openxmlformats.org/markup-compatibility/2006" xmlns="" r:id="rId41" roundtripDataSignature="AMtx7mhLG0qHwc5KaOFWU3d3cgClDfJ2aA=="/>
     </p:ext>
   </p:extLst>
 </p:presentation>
@@ -1023,6 +1024,132 @@
   <p:cSld>
     <p:spTree>
       <p:nvGrpSpPr>
+        <p:cNvPr id="1" name="Shape 111"/>
+        <p:cNvGrpSpPr/>
+        <p:nvPr/>
+      </p:nvGrpSpPr>
+      <p:grpSpPr>
+        <a:xfrm>
+          <a:off x="0" y="0"/>
+          <a:ext cx="0" cy="0"/>
+          <a:chOff x="0" y="0"/>
+          <a:chExt cx="0" cy="0"/>
+        </a:xfrm>
+      </p:grpSpPr>
+      <p:sp>
+        <p:nvSpPr>
+          <p:cNvPr id="112" name="Google Shape;112;p4:notes"/>
+          <p:cNvSpPr>
+            <a:spLocks noGrp="1" noRot="1" noChangeAspect="1"/>
+          </p:cNvSpPr>
+          <p:nvPr>
+            <p:ph type="sldImg" idx="2"/>
+          </p:nvPr>
+        </p:nvSpPr>
+        <p:spPr>
+          <a:xfrm>
+            <a:off x="381000" y="685800"/>
+            <a:ext cx="6096000" cy="3429000"/>
+          </a:xfrm>
+          <a:custGeom>
+            <a:avLst/>
+            <a:gdLst/>
+            <a:ahLst/>
+            <a:cxnLst/>
+            <a:rect l="l" t="t" r="r" b="b"/>
+            <a:pathLst>
+              <a:path w="120000" h="120000" extrusionOk="0">
+                <a:moveTo>
+                  <a:pt x="0" y="0"/>
+                </a:moveTo>
+                <a:lnTo>
+                  <a:pt x="120000" y="0"/>
+                </a:lnTo>
+                <a:lnTo>
+                  <a:pt x="120000" y="120000"/>
+                </a:lnTo>
+                <a:lnTo>
+                  <a:pt x="0" y="120000"/>
+                </a:lnTo>
+                <a:close/>
+              </a:path>
+            </a:pathLst>
+          </a:custGeom>
+          <a:noFill/>
+          <a:ln w="9525" cap="flat" cmpd="sng">
+            <a:solidFill>
+              <a:srgbClr val="000000"/>
+            </a:solidFill>
+            <a:prstDash val="solid"/>
+            <a:round/>
+            <a:headEnd type="none" w="sm" len="sm"/>
+            <a:tailEnd type="none" w="sm" len="sm"/>
+          </a:ln>
+        </p:spPr>
+      </p:sp>
+      <p:sp>
+        <p:nvSpPr>
+          <p:cNvPr id="113" name="Google Shape;113;p4:notes"/>
+          <p:cNvSpPr txBox="1">
+            <a:spLocks noGrp="1"/>
+          </p:cNvSpPr>
+          <p:nvPr>
+            <p:ph type="body" idx="1"/>
+          </p:nvPr>
+        </p:nvSpPr>
+        <p:spPr>
+          <a:xfrm>
+            <a:off x="685800" y="4343400"/>
+            <a:ext cx="5486400" cy="4114800"/>
+          </a:xfrm>
+          <a:prstGeom prst="rect">
+            <a:avLst/>
+          </a:prstGeom>
+          <a:noFill/>
+          <a:ln>
+            <a:noFill/>
+          </a:ln>
+        </p:spPr>
+        <p:txBody>
+          <a:bodyPr spcFirstLastPara="1" wrap="square" lIns="91425" tIns="91425" rIns="91425" bIns="91425" anchor="t" anchorCtr="0">
+            <a:noAutofit/>
+          </a:bodyPr>
+          <a:lstStyle/>
+          <a:p>
+            <a:pPr marL="0" lvl="0" indent="0" algn="l" rtl="0">
+              <a:lnSpc>
+                <a:spcPct val="100000"/>
+              </a:lnSpc>
+              <a:spcBef>
+                <a:spcPts val="0"/>
+              </a:spcBef>
+              <a:spcAft>
+                <a:spcPts val="0"/>
+              </a:spcAft>
+              <a:buClr>
+                <a:schemeClr val="dk1"/>
+              </a:buClr>
+              <a:buSzPts val="1100"/>
+              <a:buFont typeface="Arial"/>
+              <a:buNone/>
+            </a:pPr>
+            <a:endParaRPr/>
+          </a:p>
+        </p:txBody>
+      </p:sp>
+    </p:spTree>
+  </p:cSld>
+  <p:clrMapOvr>
+    <a:masterClrMapping/>
+  </p:clrMapOvr>
+</p:notes>
+</file>
+
+<file path=ppt/notesSlides/notesSlide11.xml><?xml version="1.0" encoding="utf-8"?>
+<p:notes xmlns:a="http://schemas.openxmlformats.org/drawingml/2006/main" xmlns:r="http://schemas.openxmlformats.org/officeDocument/2006/relationships" xmlns:p="http://schemas.openxmlformats.org/presentationml/2006/main" showMasterSp="0" showMasterPhAnim="0">
+  <p:cSld>
+    <p:spTree>
+      <p:nvGrpSpPr>
         <p:cNvPr id="1" name="Shape 96"/>
         <p:cNvGrpSpPr/>
         <p:nvPr/>
@@ -1144,7 +1271,7 @@
 </p:notes>
 </file>
 
-<file path=ppt/notesSlides/notesSlide11.xml><?xml version="1.0" encoding="utf-8"?>
+<file path=ppt/notesSlides/notesSlide12.xml><?xml version="1.0" encoding="utf-8"?>
 <p:notes xmlns:a="http://schemas.openxmlformats.org/drawingml/2006/main" xmlns:r="http://schemas.openxmlformats.org/officeDocument/2006/relationships" xmlns:p="http://schemas.openxmlformats.org/presentationml/2006/main" showMasterSp="0" showMasterPhAnim="0">
   <p:cSld>
     <p:spTree>
@@ -1270,7 +1397,7 @@
 </p:notes>
 </file>
 
-<file path=ppt/notesSlides/notesSlide12.xml><?xml version="1.0" encoding="utf-8"?>
+<file path=ppt/notesSlides/notesSlide13.xml><?xml version="1.0" encoding="utf-8"?>
 <p:notes xmlns:a="http://schemas.openxmlformats.org/drawingml/2006/main" xmlns:r="http://schemas.openxmlformats.org/officeDocument/2006/relationships" xmlns:p="http://schemas.openxmlformats.org/presentationml/2006/main" showMasterSp="0" showMasterPhAnim="0">
   <p:cSld>
     <p:spTree>
@@ -1396,7 +1523,7 @@
 </p:notes>
 </file>
 
-<file path=ppt/notesSlides/notesSlide13.xml><?xml version="1.0" encoding="utf-8"?>
+<file path=ppt/notesSlides/notesSlide14.xml><?xml version="1.0" encoding="utf-8"?>
 <p:notes xmlns:a="http://schemas.openxmlformats.org/drawingml/2006/main" xmlns:r="http://schemas.openxmlformats.org/officeDocument/2006/relationships" xmlns:p="http://schemas.openxmlformats.org/presentationml/2006/main" showMasterSp="0" showMasterPhAnim="0">
   <p:cSld>
     <p:spTree>
@@ -1527,7 +1654,7 @@
 </p:notes>
 </file>
 
-<file path=ppt/notesSlides/notesSlide14.xml><?xml version="1.0" encoding="utf-8"?>
+<file path=ppt/notesSlides/notesSlide15.xml><?xml version="1.0" encoding="utf-8"?>
 <p:notes xmlns:a="http://schemas.openxmlformats.org/drawingml/2006/main" xmlns:r="http://schemas.openxmlformats.org/officeDocument/2006/relationships" xmlns:p="http://schemas.openxmlformats.org/presentationml/2006/main" showMasterSp="0" showMasterPhAnim="0">
   <p:cSld>
     <p:spTree>
@@ -1658,7 +1785,7 @@
 </p:notes>
 </file>
 
-<file path=ppt/notesSlides/notesSlide15.xml><?xml version="1.0" encoding="utf-8"?>
+<file path=ppt/notesSlides/notesSlide16.xml><?xml version="1.0" encoding="utf-8"?>
 <p:notes xmlns:a="http://schemas.openxmlformats.org/drawingml/2006/main" xmlns:r="http://schemas.openxmlformats.org/officeDocument/2006/relationships" xmlns:p="http://schemas.openxmlformats.org/presentationml/2006/main" showMasterSp="0" showMasterPhAnim="0">
   <p:cSld>
     <p:spTree>
@@ -1789,7 +1916,7 @@
 </p:notes>
 </file>
 
-<file path=ppt/notesSlides/notesSlide16.xml><?xml version="1.0" encoding="utf-8"?>
+<file path=ppt/notesSlides/notesSlide17.xml><?xml version="1.0" encoding="utf-8"?>
 <p:notes xmlns:a="http://schemas.openxmlformats.org/drawingml/2006/main" xmlns:r="http://schemas.openxmlformats.org/officeDocument/2006/relationships" xmlns:p="http://schemas.openxmlformats.org/presentationml/2006/main" showMasterSp="0" showMasterPhAnim="0">
   <p:cSld>
     <p:spTree>
@@ -1920,7 +2047,7 @@
 </p:notes>
 </file>
 
-<file path=ppt/notesSlides/notesSlide17.xml><?xml version="1.0" encoding="utf-8"?>
+<file path=ppt/notesSlides/notesSlide18.xml><?xml version="1.0" encoding="utf-8"?>
 <p:notes xmlns:a="http://schemas.openxmlformats.org/drawingml/2006/main" xmlns:r="http://schemas.openxmlformats.org/officeDocument/2006/relationships" xmlns:p="http://schemas.openxmlformats.org/presentationml/2006/main" showMasterSp="0" showMasterPhAnim="0">
   <p:cSld>
     <p:spTree>
@@ -2042,137 +2169,6 @@
     <p:extLst>
       <p:ext uri="{BB962C8B-B14F-4D97-AF65-F5344CB8AC3E}">
         <p14:creationId xmlns:p14="http://schemas.microsoft.com/office/powerpoint/2010/main" val="345420155"/>
-      </p:ext>
-    </p:extLst>
-  </p:cSld>
-  <p:clrMapOvr>
-    <a:masterClrMapping/>
-  </p:clrMapOvr>
-</p:notes>
-</file>
-
-<file path=ppt/notesSlides/notesSlide18.xml><?xml version="1.0" encoding="utf-8"?>
-<p:notes xmlns:a="http://schemas.openxmlformats.org/drawingml/2006/main" xmlns:r="http://schemas.openxmlformats.org/officeDocument/2006/relationships" xmlns:p="http://schemas.openxmlformats.org/presentationml/2006/main" showMasterSp="0" showMasterPhAnim="0">
-  <p:cSld>
-    <p:spTree>
-      <p:nvGrpSpPr>
-        <p:cNvPr id="1" name="Shape 133"/>
-        <p:cNvGrpSpPr/>
-        <p:nvPr/>
-      </p:nvGrpSpPr>
-      <p:grpSpPr>
-        <a:xfrm>
-          <a:off x="0" y="0"/>
-          <a:ext cx="0" cy="0"/>
-          <a:chOff x="0" y="0"/>
-          <a:chExt cx="0" cy="0"/>
-        </a:xfrm>
-      </p:grpSpPr>
-      <p:sp>
-        <p:nvSpPr>
-          <p:cNvPr id="134" name="Google Shape;134;p18:notes"/>
-          <p:cNvSpPr>
-            <a:spLocks noGrp="1" noRot="1" noChangeAspect="1"/>
-          </p:cNvSpPr>
-          <p:nvPr>
-            <p:ph type="sldImg" idx="2"/>
-          </p:nvPr>
-        </p:nvSpPr>
-        <p:spPr>
-          <a:xfrm>
-            <a:off x="381000" y="685800"/>
-            <a:ext cx="6096000" cy="3429000"/>
-          </a:xfrm>
-          <a:custGeom>
-            <a:avLst/>
-            <a:gdLst/>
-            <a:ahLst/>
-            <a:cxnLst/>
-            <a:rect l="l" t="t" r="r" b="b"/>
-            <a:pathLst>
-              <a:path w="120000" h="120000" extrusionOk="0">
-                <a:moveTo>
-                  <a:pt x="0" y="0"/>
-                </a:moveTo>
-                <a:lnTo>
-                  <a:pt x="120000" y="0"/>
-                </a:lnTo>
-                <a:lnTo>
-                  <a:pt x="120000" y="120000"/>
-                </a:lnTo>
-                <a:lnTo>
-                  <a:pt x="0" y="120000"/>
-                </a:lnTo>
-                <a:close/>
-              </a:path>
-            </a:pathLst>
-          </a:custGeom>
-          <a:noFill/>
-          <a:ln w="9525" cap="flat" cmpd="sng">
-            <a:solidFill>
-              <a:srgbClr val="000000"/>
-            </a:solidFill>
-            <a:prstDash val="solid"/>
-            <a:round/>
-            <a:headEnd type="none" w="sm" len="sm"/>
-            <a:tailEnd type="none" w="sm" len="sm"/>
-          </a:ln>
-        </p:spPr>
-      </p:sp>
-      <p:sp>
-        <p:nvSpPr>
-          <p:cNvPr id="135" name="Google Shape;135;p18:notes"/>
-          <p:cNvSpPr txBox="1">
-            <a:spLocks noGrp="1"/>
-          </p:cNvSpPr>
-          <p:nvPr>
-            <p:ph type="body" idx="1"/>
-          </p:nvPr>
-        </p:nvSpPr>
-        <p:spPr>
-          <a:xfrm>
-            <a:off x="685800" y="4343400"/>
-            <a:ext cx="5486400" cy="4114800"/>
-          </a:xfrm>
-          <a:prstGeom prst="rect">
-            <a:avLst/>
-          </a:prstGeom>
-          <a:noFill/>
-          <a:ln>
-            <a:noFill/>
-          </a:ln>
-        </p:spPr>
-        <p:txBody>
-          <a:bodyPr spcFirstLastPara="1" wrap="square" lIns="91425" tIns="91425" rIns="91425" bIns="91425" anchor="t" anchorCtr="0">
-            <a:noAutofit/>
-          </a:bodyPr>
-          <a:lstStyle/>
-          <a:p>
-            <a:pPr marL="0" lvl="0" indent="0" algn="l" rtl="0">
-              <a:lnSpc>
-                <a:spcPct val="100000"/>
-              </a:lnSpc>
-              <a:spcBef>
-                <a:spcPts val="0"/>
-              </a:spcBef>
-              <a:spcAft>
-                <a:spcPts val="0"/>
-              </a:spcAft>
-              <a:buClr>
-                <a:schemeClr val="dk1"/>
-              </a:buClr>
-              <a:buSzPts val="1100"/>
-              <a:buFont typeface="Arial"/>
-              <a:buNone/>
-            </a:pPr>
-            <a:endParaRPr/>
-          </a:p>
-        </p:txBody>
-      </p:sp>
-    </p:spTree>
-    <p:extLst>
-      <p:ext uri="{BB962C8B-B14F-4D97-AF65-F5344CB8AC3E}">
-        <p14:creationId xmlns:p14="http://schemas.microsoft.com/office/powerpoint/2010/main" val="3229833637"/>
       </p:ext>
     </p:extLst>
   </p:cSld>
@@ -2303,7 +2299,7 @@
     </p:spTree>
     <p:extLst>
       <p:ext uri="{BB962C8B-B14F-4D97-AF65-F5344CB8AC3E}">
-        <p14:creationId xmlns:p14="http://schemas.microsoft.com/office/powerpoint/2010/main" val="3313946119"/>
+        <p14:creationId xmlns:p14="http://schemas.microsoft.com/office/powerpoint/2010/main" val="3229833637"/>
       </p:ext>
     </p:extLst>
   </p:cSld>
@@ -2440,6 +2436,137 @@
 </file>
 
 <file path=ppt/notesSlides/notesSlide20.xml><?xml version="1.0" encoding="utf-8"?>
+<p:notes xmlns:a="http://schemas.openxmlformats.org/drawingml/2006/main" xmlns:r="http://schemas.openxmlformats.org/officeDocument/2006/relationships" xmlns:p="http://schemas.openxmlformats.org/presentationml/2006/main" showMasterSp="0" showMasterPhAnim="0">
+  <p:cSld>
+    <p:spTree>
+      <p:nvGrpSpPr>
+        <p:cNvPr id="1" name="Shape 133"/>
+        <p:cNvGrpSpPr/>
+        <p:nvPr/>
+      </p:nvGrpSpPr>
+      <p:grpSpPr>
+        <a:xfrm>
+          <a:off x="0" y="0"/>
+          <a:ext cx="0" cy="0"/>
+          <a:chOff x="0" y="0"/>
+          <a:chExt cx="0" cy="0"/>
+        </a:xfrm>
+      </p:grpSpPr>
+      <p:sp>
+        <p:nvSpPr>
+          <p:cNvPr id="134" name="Google Shape;134;p18:notes"/>
+          <p:cNvSpPr>
+            <a:spLocks noGrp="1" noRot="1" noChangeAspect="1"/>
+          </p:cNvSpPr>
+          <p:nvPr>
+            <p:ph type="sldImg" idx="2"/>
+          </p:nvPr>
+        </p:nvSpPr>
+        <p:spPr>
+          <a:xfrm>
+            <a:off x="381000" y="685800"/>
+            <a:ext cx="6096000" cy="3429000"/>
+          </a:xfrm>
+          <a:custGeom>
+            <a:avLst/>
+            <a:gdLst/>
+            <a:ahLst/>
+            <a:cxnLst/>
+            <a:rect l="l" t="t" r="r" b="b"/>
+            <a:pathLst>
+              <a:path w="120000" h="120000" extrusionOk="0">
+                <a:moveTo>
+                  <a:pt x="0" y="0"/>
+                </a:moveTo>
+                <a:lnTo>
+                  <a:pt x="120000" y="0"/>
+                </a:lnTo>
+                <a:lnTo>
+                  <a:pt x="120000" y="120000"/>
+                </a:lnTo>
+                <a:lnTo>
+                  <a:pt x="0" y="120000"/>
+                </a:lnTo>
+                <a:close/>
+              </a:path>
+            </a:pathLst>
+          </a:custGeom>
+          <a:noFill/>
+          <a:ln w="9525" cap="flat" cmpd="sng">
+            <a:solidFill>
+              <a:srgbClr val="000000"/>
+            </a:solidFill>
+            <a:prstDash val="solid"/>
+            <a:round/>
+            <a:headEnd type="none" w="sm" len="sm"/>
+            <a:tailEnd type="none" w="sm" len="sm"/>
+          </a:ln>
+        </p:spPr>
+      </p:sp>
+      <p:sp>
+        <p:nvSpPr>
+          <p:cNvPr id="135" name="Google Shape;135;p18:notes"/>
+          <p:cNvSpPr txBox="1">
+            <a:spLocks noGrp="1"/>
+          </p:cNvSpPr>
+          <p:nvPr>
+            <p:ph type="body" idx="1"/>
+          </p:nvPr>
+        </p:nvSpPr>
+        <p:spPr>
+          <a:xfrm>
+            <a:off x="685800" y="4343400"/>
+            <a:ext cx="5486400" cy="4114800"/>
+          </a:xfrm>
+          <a:prstGeom prst="rect">
+            <a:avLst/>
+          </a:prstGeom>
+          <a:noFill/>
+          <a:ln>
+            <a:noFill/>
+          </a:ln>
+        </p:spPr>
+        <p:txBody>
+          <a:bodyPr spcFirstLastPara="1" wrap="square" lIns="91425" tIns="91425" rIns="91425" bIns="91425" anchor="t" anchorCtr="0">
+            <a:noAutofit/>
+          </a:bodyPr>
+          <a:lstStyle/>
+          <a:p>
+            <a:pPr marL="0" lvl="0" indent="0" algn="l" rtl="0">
+              <a:lnSpc>
+                <a:spcPct val="100000"/>
+              </a:lnSpc>
+              <a:spcBef>
+                <a:spcPts val="0"/>
+              </a:spcBef>
+              <a:spcAft>
+                <a:spcPts val="0"/>
+              </a:spcAft>
+              <a:buClr>
+                <a:schemeClr val="dk1"/>
+              </a:buClr>
+              <a:buSzPts val="1100"/>
+              <a:buFont typeface="Arial"/>
+              <a:buNone/>
+            </a:pPr>
+            <a:endParaRPr/>
+          </a:p>
+        </p:txBody>
+      </p:sp>
+    </p:spTree>
+    <p:extLst>
+      <p:ext uri="{BB962C8B-B14F-4D97-AF65-F5344CB8AC3E}">
+        <p14:creationId xmlns:p14="http://schemas.microsoft.com/office/powerpoint/2010/main" val="3313946119"/>
+      </p:ext>
+    </p:extLst>
+  </p:cSld>
+  <p:clrMapOvr>
+    <a:masterClrMapping/>
+  </p:clrMapOvr>
+</p:notes>
+</file>
+
+<file path=ppt/notesSlides/notesSlide21.xml><?xml version="1.0" encoding="utf-8"?>
 <p:notes xmlns:a="http://schemas.openxmlformats.org/drawingml/2006/main" xmlns:r="http://schemas.openxmlformats.org/officeDocument/2006/relationships" xmlns:p="http://schemas.openxmlformats.org/presentationml/2006/main" showMasterSp="0" showMasterPhAnim="0">
   <p:cSld>
     <p:spTree>
@@ -2938,7 +3065,7 @@
     </p:spTree>
     <p:extLst>
       <p:ext uri="{BB962C8B-B14F-4D97-AF65-F5344CB8AC3E}">
-        <p14:creationId xmlns:p14="http://schemas.microsoft.com/office/powerpoint/2010/main" val="2750274405"/>
+        <p14:creationId xmlns:p14="http://schemas.microsoft.com/office/powerpoint/2010/main" val="176050431"/>
       </p:ext>
     </p:extLst>
   </p:cSld>
@@ -3069,7 +3196,7 @@
     </p:spTree>
     <p:extLst>
       <p:ext uri="{BB962C8B-B14F-4D97-AF65-F5344CB8AC3E}">
-        <p14:creationId xmlns:p14="http://schemas.microsoft.com/office/powerpoint/2010/main" val="176050431"/>
+        <p14:creationId xmlns:p14="http://schemas.microsoft.com/office/powerpoint/2010/main" val="2750274405"/>
       </p:ext>
     </p:extLst>
   </p:cSld>
@@ -3346,7 +3473,7 @@
   <p:cSld>
     <p:spTree>
       <p:nvGrpSpPr>
-        <p:cNvPr id="1" name="Shape 111"/>
+        <p:cNvPr id="1" name="Shape 88"/>
         <p:cNvGrpSpPr/>
         <p:nvPr/>
       </p:nvGrpSpPr>
@@ -3360,7 +3487,7 @@
       </p:grpSpPr>
       <p:sp>
         <p:nvSpPr>
-          <p:cNvPr id="112" name="Google Shape;112;p4:notes"/>
+          <p:cNvPr id="89" name="Google Shape;89;p3:notes"/>
           <p:cNvSpPr>
             <a:spLocks noGrp="1" noRot="1" noChangeAspect="1"/>
           </p:cNvSpPr>
@@ -3411,7 +3538,7 @@
       </p:sp>
       <p:sp>
         <p:nvSpPr>
-          <p:cNvPr id="113" name="Google Shape;113;p4:notes"/>
+          <p:cNvPr id="90" name="Google Shape;90;p3:notes"/>
           <p:cNvSpPr txBox="1">
             <a:spLocks noGrp="1"/>
           </p:cNvSpPr>
@@ -3460,6 +3587,11 @@
         </p:txBody>
       </p:sp>
     </p:spTree>
+    <p:extLst>
+      <p:ext uri="{BB962C8B-B14F-4D97-AF65-F5344CB8AC3E}">
+        <p14:creationId xmlns:p14="http://schemas.microsoft.com/office/powerpoint/2010/main" val="3324560171"/>
+      </p:ext>
+    </p:extLst>
   </p:cSld>
   <p:clrMapOvr>
     <a:masterClrMapping/>
@@ -8815,7 +8947,7 @@
               <a:t>Base </a:t>
             </a:r>
             <a:r>
-              <a:rPr lang="en-US" sz="5400" b="1" i="0" u="none" strike="noStrike" cap="none" dirty="0" err="1">
+              <a:rPr lang="pt-BR" sz="5400" b="1" i="0" u="none" strike="noStrike" cap="none" dirty="0">
                 <a:solidFill>
                   <a:schemeClr val="lt1"/>
                 </a:solidFill>
@@ -8826,15 +8958,6 @@
               </a:rPr>
               <a:t>metodológica</a:t>
             </a:r>
-            <a:endParaRPr sz="5400" b="1" i="0" u="none" strike="noStrike" cap="none" dirty="0">
-              <a:solidFill>
-                <a:schemeClr val="lt1"/>
-              </a:solidFill>
-              <a:latin typeface="Century Gothic"/>
-              <a:ea typeface="Century Gothic"/>
-              <a:cs typeface="Century Gothic"/>
-              <a:sym typeface="Century Gothic"/>
-            </a:endParaRPr>
           </a:p>
         </p:txBody>
       </p:sp>
@@ -8915,7 +9038,7 @@
         <p:fade/>
       </p:transition>
     </mc:Choice>
-    <mc:Fallback xmlns="" xmlns:mv="urn:schemas-microsoft-com:mac:vml" xmlns:c="http://schemas.openxmlformats.org/drawingml/2006/chart" xmlns:dgm="http://schemas.openxmlformats.org/drawingml/2006/diagram" xmlns:o="urn:schemas-microsoft-com:office:office" xmlns:v="urn:schemas-microsoft-com:vml" xmlns:pvml="urn:schemas-microsoft-com:office:powerpoint" xmlns:com="http://schemas.openxmlformats.org/drawingml/2006/compatibility" xmlns:p15="http://schemas.microsoft.com/office/powerpoint/2012/main" xmlns:ahyp="http://schemas.microsoft.com/office/drawing/2018/hyperlinkcolor">
+    <mc:Fallback xmlns:ahyp="http://schemas.microsoft.com/office/drawing/2018/hyperlinkcolor" xmlns:p15="http://schemas.microsoft.com/office/powerpoint/2012/main" xmlns:com="http://schemas.openxmlformats.org/drawingml/2006/compatibility" xmlns:pvml="urn:schemas-microsoft-com:office:powerpoint" xmlns:v="urn:schemas-microsoft-com:vml" xmlns:o="urn:schemas-microsoft-com:office:office" xmlns:dgm="http://schemas.openxmlformats.org/drawingml/2006/diagram" xmlns:c="http://schemas.openxmlformats.org/drawingml/2006/chart" xmlns:mv="urn:schemas-microsoft-com:mac:vml" xmlns="">
       <p:transition spd="slow">
         <p:fade/>
       </p:transition>
@@ -8925,6 +9048,348 @@
 </file>
 
 <file path=ppt/slides/slide10.xml><?xml version="1.0" encoding="utf-8"?>
+<p:sld xmlns:a="http://schemas.openxmlformats.org/drawingml/2006/main" xmlns:r="http://schemas.openxmlformats.org/officeDocument/2006/relationships" xmlns:p="http://schemas.openxmlformats.org/presentationml/2006/main">
+  <p:cSld>
+    <p:bg>
+      <p:bgPr>
+        <a:solidFill>
+          <a:srgbClr val="FFFFFF"/>
+        </a:solidFill>
+        <a:effectLst/>
+      </p:bgPr>
+    </p:bg>
+    <p:spTree>
+      <p:nvGrpSpPr>
+        <p:cNvPr id="1" name="Shape 91"/>
+        <p:cNvGrpSpPr/>
+        <p:nvPr/>
+      </p:nvGrpSpPr>
+      <p:grpSpPr>
+        <a:xfrm>
+          <a:off x="0" y="0"/>
+          <a:ext cx="0" cy="0"/>
+          <a:chOff x="0" y="0"/>
+          <a:chExt cx="0" cy="0"/>
+        </a:xfrm>
+      </p:grpSpPr>
+      <p:sp>
+        <p:nvSpPr>
+          <p:cNvPr id="92" name="Google Shape;92;p3"/>
+          <p:cNvSpPr txBox="1">
+            <a:spLocks noGrp="1"/>
+          </p:cNvSpPr>
+          <p:nvPr>
+            <p:ph type="subTitle" idx="1"/>
+          </p:nvPr>
+        </p:nvSpPr>
+        <p:spPr>
+          <a:xfrm>
+            <a:off x="1200150" y="305700"/>
+            <a:ext cx="7632150" cy="591300"/>
+          </a:xfrm>
+          <a:prstGeom prst="rect">
+            <a:avLst/>
+          </a:prstGeom>
+          <a:noFill/>
+          <a:ln>
+            <a:noFill/>
+          </a:ln>
+        </p:spPr>
+        <p:txBody>
+          <a:bodyPr spcFirstLastPara="1" wrap="square" lIns="91425" tIns="91425" rIns="91425" bIns="91425" anchor="ctr" anchorCtr="0">
+            <a:noAutofit/>
+          </a:bodyPr>
+          <a:lstStyle/>
+          <a:p>
+            <a:pPr marL="0" lvl="0" indent="0" algn="ctr" rtl="0">
+              <a:lnSpc>
+                <a:spcPct val="100000"/>
+              </a:lnSpc>
+              <a:spcBef>
+                <a:spcPts val="0"/>
+              </a:spcBef>
+              <a:spcAft>
+                <a:spcPts val="0"/>
+              </a:spcAft>
+              <a:buClr>
+                <a:schemeClr val="dk1"/>
+              </a:buClr>
+              <a:buSzPts val="1100"/>
+              <a:buFont typeface="Arial"/>
+              <a:buNone/>
+            </a:pPr>
+            <a:r>
+              <a:rPr lang="en-US" sz="4000" b="1" dirty="0" err="1">
+                <a:solidFill>
+                  <a:srgbClr val="073763"/>
+                </a:solidFill>
+                <a:latin typeface="Century Gothic"/>
+                <a:ea typeface="Century Gothic"/>
+                <a:cs typeface="Century Gothic"/>
+                <a:sym typeface="Century Gothic"/>
+              </a:rPr>
+              <a:t>Exemplos</a:t>
+            </a:r>
+            <a:endParaRPr sz="4000" b="1" dirty="0">
+              <a:solidFill>
+                <a:srgbClr val="073763"/>
+              </a:solidFill>
+              <a:latin typeface="Century Gothic"/>
+              <a:ea typeface="Century Gothic"/>
+              <a:cs typeface="Century Gothic"/>
+              <a:sym typeface="Century Gothic"/>
+            </a:endParaRPr>
+          </a:p>
+        </p:txBody>
+      </p:sp>
+      <p:pic>
+        <p:nvPicPr>
+          <p:cNvPr id="93" name="Google Shape;93;p3"/>
+          <p:cNvPicPr preferRelativeResize="0"/>
+          <p:nvPr/>
+        </p:nvPicPr>
+        <p:blipFill rotWithShape="1">
+          <a:blip r:embed="rId3">
+            <a:alphaModFix/>
+          </a:blip>
+          <a:srcRect/>
+          <a:stretch/>
+        </p:blipFill>
+        <p:spPr>
+          <a:xfrm>
+            <a:off x="311700" y="243014"/>
+            <a:ext cx="1698849" cy="591351"/>
+          </a:xfrm>
+          <a:prstGeom prst="rect">
+            <a:avLst/>
+          </a:prstGeom>
+          <a:noFill/>
+          <a:ln>
+            <a:noFill/>
+          </a:ln>
+        </p:spPr>
+      </p:pic>
+      <p:sp>
+        <p:nvSpPr>
+          <p:cNvPr id="95" name="Google Shape;95;p3"/>
+          <p:cNvSpPr/>
+          <p:nvPr/>
+        </p:nvSpPr>
+        <p:spPr>
+          <a:xfrm>
+            <a:off x="0" y="5077717"/>
+            <a:ext cx="9144000" cy="57300"/>
+          </a:xfrm>
+          <a:prstGeom prst="rect">
+            <a:avLst/>
+          </a:prstGeom>
+          <a:solidFill>
+            <a:srgbClr val="F78321"/>
+          </a:solidFill>
+          <a:ln w="9525" cap="flat" cmpd="sng">
+            <a:solidFill>
+              <a:srgbClr val="F78321"/>
+            </a:solidFill>
+            <a:prstDash val="solid"/>
+            <a:round/>
+            <a:headEnd type="none" w="sm" len="sm"/>
+            <a:tailEnd type="none" w="sm" len="sm"/>
+          </a:ln>
+        </p:spPr>
+        <p:txBody>
+          <a:bodyPr spcFirstLastPara="1" wrap="square" lIns="91425" tIns="91425" rIns="91425" bIns="91425" anchor="ctr" anchorCtr="0">
+            <a:noAutofit/>
+          </a:bodyPr>
+          <a:lstStyle/>
+          <a:p>
+            <a:pPr marL="0" marR="0" lvl="0" indent="0" algn="l" rtl="0">
+              <a:lnSpc>
+                <a:spcPct val="100000"/>
+              </a:lnSpc>
+              <a:spcBef>
+                <a:spcPts val="0"/>
+              </a:spcBef>
+              <a:spcAft>
+                <a:spcPts val="0"/>
+              </a:spcAft>
+              <a:buClr>
+                <a:srgbClr val="000000"/>
+              </a:buClr>
+              <a:buSzPts val="1400"/>
+              <a:buFont typeface="Arial"/>
+              <a:buNone/>
+            </a:pPr>
+            <a:endParaRPr sz="1400" b="0" i="0" u="none" strike="noStrike" cap="none">
+              <a:solidFill>
+                <a:srgbClr val="000000"/>
+              </a:solidFill>
+              <a:latin typeface="Arial"/>
+              <a:ea typeface="Arial"/>
+              <a:cs typeface="Arial"/>
+              <a:sym typeface="Arial"/>
+            </a:endParaRPr>
+          </a:p>
+        </p:txBody>
+      </p:sp>
+      <p:sp>
+        <p:nvSpPr>
+          <p:cNvPr id="4" name="TextBox 3">
+            <a:extLst>
+              <a:ext uri="{FF2B5EF4-FFF2-40B4-BE49-F238E27FC236}">
+                <a16:creationId xmlns:a16="http://schemas.microsoft.com/office/drawing/2014/main" id="{E8FBA07F-6920-43D0-BE57-2EAD01B9E1B9}"/>
+              </a:ext>
+            </a:extLst>
+          </p:cNvPr>
+          <p:cNvSpPr txBox="1"/>
+          <p:nvPr/>
+        </p:nvSpPr>
+        <p:spPr>
+          <a:xfrm>
+            <a:off x="1680819" y="1150152"/>
+            <a:ext cx="1003801" cy="307777"/>
+          </a:xfrm>
+          <a:prstGeom prst="rect">
+            <a:avLst/>
+          </a:prstGeom>
+          <a:noFill/>
+        </p:spPr>
+        <p:txBody>
+          <a:bodyPr wrap="none" rtlCol="0">
+            <a:spAutoFit/>
+          </a:bodyPr>
+          <a:lstStyle/>
+          <a:p>
+            <a:r>
+              <a:rPr lang="pt-BR" dirty="0"/>
+              <a:t>API REST</a:t>
+            </a:r>
+          </a:p>
+        </p:txBody>
+      </p:sp>
+      <p:sp>
+        <p:nvSpPr>
+          <p:cNvPr id="11" name="TextBox 10">
+            <a:extLst>
+              <a:ext uri="{FF2B5EF4-FFF2-40B4-BE49-F238E27FC236}">
+                <a16:creationId xmlns:a16="http://schemas.microsoft.com/office/drawing/2014/main" id="{275A5F48-D951-400D-A5D5-8820A6E9A4B7}"/>
+              </a:ext>
+            </a:extLst>
+          </p:cNvPr>
+          <p:cNvSpPr txBox="1"/>
+          <p:nvPr/>
+        </p:nvSpPr>
+        <p:spPr>
+          <a:xfrm>
+            <a:off x="6051682" y="1150153"/>
+            <a:ext cx="1192955" cy="307777"/>
+          </a:xfrm>
+          <a:prstGeom prst="rect">
+            <a:avLst/>
+          </a:prstGeom>
+          <a:noFill/>
+        </p:spPr>
+        <p:txBody>
+          <a:bodyPr wrap="none" rtlCol="0">
+            <a:spAutoFit/>
+          </a:bodyPr>
+          <a:lstStyle/>
+          <a:p>
+            <a:r>
+              <a:rPr lang="pt-BR" dirty="0"/>
+              <a:t>API </a:t>
+            </a:r>
+            <a:r>
+              <a:rPr lang="pt-BR" dirty="0" err="1"/>
+              <a:t>RESTful</a:t>
+            </a:r>
+            <a:endParaRPr lang="pt-BR" dirty="0"/>
+          </a:p>
+        </p:txBody>
+      </p:sp>
+      <p:pic>
+        <p:nvPicPr>
+          <p:cNvPr id="10" name="Picture 9">
+            <a:extLst>
+              <a:ext uri="{FF2B5EF4-FFF2-40B4-BE49-F238E27FC236}">
+                <a16:creationId xmlns:a16="http://schemas.microsoft.com/office/drawing/2014/main" id="{93C269DE-4FA8-4572-84B7-863B105EB360}"/>
+              </a:ext>
+            </a:extLst>
+          </p:cNvPr>
+          <p:cNvPicPr>
+            <a:picLocks noChangeAspect="1"/>
+          </p:cNvPicPr>
+          <p:nvPr/>
+        </p:nvPicPr>
+        <p:blipFill rotWithShape="1">
+          <a:blip r:embed="rId4"/>
+          <a:srcRect b="46487"/>
+          <a:stretch/>
+        </p:blipFill>
+        <p:spPr>
+          <a:xfrm>
+            <a:off x="311700" y="1711081"/>
+            <a:ext cx="4141888" cy="1142996"/>
+          </a:xfrm>
+          <a:prstGeom prst="rect">
+            <a:avLst/>
+          </a:prstGeom>
+        </p:spPr>
+      </p:pic>
+      <p:pic>
+        <p:nvPicPr>
+          <p:cNvPr id="13" name="Picture 12">
+            <a:extLst>
+              <a:ext uri="{FF2B5EF4-FFF2-40B4-BE49-F238E27FC236}">
+                <a16:creationId xmlns:a16="http://schemas.microsoft.com/office/drawing/2014/main" id="{1D605AC6-717E-4D8D-AFC2-8EFB36B8E6B2}"/>
+              </a:ext>
+            </a:extLst>
+          </p:cNvPr>
+          <p:cNvPicPr>
+            <a:picLocks noChangeAspect="1"/>
+          </p:cNvPicPr>
+          <p:nvPr/>
+        </p:nvPicPr>
+        <p:blipFill rotWithShape="1">
+          <a:blip r:embed="rId5"/>
+          <a:srcRect l="2816" b="18871"/>
+          <a:stretch/>
+        </p:blipFill>
+        <p:spPr>
+          <a:xfrm>
+            <a:off x="4512794" y="1711083"/>
+            <a:ext cx="4270733" cy="1532067"/>
+          </a:xfrm>
+          <a:prstGeom prst="rect">
+            <a:avLst/>
+          </a:prstGeom>
+        </p:spPr>
+      </p:pic>
+    </p:spTree>
+    <p:extLst>
+      <p:ext uri="{BB962C8B-B14F-4D97-AF65-F5344CB8AC3E}">
+        <p14:creationId xmlns:p14="http://schemas.microsoft.com/office/powerpoint/2010/main" val="1154559064"/>
+      </p:ext>
+    </p:extLst>
+  </p:cSld>
+  <p:clrMapOvr>
+    <a:masterClrMapping/>
+  </p:clrMapOvr>
+  <mc:AlternateContent xmlns:mc="http://schemas.openxmlformats.org/markup-compatibility/2006">
+    <mc:Choice xmlns:p14="http://schemas.microsoft.com/office/powerpoint/2010/main" Requires="p14">
+      <p:transition spd="med" p14:dur="700">
+        <p:fade/>
+      </p:transition>
+    </mc:Choice>
+    <mc:Fallback>
+      <p:transition spd="med">
+        <p:fade/>
+      </p:transition>
+    </mc:Fallback>
+  </mc:AlternateContent>
+</p:sld>
+</file>
+
+<file path=ppt/slides/slide11.xml><?xml version="1.0" encoding="utf-8"?>
 <p:sld xmlns:a="http://schemas.openxmlformats.org/drawingml/2006/main" xmlns:r="http://schemas.openxmlformats.org/officeDocument/2006/relationships" xmlns:p="http://schemas.openxmlformats.org/presentationml/2006/main">
   <p:cSld>
     <p:bg>
@@ -9116,10 +9581,68 @@
                 <a:latin typeface="Calibri"/>
                 <a:cs typeface="Calibri"/>
                 <a:sym typeface="Calibri"/>
+                <a:hlinkClick r:id="rId4"/>
               </a:rPr>
               <a:t>https://dotnet.microsoft.com/download/dotnet/thank-you/sdk-5.0.400-windows-x64-installer</a:t>
             </a:r>
-            <a:endParaRPr sz="1600" dirty="0"/>
+            <a:endParaRPr lang="en-US" sz="1600" dirty="0">
+              <a:solidFill>
+                <a:srgbClr val="073763"/>
+              </a:solidFill>
+              <a:latin typeface="Calibri"/>
+              <a:cs typeface="Calibri"/>
+              <a:sym typeface="Calibri"/>
+            </a:endParaRPr>
+          </a:p>
+          <a:p>
+            <a:pPr marL="76200" indent="0" algn="l">
+              <a:lnSpc>
+                <a:spcPct val="150000"/>
+              </a:lnSpc>
+              <a:buClr>
+                <a:srgbClr val="073763"/>
+              </a:buClr>
+              <a:buSzPts val="2400"/>
+            </a:pPr>
+            <a:r>
+              <a:rPr lang="en-US" sz="1600" dirty="0">
+                <a:solidFill>
+                  <a:srgbClr val="073763"/>
+                </a:solidFill>
+                <a:latin typeface="Calibri"/>
+                <a:cs typeface="Calibri"/>
+                <a:sym typeface="Calibri"/>
+                <a:hlinkClick r:id="rId5"/>
+              </a:rPr>
+              <a:t>https://dotnet.microsoft.com/download/dotnet/thank-you/sdk-5.0.400-windows-x86-installer</a:t>
+            </a:r>
+            <a:endParaRPr lang="en-US" sz="1600" dirty="0">
+              <a:solidFill>
+                <a:srgbClr val="073763"/>
+              </a:solidFill>
+              <a:latin typeface="Calibri"/>
+              <a:cs typeface="Calibri"/>
+              <a:sym typeface="Calibri"/>
+            </a:endParaRPr>
+          </a:p>
+          <a:p>
+            <a:pPr marL="76200" indent="0" algn="l">
+              <a:lnSpc>
+                <a:spcPct val="150000"/>
+              </a:lnSpc>
+              <a:buClr>
+                <a:srgbClr val="073763"/>
+              </a:buClr>
+              <a:buSzPts val="2400"/>
+            </a:pPr>
+            <a:endParaRPr lang="en-US" sz="1600" dirty="0">
+              <a:solidFill>
+                <a:srgbClr val="073763"/>
+              </a:solidFill>
+              <a:latin typeface="Calibri"/>
+              <a:cs typeface="Calibri"/>
+              <a:sym typeface="Calibri"/>
+            </a:endParaRPr>
           </a:p>
           <a:p>
             <a:pPr marL="457200" lvl="0" indent="-381000" algn="l" rtl="0">
@@ -9164,7 +9687,7 @@
             </a:pPr>
             <a:r>
               <a:rPr lang="en-US" sz="1600" dirty="0">
-                <a:hlinkClick r:id="rId4"/>
+                <a:hlinkClick r:id="rId6"/>
               </a:rPr>
               <a:t>https://dl.pstmn.io/download/latest/win64</a:t>
             </a:r>
@@ -9181,7 +9704,9 @@
               <a:buSzPts val="2400"/>
             </a:pPr>
             <a:r>
-              <a:rPr lang="en-US" sz="1600" dirty="0"/>
+              <a:rPr lang="en-US" sz="1600" dirty="0">
+                <a:hlinkClick r:id="rId7"/>
+              </a:rPr>
               <a:t>https://dl.pstmn.io/download/latest/win32</a:t>
             </a:r>
             <a:endParaRPr sz="1600" dirty="0"/>
@@ -9345,7 +9870,7 @@
         <p:fade/>
       </p:transition>
     </mc:Choice>
-    <mc:Fallback xmlns="" xmlns:mv="urn:schemas-microsoft-com:mac:vml" xmlns:c="http://schemas.openxmlformats.org/drawingml/2006/chart" xmlns:dgm="http://schemas.openxmlformats.org/drawingml/2006/diagram" xmlns:o="urn:schemas-microsoft-com:office:office" xmlns:v="urn:schemas-microsoft-com:vml" xmlns:pvml="urn:schemas-microsoft-com:office:powerpoint" xmlns:com="http://schemas.openxmlformats.org/drawingml/2006/compatibility" xmlns:p15="http://schemas.microsoft.com/office/powerpoint/2012/main" xmlns:ahyp="http://schemas.microsoft.com/office/drawing/2018/hyperlinkcolor">
+    <mc:Fallback xmlns:ahyp="http://schemas.microsoft.com/office/drawing/2018/hyperlinkcolor" xmlns:p15="http://schemas.microsoft.com/office/powerpoint/2012/main" xmlns:com="http://schemas.openxmlformats.org/drawingml/2006/compatibility" xmlns:pvml="urn:schemas-microsoft-com:office:powerpoint" xmlns:v="urn:schemas-microsoft-com:vml" xmlns:o="urn:schemas-microsoft-com:office:office" xmlns:dgm="http://schemas.openxmlformats.org/drawingml/2006/diagram" xmlns:c="http://schemas.openxmlformats.org/drawingml/2006/chart" xmlns:mv="urn:schemas-microsoft-com:mac:vml" xmlns="">
       <p:transition spd="slow">
         <p:fade/>
       </p:transition>
@@ -9387,7 +9912,7 @@
                                         <p:tgtEl>
                                           <p:spTgt spid="117">
                                             <p:txEl>
-                                              <p:pRg st="2" end="2"/>
+                                              <p:pRg st="4" end="4"/>
                                             </p:txEl>
                                           </p:spTgt>
                                         </p:tgtEl>
@@ -9436,7 +9961,7 @@
                                         <p:tgtEl>
                                           <p:spTgt spid="117">
                                             <p:txEl>
-                                              <p:pRg st="3" end="3"/>
+                                              <p:pRg st="5" end="5"/>
                                             </p:txEl>
                                           </p:spTgt>
                                         </p:tgtEl>
@@ -9485,7 +10010,7 @@
                                         <p:tgtEl>
                                           <p:spTgt spid="117">
                                             <p:txEl>
-                                              <p:pRg st="4" end="4"/>
+                                              <p:pRg st="6" end="6"/>
                                             </p:txEl>
                                           </p:spTgt>
                                         </p:tgtEl>
@@ -9604,6 +10129,55 @@
                       </p:childTnLst>
                     </p:cTn>
                   </p:par>
+                  <p:par>
+                    <p:cTn id="23" fill="hold">
+                      <p:stCondLst>
+                        <p:cond delay="indefinite"/>
+                      </p:stCondLst>
+                      <p:childTnLst>
+                        <p:par>
+                          <p:cTn id="24" fill="hold">
+                            <p:stCondLst>
+                              <p:cond delay="0"/>
+                            </p:stCondLst>
+                            <p:childTnLst>
+                              <p:par>
+                                <p:cTn id="25" presetID="1" presetClass="entr" presetSubtype="0" fill="hold" nodeType="clickEffect">
+                                  <p:stCondLst>
+                                    <p:cond delay="0"/>
+                                  </p:stCondLst>
+                                  <p:childTnLst>
+                                    <p:set>
+                                      <p:cBhvr>
+                                        <p:cTn id="26" dur="1" fill="hold">
+                                          <p:stCondLst>
+                                            <p:cond delay="0"/>
+                                          </p:stCondLst>
+                                        </p:cTn>
+                                        <p:tgtEl>
+                                          <p:spTgt spid="117">
+                                            <p:txEl>
+                                              <p:pRg st="2" end="2"/>
+                                            </p:txEl>
+                                          </p:spTgt>
+                                        </p:tgtEl>
+                                        <p:attrNameLst>
+                                          <p:attrName>style.visibility</p:attrName>
+                                        </p:attrNameLst>
+                                      </p:cBhvr>
+                                      <p:to>
+                                        <p:strVal val="visible"/>
+                                      </p:to>
+                                    </p:set>
+                                  </p:childTnLst>
+                                </p:cTn>
+                              </p:par>
+                            </p:childTnLst>
+                          </p:cTn>
+                        </p:par>
+                      </p:childTnLst>
+                    </p:cTn>
+                  </p:par>
                 </p:childTnLst>
               </p:cTn>
               <p:prevCondLst>
@@ -9629,7 +10203,7 @@
 </p:sld>
 </file>
 
-<file path=ppt/slides/slide11.xml><?xml version="1.0" encoding="utf-8"?>
+<file path=ppt/slides/slide12.xml><?xml version="1.0" encoding="utf-8"?>
 <p:sld xmlns:a="http://schemas.openxmlformats.org/drawingml/2006/main" xmlns:r="http://schemas.openxmlformats.org/officeDocument/2006/relationships" xmlns:p="http://schemas.openxmlformats.org/presentationml/2006/main">
   <p:cSld>
     <p:bg>
@@ -10511,7 +11085,7 @@
         <p:fade/>
       </p:transition>
     </mc:Choice>
-    <mc:Fallback xmlns="" xmlns:mv="urn:schemas-microsoft-com:mac:vml" xmlns:c="http://schemas.openxmlformats.org/drawingml/2006/chart" xmlns:dgm="http://schemas.openxmlformats.org/drawingml/2006/diagram" xmlns:o="urn:schemas-microsoft-com:office:office" xmlns:v="urn:schemas-microsoft-com:vml" xmlns:pvml="urn:schemas-microsoft-com:office:powerpoint" xmlns:com="http://schemas.openxmlformats.org/drawingml/2006/compatibility" xmlns:p15="http://schemas.microsoft.com/office/powerpoint/2012/main" xmlns:ahyp="http://schemas.microsoft.com/office/drawing/2018/hyperlinkcolor">
+    <mc:Fallback xmlns:ahyp="http://schemas.microsoft.com/office/drawing/2018/hyperlinkcolor" xmlns:p15="http://schemas.microsoft.com/office/powerpoint/2012/main" xmlns:com="http://schemas.openxmlformats.org/drawingml/2006/compatibility" xmlns:pvml="urn:schemas-microsoft-com:office:powerpoint" xmlns:v="urn:schemas-microsoft-com:vml" xmlns:o="urn:schemas-microsoft-com:office:office" xmlns:dgm="http://schemas.openxmlformats.org/drawingml/2006/diagram" xmlns:c="http://schemas.openxmlformats.org/drawingml/2006/chart" xmlns:mv="urn:schemas-microsoft-com:mac:vml" xmlns="">
       <p:transition spd="slow">
         <p:fade/>
       </p:transition>
@@ -10520,7 +11094,7 @@
 </p:sld>
 </file>
 
-<file path=ppt/slides/slide12.xml><?xml version="1.0" encoding="utf-8"?>
+<file path=ppt/slides/slide13.xml><?xml version="1.0" encoding="utf-8"?>
 <p:sld xmlns:a="http://schemas.openxmlformats.org/drawingml/2006/main" xmlns:r="http://schemas.openxmlformats.org/officeDocument/2006/relationships" xmlns:p="http://schemas.openxmlformats.org/presentationml/2006/main">
   <p:cSld>
     <p:spTree>
@@ -11182,7 +11756,7 @@
         <p:fade/>
       </p:transition>
     </mc:Choice>
-    <mc:Fallback xmlns="" xmlns:mv="urn:schemas-microsoft-com:mac:vml" xmlns:c="http://schemas.openxmlformats.org/drawingml/2006/chart" xmlns:dgm="http://schemas.openxmlformats.org/drawingml/2006/diagram" xmlns:o="urn:schemas-microsoft-com:office:office" xmlns:v="urn:schemas-microsoft-com:vml" xmlns:pvml="urn:schemas-microsoft-com:office:powerpoint" xmlns:com="http://schemas.openxmlformats.org/drawingml/2006/compatibility" xmlns:p15="http://schemas.microsoft.com/office/powerpoint/2012/main" xmlns:ahyp="http://schemas.microsoft.com/office/drawing/2018/hyperlinkcolor">
+    <mc:Fallback xmlns:ahyp="http://schemas.microsoft.com/office/drawing/2018/hyperlinkcolor" xmlns:p15="http://schemas.microsoft.com/office/powerpoint/2012/main" xmlns:com="http://schemas.openxmlformats.org/drawingml/2006/compatibility" xmlns:pvml="urn:schemas-microsoft-com:office:powerpoint" xmlns:v="urn:schemas-microsoft-com:vml" xmlns:o="urn:schemas-microsoft-com:office:office" xmlns:dgm="http://schemas.openxmlformats.org/drawingml/2006/diagram" xmlns:c="http://schemas.openxmlformats.org/drawingml/2006/chart" xmlns:mv="urn:schemas-microsoft-com:mac:vml" xmlns="">
       <p:transition spd="slow">
         <p:fade/>
       </p:transition>
@@ -11191,7 +11765,7 @@
 </p:sld>
 </file>
 
-<file path=ppt/slides/slide13.xml><?xml version="1.0" encoding="utf-8"?>
+<file path=ppt/slides/slide14.xml><?xml version="1.0" encoding="utf-8"?>
 <p:sld xmlns:a="http://schemas.openxmlformats.org/drawingml/2006/main" xmlns:r="http://schemas.openxmlformats.org/officeDocument/2006/relationships" xmlns:p="http://schemas.openxmlformats.org/presentationml/2006/main">
   <p:cSld>
     <p:bg>
@@ -11770,7 +12344,7 @@
         <p:fade/>
       </p:transition>
     </mc:Choice>
-    <mc:Fallback xmlns="" xmlns:mv="urn:schemas-microsoft-com:mac:vml" xmlns:c="http://schemas.openxmlformats.org/drawingml/2006/chart" xmlns:dgm="http://schemas.openxmlformats.org/drawingml/2006/diagram" xmlns:o="urn:schemas-microsoft-com:office:office" xmlns:v="urn:schemas-microsoft-com:vml" xmlns:pvml="urn:schemas-microsoft-com:office:powerpoint" xmlns:com="http://schemas.openxmlformats.org/drawingml/2006/compatibility" xmlns:p15="http://schemas.microsoft.com/office/powerpoint/2012/main" xmlns:ahyp="http://schemas.microsoft.com/office/drawing/2018/hyperlinkcolor">
+    <mc:Fallback xmlns:ahyp="http://schemas.microsoft.com/office/drawing/2018/hyperlinkcolor" xmlns:p15="http://schemas.microsoft.com/office/powerpoint/2012/main" xmlns:com="http://schemas.openxmlformats.org/drawingml/2006/compatibility" xmlns:pvml="urn:schemas-microsoft-com:office:powerpoint" xmlns:v="urn:schemas-microsoft-com:vml" xmlns:o="urn:schemas-microsoft-com:office:office" xmlns:dgm="http://schemas.openxmlformats.org/drawingml/2006/diagram" xmlns:c="http://schemas.openxmlformats.org/drawingml/2006/chart" xmlns:mv="urn:schemas-microsoft-com:mac:vml" xmlns="">
       <p:transition spd="slow">
         <p:fade/>
       </p:transition>
@@ -11956,7 +12530,7 @@
 </p:sld>
 </file>
 
-<file path=ppt/slides/slide14.xml><?xml version="1.0" encoding="utf-8"?>
+<file path=ppt/slides/slide15.xml><?xml version="1.0" encoding="utf-8"?>
 <p:sld xmlns:a="http://schemas.openxmlformats.org/drawingml/2006/main" xmlns:r="http://schemas.openxmlformats.org/officeDocument/2006/relationships" xmlns:p="http://schemas.openxmlformats.org/presentationml/2006/main">
   <p:cSld>
     <p:spTree>
@@ -12623,7 +13197,7 @@
         <p:fade/>
       </p:transition>
     </mc:Choice>
-    <mc:Fallback xmlns="" xmlns:mv="urn:schemas-microsoft-com:mac:vml" xmlns:c="http://schemas.openxmlformats.org/drawingml/2006/chart" xmlns:dgm="http://schemas.openxmlformats.org/drawingml/2006/diagram" xmlns:o="urn:schemas-microsoft-com:office:office" xmlns:v="urn:schemas-microsoft-com:vml" xmlns:pvml="urn:schemas-microsoft-com:office:powerpoint" xmlns:com="http://schemas.openxmlformats.org/drawingml/2006/compatibility" xmlns:p15="http://schemas.microsoft.com/office/powerpoint/2012/main" xmlns:ahyp="http://schemas.microsoft.com/office/drawing/2018/hyperlinkcolor">
+    <mc:Fallback xmlns:ahyp="http://schemas.microsoft.com/office/drawing/2018/hyperlinkcolor" xmlns:p15="http://schemas.microsoft.com/office/powerpoint/2012/main" xmlns:com="http://schemas.openxmlformats.org/drawingml/2006/compatibility" xmlns:pvml="urn:schemas-microsoft-com:office:powerpoint" xmlns:v="urn:schemas-microsoft-com:vml" xmlns:o="urn:schemas-microsoft-com:office:office" xmlns:dgm="http://schemas.openxmlformats.org/drawingml/2006/diagram" xmlns:c="http://schemas.openxmlformats.org/drawingml/2006/chart" xmlns:mv="urn:schemas-microsoft-com:mac:vml" xmlns="">
       <p:transition spd="slow">
         <p:fade/>
       </p:transition>
@@ -12632,7 +13206,7 @@
 </p:sld>
 </file>
 
-<file path=ppt/slides/slide15.xml><?xml version="1.0" encoding="utf-8"?>
+<file path=ppt/slides/slide16.xml><?xml version="1.0" encoding="utf-8"?>
 <p:sld xmlns:a="http://schemas.openxmlformats.org/drawingml/2006/main" xmlns:r="http://schemas.openxmlformats.org/officeDocument/2006/relationships" xmlns:p="http://schemas.openxmlformats.org/presentationml/2006/main">
   <p:cSld>
     <p:spTree>
@@ -13038,7 +13612,7 @@
         <p:fade/>
       </p:transition>
     </mc:Choice>
-    <mc:Fallback xmlns="" xmlns:mv="urn:schemas-microsoft-com:mac:vml" xmlns:c="http://schemas.openxmlformats.org/drawingml/2006/chart" xmlns:dgm="http://schemas.openxmlformats.org/drawingml/2006/diagram" xmlns:o="urn:schemas-microsoft-com:office:office" xmlns:v="urn:schemas-microsoft-com:vml" xmlns:pvml="urn:schemas-microsoft-com:office:powerpoint" xmlns:com="http://schemas.openxmlformats.org/drawingml/2006/compatibility" xmlns:p15="http://schemas.microsoft.com/office/powerpoint/2012/main" xmlns:ahyp="http://schemas.microsoft.com/office/drawing/2018/hyperlinkcolor">
+    <mc:Fallback xmlns:ahyp="http://schemas.microsoft.com/office/drawing/2018/hyperlinkcolor" xmlns:p15="http://schemas.microsoft.com/office/powerpoint/2012/main" xmlns:com="http://schemas.openxmlformats.org/drawingml/2006/compatibility" xmlns:pvml="urn:schemas-microsoft-com:office:powerpoint" xmlns:v="urn:schemas-microsoft-com:vml" xmlns:o="urn:schemas-microsoft-com:office:office" xmlns:dgm="http://schemas.openxmlformats.org/drawingml/2006/diagram" xmlns:c="http://schemas.openxmlformats.org/drawingml/2006/chart" xmlns:mv="urn:schemas-microsoft-com:mac:vml" xmlns="">
       <p:transition spd="slow">
         <p:fade/>
       </p:transition>
@@ -13175,7 +13749,7 @@
 </p:sld>
 </file>
 
-<file path=ppt/slides/slide16.xml><?xml version="1.0" encoding="utf-8"?>
+<file path=ppt/slides/slide17.xml><?xml version="1.0" encoding="utf-8"?>
 <p:sld xmlns:a="http://schemas.openxmlformats.org/drawingml/2006/main" xmlns:r="http://schemas.openxmlformats.org/officeDocument/2006/relationships" xmlns:p="http://schemas.openxmlformats.org/presentationml/2006/main">
   <p:cSld>
     <p:spTree>
@@ -13842,7 +14416,7 @@
         <p:fade/>
       </p:transition>
     </mc:Choice>
-    <mc:Fallback xmlns="" xmlns:mv="urn:schemas-microsoft-com:mac:vml" xmlns:c="http://schemas.openxmlformats.org/drawingml/2006/chart" xmlns:dgm="http://schemas.openxmlformats.org/drawingml/2006/diagram" xmlns:o="urn:schemas-microsoft-com:office:office" xmlns:v="urn:schemas-microsoft-com:vml" xmlns:pvml="urn:schemas-microsoft-com:office:powerpoint" xmlns:com="http://schemas.openxmlformats.org/drawingml/2006/compatibility" xmlns:p15="http://schemas.microsoft.com/office/powerpoint/2012/main" xmlns:ahyp="http://schemas.microsoft.com/office/drawing/2018/hyperlinkcolor">
+    <mc:Fallback xmlns:ahyp="http://schemas.microsoft.com/office/drawing/2018/hyperlinkcolor" xmlns:p15="http://schemas.microsoft.com/office/powerpoint/2012/main" xmlns:com="http://schemas.openxmlformats.org/drawingml/2006/compatibility" xmlns:pvml="urn:schemas-microsoft-com:office:powerpoint" xmlns:v="urn:schemas-microsoft-com:vml" xmlns:o="urn:schemas-microsoft-com:office:office" xmlns:dgm="http://schemas.openxmlformats.org/drawingml/2006/diagram" xmlns:c="http://schemas.openxmlformats.org/drawingml/2006/chart" xmlns:mv="urn:schemas-microsoft-com:mac:vml" xmlns="">
       <p:transition spd="slow">
         <p:fade/>
       </p:transition>
@@ -13851,7 +14425,7 @@
 </p:sld>
 </file>
 
-<file path=ppt/slides/slide17.xml><?xml version="1.0" encoding="utf-8"?>
+<file path=ppt/slides/slide18.xml><?xml version="1.0" encoding="utf-8"?>
 <p:sld xmlns:a="http://schemas.openxmlformats.org/drawingml/2006/main" xmlns:r="http://schemas.openxmlformats.org/officeDocument/2006/relationships" xmlns:p="http://schemas.openxmlformats.org/presentationml/2006/main">
   <p:cSld>
     <p:spTree>
@@ -13915,7 +14489,7 @@
               <a:buNone/>
             </a:pPr>
             <a:r>
-              <a:rPr lang="en-US" sz="4000" b="1">
+              <a:rPr lang="en-US" sz="4000" b="1" dirty="0" err="1">
                 <a:solidFill>
                   <a:srgbClr val="073763"/>
                 </a:solidFill>
@@ -13926,7 +14500,7 @@
               </a:rPr>
               <a:t>Objetivos</a:t>
             </a:r>
-            <a:endParaRPr sz="4000" b="1">
+            <a:endParaRPr sz="4000" b="1" dirty="0">
               <a:solidFill>
                 <a:srgbClr val="073763"/>
               </a:solidFill>
@@ -14003,6 +14577,26 @@
               </a:buClr>
               <a:buSzPts val="1100"/>
             </a:pPr>
+            <a:endParaRPr lang="en-US" sz="2400" b="1" dirty="0">
+              <a:solidFill>
+                <a:srgbClr val="073763"/>
+              </a:solidFill>
+              <a:latin typeface="Calibri"/>
+              <a:ea typeface="Calibri"/>
+              <a:cs typeface="Calibri"/>
+              <a:sym typeface="Calibri"/>
+            </a:endParaRPr>
+          </a:p>
+          <a:p>
+            <a:pPr lvl="0" indent="-457200" algn="l">
+              <a:lnSpc>
+                <a:spcPct val="200000"/>
+              </a:lnSpc>
+              <a:buClr>
+                <a:schemeClr val="dk1"/>
+              </a:buClr>
+              <a:buSzPts val="1100"/>
+            </a:pPr>
             <a:r>
               <a:rPr lang="en-US" sz="2400" b="1" dirty="0">
                 <a:solidFill>
@@ -14410,7 +15004,7 @@
         <p:fade/>
       </p:transition>
     </mc:Choice>
-    <mc:Fallback xmlns="" xmlns:mv="urn:schemas-microsoft-com:mac:vml" xmlns:c="http://schemas.openxmlformats.org/drawingml/2006/chart" xmlns:dgm="http://schemas.openxmlformats.org/drawingml/2006/diagram" xmlns:o="urn:schemas-microsoft-com:office:office" xmlns:v="urn:schemas-microsoft-com:vml" xmlns:pvml="urn:schemas-microsoft-com:office:powerpoint" xmlns:com="http://schemas.openxmlformats.org/drawingml/2006/compatibility" xmlns:p15="http://schemas.microsoft.com/office/powerpoint/2012/main" xmlns:ahyp="http://schemas.microsoft.com/office/drawing/2018/hyperlinkcolor">
+    <mc:Fallback xmlns:ahyp="http://schemas.microsoft.com/office/drawing/2018/hyperlinkcolor" xmlns:p15="http://schemas.microsoft.com/office/powerpoint/2012/main" xmlns:com="http://schemas.openxmlformats.org/drawingml/2006/compatibility" xmlns:pvml="urn:schemas-microsoft-com:office:powerpoint" xmlns:v="urn:schemas-microsoft-com:vml" xmlns:o="urn:schemas-microsoft-com:office:office" xmlns:dgm="http://schemas.openxmlformats.org/drawingml/2006/diagram" xmlns:c="http://schemas.openxmlformats.org/drawingml/2006/chart" xmlns:mv="urn:schemas-microsoft-com:mac:vml" xmlns="">
       <p:transition spd="slow">
         <p:fade/>
       </p:transition>
@@ -14452,7 +15046,7 @@
                                         <p:tgtEl>
                                           <p:spTgt spid="139">
                                             <p:txEl>
-                                              <p:pRg st="0" end="0"/>
+                                              <p:pRg st="1" end="1"/>
                                             </p:txEl>
                                           </p:spTgt>
                                         </p:tgtEl>
@@ -14501,7 +15095,7 @@
                                         <p:tgtEl>
                                           <p:spTgt spid="139">
                                             <p:txEl>
-                                              <p:pRg st="1" end="1"/>
+                                              <p:pRg st="2" end="2"/>
                                             </p:txEl>
                                           </p:spTgt>
                                         </p:tgtEl>
@@ -14550,7 +15144,7 @@
                                         <p:tgtEl>
                                           <p:spTgt spid="139">
                                             <p:txEl>
-                                              <p:pRg st="2" end="2"/>
+                                              <p:pRg st="3" end="3"/>
                                             </p:txEl>
                                           </p:spTgt>
                                         </p:tgtEl>
@@ -14599,7 +15193,7 @@
                                         <p:tgtEl>
                                           <p:spTgt spid="139">
                                             <p:txEl>
-                                              <p:pRg st="3" end="3"/>
+                                              <p:pRg st="4" end="4"/>
                                             </p:txEl>
                                           </p:spTgt>
                                         </p:tgtEl>
@@ -14645,7 +15239,7 @@
 </p:sld>
 </file>
 
-<file path=ppt/slides/slide18.xml><?xml version="1.0" encoding="utf-8"?>
+<file path=ppt/slides/slide19.xml><?xml version="1.0" encoding="utf-8"?>
 <p:sld xmlns:a="http://schemas.openxmlformats.org/drawingml/2006/main" xmlns:r="http://schemas.openxmlformats.org/officeDocument/2006/relationships" xmlns:p="http://schemas.openxmlformats.org/presentationml/2006/main">
   <p:cSld>
     <p:spTree>
@@ -15312,7 +15906,7 @@
         <p:fade/>
       </p:transition>
     </mc:Choice>
-    <mc:Fallback xmlns="" xmlns:mv="urn:schemas-microsoft-com:mac:vml" xmlns:c="http://schemas.openxmlformats.org/drawingml/2006/chart" xmlns:dgm="http://schemas.openxmlformats.org/drawingml/2006/diagram" xmlns:o="urn:schemas-microsoft-com:office:office" xmlns:v="urn:schemas-microsoft-com:vml" xmlns:pvml="urn:schemas-microsoft-com:office:powerpoint" xmlns:com="http://schemas.openxmlformats.org/drawingml/2006/compatibility" xmlns:p15="http://schemas.microsoft.com/office/powerpoint/2012/main" xmlns:ahyp="http://schemas.microsoft.com/office/drawing/2018/hyperlinkcolor">
+    <mc:Fallback xmlns:ahyp="http://schemas.microsoft.com/office/drawing/2018/hyperlinkcolor" xmlns:p15="http://schemas.microsoft.com/office/powerpoint/2012/main" xmlns:com="http://schemas.openxmlformats.org/drawingml/2006/compatibility" xmlns:pvml="urn:schemas-microsoft-com:office:powerpoint" xmlns:v="urn:schemas-microsoft-com:vml" xmlns:o="urn:schemas-microsoft-com:office:office" xmlns:dgm="http://schemas.openxmlformats.org/drawingml/2006/diagram" xmlns:c="http://schemas.openxmlformats.org/drawingml/2006/chart" xmlns:mv="urn:schemas-microsoft-com:mac:vml" xmlns="">
       <p:transition spd="slow">
         <p:fade/>
       </p:transition>
@@ -15321,7 +15915,408 @@
 </p:sld>
 </file>
 
-<file path=ppt/slides/slide19.xml><?xml version="1.0" encoding="utf-8"?>
+<file path=ppt/slides/slide2.xml><?xml version="1.0" encoding="utf-8"?>
+<p:sld xmlns:a="http://schemas.openxmlformats.org/drawingml/2006/main" xmlns:r="http://schemas.openxmlformats.org/officeDocument/2006/relationships" xmlns:p="http://schemas.openxmlformats.org/presentationml/2006/main">
+  <p:cSld>
+    <p:spTree>
+      <p:nvGrpSpPr>
+        <p:cNvPr id="1" name="Shape 73"/>
+        <p:cNvGrpSpPr/>
+        <p:nvPr/>
+      </p:nvGrpSpPr>
+      <p:grpSpPr>
+        <a:xfrm>
+          <a:off x="0" y="0"/>
+          <a:ext cx="0" cy="0"/>
+          <a:chOff x="0" y="0"/>
+          <a:chExt cx="0" cy="0"/>
+        </a:xfrm>
+      </p:grpSpPr>
+      <p:sp>
+        <p:nvSpPr>
+          <p:cNvPr id="74" name="Google Shape;74;p2"/>
+          <p:cNvSpPr txBox="1">
+            <a:spLocks noGrp="1"/>
+          </p:cNvSpPr>
+          <p:nvPr>
+            <p:ph type="ctrTitle"/>
+          </p:nvPr>
+        </p:nvSpPr>
+        <p:spPr>
+          <a:xfrm>
+            <a:off x="387900" y="3929365"/>
+            <a:ext cx="8520600" cy="543362"/>
+          </a:xfrm>
+          <a:prstGeom prst="rect">
+            <a:avLst/>
+          </a:prstGeom>
+          <a:noFill/>
+          <a:ln>
+            <a:noFill/>
+          </a:ln>
+        </p:spPr>
+        <p:txBody>
+          <a:bodyPr spcFirstLastPara="1" wrap="square" lIns="91425" tIns="91425" rIns="91425" bIns="91425" anchor="ctr" anchorCtr="0">
+            <a:noAutofit/>
+          </a:bodyPr>
+          <a:lstStyle/>
+          <a:p>
+            <a:pPr marL="0" lvl="0" indent="0" algn="l" rtl="0">
+              <a:lnSpc>
+                <a:spcPct val="100000"/>
+              </a:lnSpc>
+              <a:spcBef>
+                <a:spcPts val="0"/>
+              </a:spcBef>
+              <a:spcAft>
+                <a:spcPts val="0"/>
+              </a:spcAft>
+              <a:buClr>
+                <a:schemeClr val="dk1"/>
+              </a:buClr>
+              <a:buSzPts val="1100"/>
+              <a:buFont typeface="Arial"/>
+              <a:buNone/>
+            </a:pPr>
+            <a:r>
+              <a:rPr lang="en-US" sz="2000" dirty="0">
+                <a:solidFill>
+                  <a:srgbClr val="404040"/>
+                </a:solidFill>
+                <a:latin typeface="Century Gothic"/>
+                <a:ea typeface="Century Gothic"/>
+                <a:cs typeface="Century Gothic"/>
+                <a:sym typeface="Century Gothic"/>
+              </a:rPr>
+              <a:t>[Thiago Almeida]</a:t>
+            </a:r>
+            <a:br>
+              <a:rPr lang="en-US" sz="2000" dirty="0">
+                <a:solidFill>
+                  <a:srgbClr val="404040"/>
+                </a:solidFill>
+                <a:latin typeface="Century Gothic"/>
+                <a:ea typeface="Century Gothic"/>
+                <a:cs typeface="Century Gothic"/>
+                <a:sym typeface="Century Gothic"/>
+              </a:rPr>
+            </a:br>
+            <a:r>
+              <a:rPr lang="en-US" sz="1500" dirty="0">
+                <a:solidFill>
+                  <a:srgbClr val="404040"/>
+                </a:solidFill>
+                <a:latin typeface="Century Gothic"/>
+                <a:ea typeface="Century Gothic"/>
+                <a:cs typeface="Century Gothic"/>
+                <a:sym typeface="Century Gothic"/>
+              </a:rPr>
+              <a:t>[Developer ]</a:t>
+            </a:r>
+            <a:endParaRPr sz="1500" dirty="0">
+              <a:solidFill>
+                <a:srgbClr val="404040"/>
+              </a:solidFill>
+              <a:latin typeface="Century Gothic"/>
+              <a:ea typeface="Century Gothic"/>
+              <a:cs typeface="Century Gothic"/>
+              <a:sym typeface="Century Gothic"/>
+            </a:endParaRPr>
+          </a:p>
+        </p:txBody>
+      </p:sp>
+      <p:sp>
+        <p:nvSpPr>
+          <p:cNvPr id="75" name="Google Shape;75;p2"/>
+          <p:cNvSpPr txBox="1">
+            <a:spLocks noGrp="1"/>
+          </p:cNvSpPr>
+          <p:nvPr>
+            <p:ph type="subTitle" idx="1"/>
+          </p:nvPr>
+        </p:nvSpPr>
+        <p:spPr>
+          <a:xfrm>
+            <a:off x="311700" y="1828950"/>
+            <a:ext cx="8520600" cy="1012926"/>
+          </a:xfrm>
+          <a:prstGeom prst="rect">
+            <a:avLst/>
+          </a:prstGeom>
+          <a:noFill/>
+          <a:ln>
+            <a:noFill/>
+          </a:ln>
+        </p:spPr>
+        <p:txBody>
+          <a:bodyPr spcFirstLastPara="1" wrap="square" lIns="91425" tIns="91425" rIns="91425" bIns="91425" anchor="ctr" anchorCtr="0">
+            <a:noAutofit/>
+          </a:bodyPr>
+          <a:lstStyle/>
+          <a:p>
+            <a:pPr marL="0" lvl="0" indent="0" algn="l" rtl="0">
+              <a:lnSpc>
+                <a:spcPct val="100000"/>
+              </a:lnSpc>
+              <a:spcBef>
+                <a:spcPts val="0"/>
+              </a:spcBef>
+              <a:spcAft>
+                <a:spcPts val="0"/>
+              </a:spcAft>
+              <a:buClr>
+                <a:schemeClr val="dk1"/>
+              </a:buClr>
+              <a:buSzPts val="1100"/>
+              <a:buFont typeface="Arial"/>
+              <a:buNone/>
+            </a:pPr>
+            <a:r>
+              <a:rPr lang="pt-BR" sz="4000" dirty="0">
+                <a:solidFill>
+                  <a:srgbClr val="EF8600"/>
+                </a:solidFill>
+                <a:latin typeface="Century Gothic"/>
+                <a:ea typeface="Century Gothic"/>
+                <a:cs typeface="Century Gothic"/>
+                <a:sym typeface="Century Gothic"/>
+              </a:rPr>
+              <a:t>Projeto everis -  Criando uma API REST com .Net Core</a:t>
+            </a:r>
+            <a:endParaRPr sz="4000" dirty="0">
+              <a:solidFill>
+                <a:srgbClr val="EF8600"/>
+              </a:solidFill>
+              <a:latin typeface="Century Gothic"/>
+              <a:ea typeface="Century Gothic"/>
+              <a:cs typeface="Century Gothic"/>
+              <a:sym typeface="Century Gothic"/>
+            </a:endParaRPr>
+          </a:p>
+        </p:txBody>
+      </p:sp>
+      <p:sp>
+        <p:nvSpPr>
+          <p:cNvPr id="76" name="Google Shape;76;p2"/>
+          <p:cNvSpPr/>
+          <p:nvPr/>
+        </p:nvSpPr>
+        <p:spPr>
+          <a:xfrm>
+            <a:off x="465750" y="3872065"/>
+            <a:ext cx="447600" cy="57300"/>
+          </a:xfrm>
+          <a:prstGeom prst="rect">
+            <a:avLst/>
+          </a:prstGeom>
+          <a:solidFill>
+            <a:srgbClr val="F78321"/>
+          </a:solidFill>
+          <a:ln w="9525" cap="flat" cmpd="sng">
+            <a:solidFill>
+              <a:srgbClr val="F78321"/>
+            </a:solidFill>
+            <a:prstDash val="solid"/>
+            <a:round/>
+            <a:headEnd type="none" w="sm" len="sm"/>
+            <a:tailEnd type="none" w="sm" len="sm"/>
+          </a:ln>
+        </p:spPr>
+        <p:txBody>
+          <a:bodyPr spcFirstLastPara="1" wrap="square" lIns="91425" tIns="91425" rIns="91425" bIns="91425" anchor="ctr" anchorCtr="0">
+            <a:noAutofit/>
+          </a:bodyPr>
+          <a:lstStyle/>
+          <a:p>
+            <a:pPr marL="0" marR="0" lvl="0" indent="0" algn="l" rtl="0">
+              <a:lnSpc>
+                <a:spcPct val="100000"/>
+              </a:lnSpc>
+              <a:spcBef>
+                <a:spcPts val="0"/>
+              </a:spcBef>
+              <a:spcAft>
+                <a:spcPts val="0"/>
+              </a:spcAft>
+              <a:buClr>
+                <a:srgbClr val="000000"/>
+              </a:buClr>
+              <a:buSzPts val="1400"/>
+              <a:buFont typeface="Arial"/>
+              <a:buNone/>
+            </a:pPr>
+            <a:endParaRPr sz="1400" b="0" i="0" u="none" strike="noStrike" cap="none">
+              <a:solidFill>
+                <a:srgbClr val="000000"/>
+              </a:solidFill>
+              <a:latin typeface="Arial"/>
+              <a:ea typeface="Arial"/>
+              <a:cs typeface="Arial"/>
+              <a:sym typeface="Arial"/>
+            </a:endParaRPr>
+          </a:p>
+        </p:txBody>
+      </p:sp>
+      <p:sp>
+        <p:nvSpPr>
+          <p:cNvPr id="77" name="Google Shape;77;p2"/>
+          <p:cNvSpPr/>
+          <p:nvPr/>
+        </p:nvSpPr>
+        <p:spPr>
+          <a:xfrm>
+            <a:off x="0" y="4839750"/>
+            <a:ext cx="9144000" cy="303600"/>
+          </a:xfrm>
+          <a:prstGeom prst="rect">
+            <a:avLst/>
+          </a:prstGeom>
+          <a:solidFill>
+            <a:srgbClr val="404040"/>
+          </a:solidFill>
+          <a:ln w="9525" cap="flat" cmpd="sng">
+            <a:solidFill>
+              <a:srgbClr val="404040"/>
+            </a:solidFill>
+            <a:prstDash val="solid"/>
+            <a:round/>
+            <a:headEnd type="none" w="sm" len="sm"/>
+            <a:tailEnd type="none" w="sm" len="sm"/>
+          </a:ln>
+        </p:spPr>
+        <p:txBody>
+          <a:bodyPr spcFirstLastPara="1" wrap="square" lIns="91425" tIns="91425" rIns="91425" bIns="91425" anchor="ctr" anchorCtr="0">
+            <a:noAutofit/>
+          </a:bodyPr>
+          <a:lstStyle/>
+          <a:p>
+            <a:pPr marL="0" marR="0" lvl="0" indent="0" algn="l" rtl="0">
+              <a:lnSpc>
+                <a:spcPct val="100000"/>
+              </a:lnSpc>
+              <a:spcBef>
+                <a:spcPts val="0"/>
+              </a:spcBef>
+              <a:spcAft>
+                <a:spcPts val="0"/>
+              </a:spcAft>
+              <a:buClr>
+                <a:srgbClr val="000000"/>
+              </a:buClr>
+              <a:buSzPts val="1400"/>
+              <a:buFont typeface="Arial"/>
+              <a:buNone/>
+            </a:pPr>
+            <a:endParaRPr sz="1400" b="0" i="0" u="none" strike="noStrike" cap="none">
+              <a:solidFill>
+                <a:srgbClr val="000000"/>
+              </a:solidFill>
+              <a:latin typeface="Arial"/>
+              <a:ea typeface="Arial"/>
+              <a:cs typeface="Arial"/>
+              <a:sym typeface="Arial"/>
+            </a:endParaRPr>
+          </a:p>
+        </p:txBody>
+      </p:sp>
+      <p:sp>
+        <p:nvSpPr>
+          <p:cNvPr id="78" name="Google Shape;78;p2"/>
+          <p:cNvSpPr/>
+          <p:nvPr/>
+        </p:nvSpPr>
+        <p:spPr>
+          <a:xfrm>
+            <a:off x="0" y="0"/>
+            <a:ext cx="9144000" cy="57300"/>
+          </a:xfrm>
+          <a:prstGeom prst="rect">
+            <a:avLst/>
+          </a:prstGeom>
+          <a:solidFill>
+            <a:srgbClr val="F78321"/>
+          </a:solidFill>
+          <a:ln w="9525" cap="flat" cmpd="sng">
+            <a:solidFill>
+              <a:srgbClr val="F78321"/>
+            </a:solidFill>
+            <a:prstDash val="solid"/>
+            <a:round/>
+            <a:headEnd type="none" w="sm" len="sm"/>
+            <a:tailEnd type="none" w="sm" len="sm"/>
+          </a:ln>
+        </p:spPr>
+        <p:txBody>
+          <a:bodyPr spcFirstLastPara="1" wrap="square" lIns="91425" tIns="91425" rIns="91425" bIns="91425" anchor="ctr" anchorCtr="0">
+            <a:noAutofit/>
+          </a:bodyPr>
+          <a:lstStyle/>
+          <a:p>
+            <a:pPr marL="0" marR="0" lvl="0" indent="0" algn="l" rtl="0">
+              <a:lnSpc>
+                <a:spcPct val="100000"/>
+              </a:lnSpc>
+              <a:spcBef>
+                <a:spcPts val="0"/>
+              </a:spcBef>
+              <a:spcAft>
+                <a:spcPts val="0"/>
+              </a:spcAft>
+              <a:buClr>
+                <a:srgbClr val="000000"/>
+              </a:buClr>
+              <a:buSzPts val="1400"/>
+              <a:buFont typeface="Arial"/>
+              <a:buNone/>
+            </a:pPr>
+            <a:endParaRPr sz="1400" b="0" i="0" u="none" strike="noStrike" cap="none">
+              <a:solidFill>
+                <a:srgbClr val="000000"/>
+              </a:solidFill>
+              <a:latin typeface="Arial"/>
+              <a:ea typeface="Arial"/>
+              <a:cs typeface="Arial"/>
+              <a:sym typeface="Arial"/>
+            </a:endParaRPr>
+          </a:p>
+        </p:txBody>
+      </p:sp>
+      <p:pic>
+        <p:nvPicPr>
+          <p:cNvPr id="79" name="Google Shape;79;p2"/>
+          <p:cNvPicPr preferRelativeResize="0"/>
+          <p:nvPr/>
+        </p:nvPicPr>
+        <p:blipFill rotWithShape="1">
+          <a:blip r:embed="rId3">
+            <a:alphaModFix/>
+          </a:blip>
+          <a:srcRect/>
+          <a:stretch/>
+        </p:blipFill>
+        <p:spPr>
+          <a:xfrm>
+            <a:off x="311700" y="243014"/>
+            <a:ext cx="1698849" cy="591351"/>
+          </a:xfrm>
+          <a:prstGeom prst="rect">
+            <a:avLst/>
+          </a:prstGeom>
+          <a:noFill/>
+          <a:ln>
+            <a:noFill/>
+          </a:ln>
+        </p:spPr>
+      </p:pic>
+    </p:spTree>
+  </p:cSld>
+  <p:clrMapOvr>
+    <a:masterClrMapping/>
+  </p:clrMapOvr>
+</p:sld>
+</file>
+
+<file path=ppt/slides/slide20.xml><?xml version="1.0" encoding="utf-8"?>
 <p:sld xmlns:a="http://schemas.openxmlformats.org/drawingml/2006/main" xmlns:r="http://schemas.openxmlformats.org/officeDocument/2006/relationships" xmlns:p="http://schemas.openxmlformats.org/presentationml/2006/main">
   <p:cSld>
     <p:spTree>
@@ -15447,8 +16442,8 @@
         </p:nvSpPr>
         <p:spPr>
           <a:xfrm>
-            <a:off x="311700" y="1333492"/>
-            <a:ext cx="8148732" cy="2966450"/>
+            <a:off x="311700" y="1032628"/>
+            <a:ext cx="8148732" cy="2367248"/>
           </a:xfrm>
           <a:prstGeom prst="rect">
             <a:avLst/>
@@ -15798,7 +16793,7 @@
         <p:fade/>
       </p:transition>
     </mc:Choice>
-    <mc:Fallback xmlns="" xmlns:mv="urn:schemas-microsoft-com:mac:vml" xmlns:c="http://schemas.openxmlformats.org/drawingml/2006/chart" xmlns:dgm="http://schemas.openxmlformats.org/drawingml/2006/diagram" xmlns:o="urn:schemas-microsoft-com:office:office" xmlns:v="urn:schemas-microsoft-com:vml" xmlns:pvml="urn:schemas-microsoft-com:office:powerpoint" xmlns:com="http://schemas.openxmlformats.org/drawingml/2006/compatibility" xmlns:p15="http://schemas.microsoft.com/office/powerpoint/2012/main" xmlns:ahyp="http://schemas.microsoft.com/office/drawing/2018/hyperlinkcolor">
+    <mc:Fallback xmlns:ahyp="http://schemas.microsoft.com/office/drawing/2018/hyperlinkcolor" xmlns:p15="http://schemas.microsoft.com/office/powerpoint/2012/main" xmlns:com="http://schemas.openxmlformats.org/drawingml/2006/compatibility" xmlns:pvml="urn:schemas-microsoft-com:office:powerpoint" xmlns:v="urn:schemas-microsoft-com:vml" xmlns:o="urn:schemas-microsoft-com:office:office" xmlns:dgm="http://schemas.openxmlformats.org/drawingml/2006/diagram" xmlns:c="http://schemas.openxmlformats.org/drawingml/2006/chart" xmlns:mv="urn:schemas-microsoft-com:mac:vml" xmlns="">
       <p:transition spd="slow">
         <p:fade/>
       </p:transition>
@@ -15984,408 +16979,7 @@
 </p:sld>
 </file>
 
-<file path=ppt/slides/slide2.xml><?xml version="1.0" encoding="utf-8"?>
-<p:sld xmlns:a="http://schemas.openxmlformats.org/drawingml/2006/main" xmlns:r="http://schemas.openxmlformats.org/officeDocument/2006/relationships" xmlns:p="http://schemas.openxmlformats.org/presentationml/2006/main">
-  <p:cSld>
-    <p:spTree>
-      <p:nvGrpSpPr>
-        <p:cNvPr id="1" name="Shape 73"/>
-        <p:cNvGrpSpPr/>
-        <p:nvPr/>
-      </p:nvGrpSpPr>
-      <p:grpSpPr>
-        <a:xfrm>
-          <a:off x="0" y="0"/>
-          <a:ext cx="0" cy="0"/>
-          <a:chOff x="0" y="0"/>
-          <a:chExt cx="0" cy="0"/>
-        </a:xfrm>
-      </p:grpSpPr>
-      <p:sp>
-        <p:nvSpPr>
-          <p:cNvPr id="74" name="Google Shape;74;p2"/>
-          <p:cNvSpPr txBox="1">
-            <a:spLocks noGrp="1"/>
-          </p:cNvSpPr>
-          <p:nvPr>
-            <p:ph type="ctrTitle"/>
-          </p:nvPr>
-        </p:nvSpPr>
-        <p:spPr>
-          <a:xfrm>
-            <a:off x="387900" y="3929365"/>
-            <a:ext cx="8520600" cy="543362"/>
-          </a:xfrm>
-          <a:prstGeom prst="rect">
-            <a:avLst/>
-          </a:prstGeom>
-          <a:noFill/>
-          <a:ln>
-            <a:noFill/>
-          </a:ln>
-        </p:spPr>
-        <p:txBody>
-          <a:bodyPr spcFirstLastPara="1" wrap="square" lIns="91425" tIns="91425" rIns="91425" bIns="91425" anchor="ctr" anchorCtr="0">
-            <a:noAutofit/>
-          </a:bodyPr>
-          <a:lstStyle/>
-          <a:p>
-            <a:pPr marL="0" lvl="0" indent="0" algn="l" rtl="0">
-              <a:lnSpc>
-                <a:spcPct val="100000"/>
-              </a:lnSpc>
-              <a:spcBef>
-                <a:spcPts val="0"/>
-              </a:spcBef>
-              <a:spcAft>
-                <a:spcPts val="0"/>
-              </a:spcAft>
-              <a:buClr>
-                <a:schemeClr val="dk1"/>
-              </a:buClr>
-              <a:buSzPts val="1100"/>
-              <a:buFont typeface="Arial"/>
-              <a:buNone/>
-            </a:pPr>
-            <a:r>
-              <a:rPr lang="en-US" sz="2000" dirty="0">
-                <a:solidFill>
-                  <a:srgbClr val="404040"/>
-                </a:solidFill>
-                <a:latin typeface="Century Gothic"/>
-                <a:ea typeface="Century Gothic"/>
-                <a:cs typeface="Century Gothic"/>
-                <a:sym typeface="Century Gothic"/>
-              </a:rPr>
-              <a:t>[Thiago Almeida]</a:t>
-            </a:r>
-            <a:br>
-              <a:rPr lang="en-US" sz="2000" dirty="0">
-                <a:solidFill>
-                  <a:srgbClr val="404040"/>
-                </a:solidFill>
-                <a:latin typeface="Century Gothic"/>
-                <a:ea typeface="Century Gothic"/>
-                <a:cs typeface="Century Gothic"/>
-                <a:sym typeface="Century Gothic"/>
-              </a:rPr>
-            </a:br>
-            <a:r>
-              <a:rPr lang="en-US" sz="1500" dirty="0">
-                <a:solidFill>
-                  <a:srgbClr val="404040"/>
-                </a:solidFill>
-                <a:latin typeface="Century Gothic"/>
-                <a:ea typeface="Century Gothic"/>
-                <a:cs typeface="Century Gothic"/>
-                <a:sym typeface="Century Gothic"/>
-              </a:rPr>
-              <a:t>[Developer ]</a:t>
-            </a:r>
-            <a:endParaRPr sz="1500" dirty="0">
-              <a:solidFill>
-                <a:srgbClr val="404040"/>
-              </a:solidFill>
-              <a:latin typeface="Century Gothic"/>
-              <a:ea typeface="Century Gothic"/>
-              <a:cs typeface="Century Gothic"/>
-              <a:sym typeface="Century Gothic"/>
-            </a:endParaRPr>
-          </a:p>
-        </p:txBody>
-      </p:sp>
-      <p:sp>
-        <p:nvSpPr>
-          <p:cNvPr id="75" name="Google Shape;75;p2"/>
-          <p:cNvSpPr txBox="1">
-            <a:spLocks noGrp="1"/>
-          </p:cNvSpPr>
-          <p:nvPr>
-            <p:ph type="subTitle" idx="1"/>
-          </p:nvPr>
-        </p:nvSpPr>
-        <p:spPr>
-          <a:xfrm>
-            <a:off x="311700" y="1828950"/>
-            <a:ext cx="8520600" cy="1012926"/>
-          </a:xfrm>
-          <a:prstGeom prst="rect">
-            <a:avLst/>
-          </a:prstGeom>
-          <a:noFill/>
-          <a:ln>
-            <a:noFill/>
-          </a:ln>
-        </p:spPr>
-        <p:txBody>
-          <a:bodyPr spcFirstLastPara="1" wrap="square" lIns="91425" tIns="91425" rIns="91425" bIns="91425" anchor="ctr" anchorCtr="0">
-            <a:noAutofit/>
-          </a:bodyPr>
-          <a:lstStyle/>
-          <a:p>
-            <a:pPr marL="0" lvl="0" indent="0" algn="l" rtl="0">
-              <a:lnSpc>
-                <a:spcPct val="100000"/>
-              </a:lnSpc>
-              <a:spcBef>
-                <a:spcPts val="0"/>
-              </a:spcBef>
-              <a:spcAft>
-                <a:spcPts val="0"/>
-              </a:spcAft>
-              <a:buClr>
-                <a:schemeClr val="dk1"/>
-              </a:buClr>
-              <a:buSzPts val="1100"/>
-              <a:buFont typeface="Arial"/>
-              <a:buNone/>
-            </a:pPr>
-            <a:r>
-              <a:rPr lang="pt-BR" sz="4000" dirty="0">
-                <a:solidFill>
-                  <a:srgbClr val="EF8600"/>
-                </a:solidFill>
-                <a:latin typeface="Century Gothic"/>
-                <a:ea typeface="Century Gothic"/>
-                <a:cs typeface="Century Gothic"/>
-                <a:sym typeface="Century Gothic"/>
-              </a:rPr>
-              <a:t>Projeto everis -  Criando uma API REST com .Net Core</a:t>
-            </a:r>
-            <a:endParaRPr sz="4000" dirty="0">
-              <a:solidFill>
-                <a:srgbClr val="EF8600"/>
-              </a:solidFill>
-              <a:latin typeface="Century Gothic"/>
-              <a:ea typeface="Century Gothic"/>
-              <a:cs typeface="Century Gothic"/>
-              <a:sym typeface="Century Gothic"/>
-            </a:endParaRPr>
-          </a:p>
-        </p:txBody>
-      </p:sp>
-      <p:sp>
-        <p:nvSpPr>
-          <p:cNvPr id="76" name="Google Shape;76;p2"/>
-          <p:cNvSpPr/>
-          <p:nvPr/>
-        </p:nvSpPr>
-        <p:spPr>
-          <a:xfrm>
-            <a:off x="465750" y="3872065"/>
-            <a:ext cx="447600" cy="57300"/>
-          </a:xfrm>
-          <a:prstGeom prst="rect">
-            <a:avLst/>
-          </a:prstGeom>
-          <a:solidFill>
-            <a:srgbClr val="F78321"/>
-          </a:solidFill>
-          <a:ln w="9525" cap="flat" cmpd="sng">
-            <a:solidFill>
-              <a:srgbClr val="F78321"/>
-            </a:solidFill>
-            <a:prstDash val="solid"/>
-            <a:round/>
-            <a:headEnd type="none" w="sm" len="sm"/>
-            <a:tailEnd type="none" w="sm" len="sm"/>
-          </a:ln>
-        </p:spPr>
-        <p:txBody>
-          <a:bodyPr spcFirstLastPara="1" wrap="square" lIns="91425" tIns="91425" rIns="91425" bIns="91425" anchor="ctr" anchorCtr="0">
-            <a:noAutofit/>
-          </a:bodyPr>
-          <a:lstStyle/>
-          <a:p>
-            <a:pPr marL="0" marR="0" lvl="0" indent="0" algn="l" rtl="0">
-              <a:lnSpc>
-                <a:spcPct val="100000"/>
-              </a:lnSpc>
-              <a:spcBef>
-                <a:spcPts val="0"/>
-              </a:spcBef>
-              <a:spcAft>
-                <a:spcPts val="0"/>
-              </a:spcAft>
-              <a:buClr>
-                <a:srgbClr val="000000"/>
-              </a:buClr>
-              <a:buSzPts val="1400"/>
-              <a:buFont typeface="Arial"/>
-              <a:buNone/>
-            </a:pPr>
-            <a:endParaRPr sz="1400" b="0" i="0" u="none" strike="noStrike" cap="none">
-              <a:solidFill>
-                <a:srgbClr val="000000"/>
-              </a:solidFill>
-              <a:latin typeface="Arial"/>
-              <a:ea typeface="Arial"/>
-              <a:cs typeface="Arial"/>
-              <a:sym typeface="Arial"/>
-            </a:endParaRPr>
-          </a:p>
-        </p:txBody>
-      </p:sp>
-      <p:sp>
-        <p:nvSpPr>
-          <p:cNvPr id="77" name="Google Shape;77;p2"/>
-          <p:cNvSpPr/>
-          <p:nvPr/>
-        </p:nvSpPr>
-        <p:spPr>
-          <a:xfrm>
-            <a:off x="0" y="4839750"/>
-            <a:ext cx="9144000" cy="303600"/>
-          </a:xfrm>
-          <a:prstGeom prst="rect">
-            <a:avLst/>
-          </a:prstGeom>
-          <a:solidFill>
-            <a:srgbClr val="404040"/>
-          </a:solidFill>
-          <a:ln w="9525" cap="flat" cmpd="sng">
-            <a:solidFill>
-              <a:srgbClr val="404040"/>
-            </a:solidFill>
-            <a:prstDash val="solid"/>
-            <a:round/>
-            <a:headEnd type="none" w="sm" len="sm"/>
-            <a:tailEnd type="none" w="sm" len="sm"/>
-          </a:ln>
-        </p:spPr>
-        <p:txBody>
-          <a:bodyPr spcFirstLastPara="1" wrap="square" lIns="91425" tIns="91425" rIns="91425" bIns="91425" anchor="ctr" anchorCtr="0">
-            <a:noAutofit/>
-          </a:bodyPr>
-          <a:lstStyle/>
-          <a:p>
-            <a:pPr marL="0" marR="0" lvl="0" indent="0" algn="l" rtl="0">
-              <a:lnSpc>
-                <a:spcPct val="100000"/>
-              </a:lnSpc>
-              <a:spcBef>
-                <a:spcPts val="0"/>
-              </a:spcBef>
-              <a:spcAft>
-                <a:spcPts val="0"/>
-              </a:spcAft>
-              <a:buClr>
-                <a:srgbClr val="000000"/>
-              </a:buClr>
-              <a:buSzPts val="1400"/>
-              <a:buFont typeface="Arial"/>
-              <a:buNone/>
-            </a:pPr>
-            <a:endParaRPr sz="1400" b="0" i="0" u="none" strike="noStrike" cap="none">
-              <a:solidFill>
-                <a:srgbClr val="000000"/>
-              </a:solidFill>
-              <a:latin typeface="Arial"/>
-              <a:ea typeface="Arial"/>
-              <a:cs typeface="Arial"/>
-              <a:sym typeface="Arial"/>
-            </a:endParaRPr>
-          </a:p>
-        </p:txBody>
-      </p:sp>
-      <p:sp>
-        <p:nvSpPr>
-          <p:cNvPr id="78" name="Google Shape;78;p2"/>
-          <p:cNvSpPr/>
-          <p:nvPr/>
-        </p:nvSpPr>
-        <p:spPr>
-          <a:xfrm>
-            <a:off x="0" y="0"/>
-            <a:ext cx="9144000" cy="57300"/>
-          </a:xfrm>
-          <a:prstGeom prst="rect">
-            <a:avLst/>
-          </a:prstGeom>
-          <a:solidFill>
-            <a:srgbClr val="F78321"/>
-          </a:solidFill>
-          <a:ln w="9525" cap="flat" cmpd="sng">
-            <a:solidFill>
-              <a:srgbClr val="F78321"/>
-            </a:solidFill>
-            <a:prstDash val="solid"/>
-            <a:round/>
-            <a:headEnd type="none" w="sm" len="sm"/>
-            <a:tailEnd type="none" w="sm" len="sm"/>
-          </a:ln>
-        </p:spPr>
-        <p:txBody>
-          <a:bodyPr spcFirstLastPara="1" wrap="square" lIns="91425" tIns="91425" rIns="91425" bIns="91425" anchor="ctr" anchorCtr="0">
-            <a:noAutofit/>
-          </a:bodyPr>
-          <a:lstStyle/>
-          <a:p>
-            <a:pPr marL="0" marR="0" lvl="0" indent="0" algn="l" rtl="0">
-              <a:lnSpc>
-                <a:spcPct val="100000"/>
-              </a:lnSpc>
-              <a:spcBef>
-                <a:spcPts val="0"/>
-              </a:spcBef>
-              <a:spcAft>
-                <a:spcPts val="0"/>
-              </a:spcAft>
-              <a:buClr>
-                <a:srgbClr val="000000"/>
-              </a:buClr>
-              <a:buSzPts val="1400"/>
-              <a:buFont typeface="Arial"/>
-              <a:buNone/>
-            </a:pPr>
-            <a:endParaRPr sz="1400" b="0" i="0" u="none" strike="noStrike" cap="none">
-              <a:solidFill>
-                <a:srgbClr val="000000"/>
-              </a:solidFill>
-              <a:latin typeface="Arial"/>
-              <a:ea typeface="Arial"/>
-              <a:cs typeface="Arial"/>
-              <a:sym typeface="Arial"/>
-            </a:endParaRPr>
-          </a:p>
-        </p:txBody>
-      </p:sp>
-      <p:pic>
-        <p:nvPicPr>
-          <p:cNvPr id="79" name="Google Shape;79;p2"/>
-          <p:cNvPicPr preferRelativeResize="0"/>
-          <p:nvPr/>
-        </p:nvPicPr>
-        <p:blipFill rotWithShape="1">
-          <a:blip r:embed="rId3">
-            <a:alphaModFix/>
-          </a:blip>
-          <a:srcRect/>
-          <a:stretch/>
-        </p:blipFill>
-        <p:spPr>
-          <a:xfrm>
-            <a:off x="311700" y="243014"/>
-            <a:ext cx="1698849" cy="591351"/>
-          </a:xfrm>
-          <a:prstGeom prst="rect">
-            <a:avLst/>
-          </a:prstGeom>
-          <a:noFill/>
-          <a:ln>
-            <a:noFill/>
-          </a:ln>
-        </p:spPr>
-      </p:pic>
-    </p:spTree>
-  </p:cSld>
-  <p:clrMapOvr>
-    <a:masterClrMapping/>
-  </p:clrMapOvr>
-</p:sld>
-</file>
-
-<file path=ppt/slides/slide20.xml><?xml version="1.0" encoding="utf-8"?>
+<file path=ppt/slides/slide21.xml><?xml version="1.0" encoding="utf-8"?>
 <p:sld xmlns:a="http://schemas.openxmlformats.org/drawingml/2006/main" xmlns:r="http://schemas.openxmlformats.org/officeDocument/2006/relationships" xmlns:p="http://schemas.openxmlformats.org/presentationml/2006/main">
   <p:cSld>
     <p:spTree>
@@ -16824,13 +17418,13 @@
   <p:clrMapOvr>
     <a:masterClrMapping/>
   </p:clrMapOvr>
-  <mc:AlternateContent xmlns:mc="http://schemas.openxmlformats.org/markup-compatibility/2006">
-    <mc:Choice xmlns:p14="http://schemas.microsoft.com/office/powerpoint/2010/main" Requires="p14">
+  <mc:AlternateContent xmlns:mc="http://schemas.openxmlformats.org/markup-compatibility/2006" xmlns:p14="http://schemas.microsoft.com/office/powerpoint/2010/main">
+    <mc:Choice Requires="p14">
       <p:transition spd="med" p14:dur="700">
         <p:fade/>
       </p:transition>
     </mc:Choice>
-    <mc:Fallback>
+    <mc:Fallback xmlns="">
       <p:transition spd="med">
         <p:fade/>
       </p:transition>
@@ -17065,7 +17659,7 @@
 </p:sld>
 </file>
 
-<file path=ppt/slides/slide21.xml><?xml version="1.0" encoding="utf-8"?>
+<file path=ppt/slides/slide22.xml><?xml version="1.0" encoding="utf-8"?>
 <p:sld xmlns:a="http://schemas.openxmlformats.org/drawingml/2006/main" xmlns:r="http://schemas.openxmlformats.org/officeDocument/2006/relationships" xmlns:p="http://schemas.openxmlformats.org/presentationml/2006/main">
   <p:cSld>
     <p:spTree>
@@ -17752,7 +18346,7 @@
         <p:fade/>
       </p:transition>
     </mc:Choice>
-    <mc:Fallback xmlns="" xmlns:mv="urn:schemas-microsoft-com:mac:vml" xmlns:c="http://schemas.openxmlformats.org/drawingml/2006/chart" xmlns:dgm="http://schemas.openxmlformats.org/drawingml/2006/diagram" xmlns:o="urn:schemas-microsoft-com:office:office" xmlns:v="urn:schemas-microsoft-com:vml" xmlns:pvml="urn:schemas-microsoft-com:office:powerpoint" xmlns:com="http://schemas.openxmlformats.org/drawingml/2006/compatibility" xmlns:p15="http://schemas.microsoft.com/office/powerpoint/2012/main" xmlns:ahyp="http://schemas.microsoft.com/office/drawing/2018/hyperlinkcolor">
+    <mc:Fallback xmlns:ahyp="http://schemas.microsoft.com/office/drawing/2018/hyperlinkcolor" xmlns:p15="http://schemas.microsoft.com/office/powerpoint/2012/main" xmlns:com="http://schemas.openxmlformats.org/drawingml/2006/compatibility" xmlns:pvml="urn:schemas-microsoft-com:office:powerpoint" xmlns:v="urn:schemas-microsoft-com:vml" xmlns:o="urn:schemas-microsoft-com:office:office" xmlns:dgm="http://schemas.openxmlformats.org/drawingml/2006/diagram" xmlns:c="http://schemas.openxmlformats.org/drawingml/2006/chart" xmlns:mv="urn:schemas-microsoft-com:mac:vml" xmlns="">
       <p:transition spd="slow">
         <p:fade/>
       </p:transition>
@@ -17978,7 +18572,7 @@
               <a:buChar char="●"/>
             </a:pPr>
             <a:r>
-              <a:rPr lang="en-US" sz="1800" dirty="0" err="1">
+              <a:rPr lang="pt-BR" sz="1600" dirty="0">
                 <a:solidFill>
                   <a:srgbClr val="073763"/>
                 </a:solidFill>
@@ -17987,10 +18581,10 @@
                 <a:cs typeface="Calibri"/>
                 <a:sym typeface="Calibri"/>
               </a:rPr>
-              <a:t>Desenvolvimento</a:t>
+              <a:t>Desenvolvimento de Sistemas Web (.NET, PHP, Angular, </a:t>
             </a:r>
             <a:r>
-              <a:rPr lang="en-US" sz="1800" dirty="0">
+              <a:rPr lang="pt-BR" sz="1600" dirty="0" err="1">
                 <a:solidFill>
                   <a:srgbClr val="073763"/>
                 </a:solidFill>
@@ -17999,10 +18593,10 @@
                 <a:cs typeface="Calibri"/>
                 <a:sym typeface="Calibri"/>
               </a:rPr>
-              <a:t> de </a:t>
+              <a:t>Vue</a:t>
             </a:r>
             <a:r>
-              <a:rPr lang="en-US" sz="1800" dirty="0" err="1">
+              <a:rPr lang="pt-BR" sz="1600" dirty="0">
                 <a:solidFill>
                   <a:srgbClr val="073763"/>
                 </a:solidFill>
@@ -18011,21 +18605,9 @@
                 <a:cs typeface="Calibri"/>
                 <a:sym typeface="Calibri"/>
               </a:rPr>
-              <a:t>Sistemas</a:t>
+              <a:t>)</a:t>
             </a:r>
-            <a:r>
-              <a:rPr lang="en-US" sz="1800" dirty="0">
-                <a:solidFill>
-                  <a:srgbClr val="073763"/>
-                </a:solidFill>
-                <a:latin typeface="Calibri"/>
-                <a:ea typeface="Calibri"/>
-                <a:cs typeface="Calibri"/>
-                <a:sym typeface="Calibri"/>
-              </a:rPr>
-              <a:t> Web (.NET, PHP, Angular, Vue)</a:t>
-            </a:r>
-            <a:endParaRPr sz="1800" dirty="0">
+            <a:endParaRPr lang="pt-BR" sz="1600" dirty="0">
               <a:latin typeface="Calibri"/>
               <a:ea typeface="Calibri"/>
               <a:cs typeface="Calibri"/>
@@ -18051,7 +18633,7 @@
               <a:buChar char="●"/>
             </a:pPr>
             <a:r>
-              <a:rPr lang="en-US" sz="1800" dirty="0">
+              <a:rPr lang="pt-BR" sz="1600" dirty="0">
                 <a:solidFill>
                   <a:srgbClr val="073763"/>
                 </a:solidFill>
@@ -18060,69 +18642,9 @@
                 <a:cs typeface="Calibri"/>
                 <a:sym typeface="Calibri"/>
               </a:rPr>
-              <a:t>Técnico de </a:t>
+              <a:t>Técnico de Informática, Análise de Sistemas</a:t>
             </a:r>
-            <a:r>
-              <a:rPr lang="en-US" sz="1800" dirty="0" err="1">
-                <a:solidFill>
-                  <a:srgbClr val="073763"/>
-                </a:solidFill>
-                <a:latin typeface="Calibri"/>
-                <a:ea typeface="Calibri"/>
-                <a:cs typeface="Calibri"/>
-                <a:sym typeface="Calibri"/>
-              </a:rPr>
-              <a:t>Informática</a:t>
-            </a:r>
-            <a:r>
-              <a:rPr lang="en-US" sz="1800" dirty="0">
-                <a:solidFill>
-                  <a:srgbClr val="073763"/>
-                </a:solidFill>
-                <a:latin typeface="Calibri"/>
-                <a:ea typeface="Calibri"/>
-                <a:cs typeface="Calibri"/>
-                <a:sym typeface="Calibri"/>
-              </a:rPr>
-              <a:t>, </a:t>
-            </a:r>
-            <a:r>
-              <a:rPr lang="en-US" sz="1800" dirty="0" err="1">
-                <a:solidFill>
-                  <a:srgbClr val="073763"/>
-                </a:solidFill>
-                <a:latin typeface="Calibri"/>
-                <a:ea typeface="Calibri"/>
-                <a:cs typeface="Calibri"/>
-                <a:sym typeface="Calibri"/>
-              </a:rPr>
-              <a:t>Análise</a:t>
-            </a:r>
-            <a:r>
-              <a:rPr lang="en-US" sz="1800" dirty="0">
-                <a:solidFill>
-                  <a:srgbClr val="073763"/>
-                </a:solidFill>
-                <a:latin typeface="Calibri"/>
-                <a:ea typeface="Calibri"/>
-                <a:cs typeface="Calibri"/>
-                <a:sym typeface="Calibri"/>
-              </a:rPr>
-              <a:t> de </a:t>
-            </a:r>
-            <a:r>
-              <a:rPr lang="en-US" sz="1800" dirty="0" err="1">
-                <a:solidFill>
-                  <a:srgbClr val="073763"/>
-                </a:solidFill>
-                <a:latin typeface="Calibri"/>
-                <a:ea typeface="Calibri"/>
-                <a:cs typeface="Calibri"/>
-                <a:sym typeface="Calibri"/>
-              </a:rPr>
-              <a:t>Sistemas</a:t>
-            </a:r>
-            <a:endParaRPr sz="1800" dirty="0">
+            <a:endParaRPr lang="pt-BR" sz="1600" dirty="0">
               <a:latin typeface="Calibri"/>
               <a:ea typeface="Calibri"/>
               <a:cs typeface="Calibri"/>
@@ -18148,7 +18670,7 @@
               <a:buChar char="●"/>
             </a:pPr>
             <a:r>
-              <a:rPr lang="en-US" sz="1800" dirty="0" err="1">
+              <a:rPr lang="pt-BR" sz="1600" dirty="0">
                 <a:solidFill>
                   <a:srgbClr val="073763"/>
                 </a:solidFill>
@@ -18157,117 +18679,9 @@
                 <a:cs typeface="Calibri"/>
                 <a:sym typeface="Calibri"/>
               </a:rPr>
-              <a:t>Gosto</a:t>
+              <a:t>Gosto de desafios e melhores práticas de desenvolvimento.</a:t>
             </a:r>
-            <a:r>
-              <a:rPr lang="en-US" sz="1800" dirty="0">
-                <a:solidFill>
-                  <a:srgbClr val="073763"/>
-                </a:solidFill>
-                <a:latin typeface="Calibri"/>
-                <a:ea typeface="Calibri"/>
-                <a:cs typeface="Calibri"/>
-                <a:sym typeface="Calibri"/>
-              </a:rPr>
-              <a:t> de </a:t>
-            </a:r>
-            <a:r>
-              <a:rPr lang="en-US" sz="1800" dirty="0" err="1">
-                <a:solidFill>
-                  <a:srgbClr val="073763"/>
-                </a:solidFill>
-                <a:latin typeface="Calibri"/>
-                <a:ea typeface="Calibri"/>
-                <a:cs typeface="Calibri"/>
-                <a:sym typeface="Calibri"/>
-              </a:rPr>
-              <a:t>desafios</a:t>
-            </a:r>
-            <a:r>
-              <a:rPr lang="en-US" sz="1800" dirty="0">
-                <a:solidFill>
-                  <a:srgbClr val="073763"/>
-                </a:solidFill>
-                <a:latin typeface="Calibri"/>
-                <a:ea typeface="Calibri"/>
-                <a:cs typeface="Calibri"/>
-                <a:sym typeface="Calibri"/>
-              </a:rPr>
-              <a:t> e </a:t>
-            </a:r>
-            <a:r>
-              <a:rPr lang="en-US" sz="1800" dirty="0" err="1">
-                <a:solidFill>
-                  <a:srgbClr val="073763"/>
-                </a:solidFill>
-                <a:latin typeface="Calibri"/>
-                <a:ea typeface="Calibri"/>
-                <a:cs typeface="Calibri"/>
-                <a:sym typeface="Calibri"/>
-              </a:rPr>
-              <a:t>melhores</a:t>
-            </a:r>
-            <a:r>
-              <a:rPr lang="en-US" sz="1800" dirty="0">
-                <a:solidFill>
-                  <a:srgbClr val="073763"/>
-                </a:solidFill>
-                <a:latin typeface="Calibri"/>
-                <a:ea typeface="Calibri"/>
-                <a:cs typeface="Calibri"/>
-                <a:sym typeface="Calibri"/>
-              </a:rPr>
-              <a:t> </a:t>
-            </a:r>
-            <a:r>
-              <a:rPr lang="en-US" sz="1800" dirty="0" err="1">
-                <a:solidFill>
-                  <a:srgbClr val="073763"/>
-                </a:solidFill>
-                <a:latin typeface="Calibri"/>
-                <a:ea typeface="Calibri"/>
-                <a:cs typeface="Calibri"/>
-                <a:sym typeface="Calibri"/>
-              </a:rPr>
-              <a:t>práticas</a:t>
-            </a:r>
-            <a:r>
-              <a:rPr lang="en-US" sz="1800" dirty="0">
-                <a:solidFill>
-                  <a:srgbClr val="073763"/>
-                </a:solidFill>
-                <a:latin typeface="Calibri"/>
-                <a:ea typeface="Calibri"/>
-                <a:cs typeface="Calibri"/>
-                <a:sym typeface="Calibri"/>
-              </a:rPr>
-              <a:t> de </a:t>
-            </a:r>
-            <a:r>
-              <a:rPr lang="en-US" sz="1800" dirty="0" err="1">
-                <a:solidFill>
-                  <a:srgbClr val="073763"/>
-                </a:solidFill>
-                <a:latin typeface="Calibri"/>
-                <a:ea typeface="Calibri"/>
-                <a:cs typeface="Calibri"/>
-                <a:sym typeface="Calibri"/>
-              </a:rPr>
-              <a:t>desenvolvimento</a:t>
-            </a:r>
-            <a:r>
-              <a:rPr lang="en-US" sz="1800" dirty="0">
-                <a:solidFill>
-                  <a:srgbClr val="073763"/>
-                </a:solidFill>
-                <a:latin typeface="Calibri"/>
-                <a:ea typeface="Calibri"/>
-                <a:cs typeface="Calibri"/>
-                <a:sym typeface="Calibri"/>
-              </a:rPr>
-              <a:t>.</a:t>
-            </a:r>
-            <a:endParaRPr sz="1800" dirty="0">
+            <a:endParaRPr lang="pt-BR" sz="1600" dirty="0">
               <a:latin typeface="Calibri"/>
               <a:ea typeface="Calibri"/>
               <a:cs typeface="Calibri"/>
@@ -18293,7 +18707,7 @@
               <a:buChar char="●"/>
             </a:pPr>
             <a:r>
-              <a:rPr lang="en-US" sz="1800" dirty="0" err="1">
+              <a:rPr lang="pt-BR" sz="1600" dirty="0">
                 <a:solidFill>
                   <a:srgbClr val="073763"/>
                 </a:solidFill>
@@ -18302,10 +18716,10 @@
                 <a:cs typeface="Calibri"/>
                 <a:sym typeface="Calibri"/>
               </a:rPr>
-              <a:t>Trabalho</a:t>
+              <a:t>Trabalho há 10 anos na área (Sistemas de Conselho Federal, Eventos e Shows, Algodoeira, ERP, </a:t>
             </a:r>
             <a:r>
-              <a:rPr lang="en-US" sz="1800" dirty="0">
+              <a:rPr lang="pt-BR" sz="1600" dirty="0" err="1">
                 <a:solidFill>
                   <a:srgbClr val="073763"/>
                 </a:solidFill>
@@ -18314,10 +18728,10 @@
                 <a:cs typeface="Calibri"/>
                 <a:sym typeface="Calibri"/>
               </a:rPr>
-              <a:t> </a:t>
+              <a:t>etc</a:t>
             </a:r>
             <a:r>
-              <a:rPr lang="en-US" sz="1800" dirty="0" err="1">
+              <a:rPr lang="pt-BR" sz="1600" dirty="0">
                 <a:solidFill>
                   <a:srgbClr val="073763"/>
                 </a:solidFill>
@@ -18326,81 +18740,9 @@
                 <a:cs typeface="Calibri"/>
                 <a:sym typeface="Calibri"/>
               </a:rPr>
-              <a:t>há</a:t>
+              <a:t>)</a:t>
             </a:r>
-            <a:r>
-              <a:rPr lang="en-US" sz="1800" dirty="0">
-                <a:solidFill>
-                  <a:srgbClr val="073763"/>
-                </a:solidFill>
-                <a:latin typeface="Calibri"/>
-                <a:ea typeface="Calibri"/>
-                <a:cs typeface="Calibri"/>
-                <a:sym typeface="Calibri"/>
-              </a:rPr>
-              <a:t> 10 </a:t>
-            </a:r>
-            <a:r>
-              <a:rPr lang="en-US" sz="1800" dirty="0" err="1">
-                <a:solidFill>
-                  <a:srgbClr val="073763"/>
-                </a:solidFill>
-                <a:latin typeface="Calibri"/>
-                <a:ea typeface="Calibri"/>
-                <a:cs typeface="Calibri"/>
-                <a:sym typeface="Calibri"/>
-              </a:rPr>
-              <a:t>anos</a:t>
-            </a:r>
-            <a:r>
-              <a:rPr lang="en-US" sz="1800" dirty="0">
-                <a:solidFill>
-                  <a:srgbClr val="073763"/>
-                </a:solidFill>
-                <a:latin typeface="Calibri"/>
-                <a:ea typeface="Calibri"/>
-                <a:cs typeface="Calibri"/>
-                <a:sym typeface="Calibri"/>
-              </a:rPr>
-              <a:t> </a:t>
-            </a:r>
-            <a:r>
-              <a:rPr lang="en-US" sz="1800" dirty="0" err="1">
-                <a:solidFill>
-                  <a:srgbClr val="073763"/>
-                </a:solidFill>
-                <a:latin typeface="Calibri"/>
-                <a:ea typeface="Calibri"/>
-                <a:cs typeface="Calibri"/>
-                <a:sym typeface="Calibri"/>
-              </a:rPr>
-              <a:t>na</a:t>
-            </a:r>
-            <a:r>
-              <a:rPr lang="en-US" sz="1800" dirty="0">
-                <a:solidFill>
-                  <a:srgbClr val="073763"/>
-                </a:solidFill>
-                <a:latin typeface="Calibri"/>
-                <a:ea typeface="Calibri"/>
-                <a:cs typeface="Calibri"/>
-                <a:sym typeface="Calibri"/>
-              </a:rPr>
-              <a:t> </a:t>
-            </a:r>
-            <a:r>
-              <a:rPr lang="en-US" sz="1800" dirty="0" err="1">
-                <a:solidFill>
-                  <a:srgbClr val="073763"/>
-                </a:solidFill>
-                <a:latin typeface="Calibri"/>
-                <a:ea typeface="Calibri"/>
-                <a:cs typeface="Calibri"/>
-                <a:sym typeface="Calibri"/>
-              </a:rPr>
-              <a:t>área</a:t>
-            </a:r>
-            <a:endParaRPr sz="1800" dirty="0">
+            <a:endParaRPr lang="pt-BR" sz="1600" dirty="0">
               <a:latin typeface="Calibri"/>
               <a:ea typeface="Calibri"/>
               <a:cs typeface="Calibri"/>
@@ -18426,7 +18768,7 @@
               <a:buChar char="●"/>
             </a:pPr>
             <a:r>
-              <a:rPr lang="en-US" sz="1800" dirty="0">
+              <a:rPr lang="pt-BR" sz="1600" dirty="0">
                 <a:solidFill>
                   <a:srgbClr val="073763"/>
                 </a:solidFill>
@@ -18435,226 +18777,10 @@
                 <a:cs typeface="Calibri"/>
                 <a:sym typeface="Calibri"/>
               </a:rPr>
-              <a:t>Amo </a:t>
+              <a:t>Amo jogar, atividades físicas diárias, ouvir Heavy Metal, curso de inglês e bebam água </a:t>
             </a:r>
             <a:r>
-              <a:rPr lang="en-US" sz="1800" dirty="0" err="1">
-                <a:solidFill>
-                  <a:srgbClr val="073763"/>
-                </a:solidFill>
-                <a:latin typeface="Calibri"/>
-                <a:ea typeface="Calibri"/>
-                <a:cs typeface="Calibri"/>
-                <a:sym typeface="Calibri"/>
-              </a:rPr>
-              <a:t>jogar</a:t>
-            </a:r>
-            <a:r>
-              <a:rPr lang="en-US" sz="1800" dirty="0">
-                <a:solidFill>
-                  <a:srgbClr val="073763"/>
-                </a:solidFill>
-                <a:latin typeface="Calibri"/>
-                <a:ea typeface="Calibri"/>
-                <a:cs typeface="Calibri"/>
-                <a:sym typeface="Calibri"/>
-              </a:rPr>
-              <a:t>, </a:t>
-            </a:r>
-            <a:r>
-              <a:rPr lang="en-US" sz="1800" dirty="0" err="1">
-                <a:solidFill>
-                  <a:srgbClr val="073763"/>
-                </a:solidFill>
-                <a:latin typeface="Calibri"/>
-                <a:ea typeface="Calibri"/>
-                <a:cs typeface="Calibri"/>
-                <a:sym typeface="Calibri"/>
-              </a:rPr>
-              <a:t>atividades</a:t>
-            </a:r>
-            <a:r>
-              <a:rPr lang="en-US" sz="1800" dirty="0">
-                <a:solidFill>
-                  <a:srgbClr val="073763"/>
-                </a:solidFill>
-                <a:latin typeface="Calibri"/>
-                <a:ea typeface="Calibri"/>
-                <a:cs typeface="Calibri"/>
-                <a:sym typeface="Calibri"/>
-              </a:rPr>
-              <a:t> </a:t>
-            </a:r>
-            <a:r>
-              <a:rPr lang="en-US" sz="1800" dirty="0" err="1">
-                <a:solidFill>
-                  <a:srgbClr val="073763"/>
-                </a:solidFill>
-                <a:latin typeface="Calibri"/>
-                <a:ea typeface="Calibri"/>
-                <a:cs typeface="Calibri"/>
-                <a:sym typeface="Calibri"/>
-              </a:rPr>
-              <a:t>físicas</a:t>
-            </a:r>
-            <a:r>
-              <a:rPr lang="en-US" sz="1800" dirty="0">
-                <a:solidFill>
-                  <a:srgbClr val="073763"/>
-                </a:solidFill>
-                <a:latin typeface="Calibri"/>
-                <a:ea typeface="Calibri"/>
-                <a:cs typeface="Calibri"/>
-                <a:sym typeface="Calibri"/>
-              </a:rPr>
-              <a:t> </a:t>
-            </a:r>
-            <a:r>
-              <a:rPr lang="en-US" sz="1800" dirty="0" err="1">
-                <a:solidFill>
-                  <a:srgbClr val="073763"/>
-                </a:solidFill>
-                <a:latin typeface="Calibri"/>
-                <a:ea typeface="Calibri"/>
-                <a:cs typeface="Calibri"/>
-                <a:sym typeface="Calibri"/>
-              </a:rPr>
-              <a:t>diárias</a:t>
-            </a:r>
-            <a:r>
-              <a:rPr lang="en-US" sz="1800" dirty="0">
-                <a:solidFill>
-                  <a:srgbClr val="073763"/>
-                </a:solidFill>
-                <a:latin typeface="Calibri"/>
-                <a:ea typeface="Calibri"/>
-                <a:cs typeface="Calibri"/>
-                <a:sym typeface="Calibri"/>
-              </a:rPr>
-              <a:t>, </a:t>
-            </a:r>
-            <a:r>
-              <a:rPr lang="en-US" sz="1800" dirty="0" err="1">
-                <a:solidFill>
-                  <a:srgbClr val="073763"/>
-                </a:solidFill>
-                <a:latin typeface="Calibri"/>
-                <a:ea typeface="Calibri"/>
-                <a:cs typeface="Calibri"/>
-                <a:sym typeface="Calibri"/>
-              </a:rPr>
-              <a:t>ouvir</a:t>
-            </a:r>
-            <a:r>
-              <a:rPr lang="en-US" sz="1800" dirty="0">
-                <a:solidFill>
-                  <a:srgbClr val="073763"/>
-                </a:solidFill>
-                <a:latin typeface="Calibri"/>
-                <a:ea typeface="Calibri"/>
-                <a:cs typeface="Calibri"/>
-                <a:sym typeface="Calibri"/>
-              </a:rPr>
-              <a:t> Heavy Metal, </a:t>
-            </a:r>
-            <a:r>
-              <a:rPr lang="en-US" sz="1800" dirty="0" err="1">
-                <a:solidFill>
-                  <a:srgbClr val="073763"/>
-                </a:solidFill>
-                <a:latin typeface="Calibri"/>
-                <a:ea typeface="Calibri"/>
-                <a:cs typeface="Calibri"/>
-                <a:sym typeface="Calibri"/>
-              </a:rPr>
-              <a:t>curso</a:t>
-            </a:r>
-            <a:r>
-              <a:rPr lang="en-US" sz="1800" dirty="0">
-                <a:solidFill>
-                  <a:srgbClr val="073763"/>
-                </a:solidFill>
-                <a:latin typeface="Calibri"/>
-                <a:ea typeface="Calibri"/>
-                <a:cs typeface="Calibri"/>
-                <a:sym typeface="Calibri"/>
-              </a:rPr>
-              <a:t> de </a:t>
-            </a:r>
-            <a:r>
-              <a:rPr lang="en-US" sz="1800" dirty="0" err="1">
-                <a:solidFill>
-                  <a:srgbClr val="073763"/>
-                </a:solidFill>
-                <a:latin typeface="Calibri"/>
-                <a:ea typeface="Calibri"/>
-                <a:cs typeface="Calibri"/>
-                <a:sym typeface="Calibri"/>
-              </a:rPr>
-              <a:t>inglês</a:t>
-            </a:r>
-            <a:r>
-              <a:rPr lang="en-US" sz="1800" dirty="0">
-                <a:solidFill>
-                  <a:srgbClr val="073763"/>
-                </a:solidFill>
-                <a:latin typeface="Calibri"/>
-                <a:ea typeface="Calibri"/>
-                <a:cs typeface="Calibri"/>
-                <a:sym typeface="Calibri"/>
-              </a:rPr>
-              <a:t> e </a:t>
-            </a:r>
-            <a:r>
-              <a:rPr lang="en-US" sz="1800" dirty="0" err="1">
-                <a:solidFill>
-                  <a:srgbClr val="073763"/>
-                </a:solidFill>
-                <a:latin typeface="Calibri"/>
-                <a:ea typeface="Calibri"/>
-                <a:cs typeface="Calibri"/>
-                <a:sym typeface="Calibri"/>
-              </a:rPr>
-              <a:t>bebam</a:t>
-            </a:r>
-            <a:r>
-              <a:rPr lang="en-US" sz="1800" dirty="0">
-                <a:solidFill>
-                  <a:srgbClr val="073763"/>
-                </a:solidFill>
-                <a:latin typeface="Calibri"/>
-                <a:ea typeface="Calibri"/>
-                <a:cs typeface="Calibri"/>
-                <a:sym typeface="Calibri"/>
-              </a:rPr>
-              <a:t> </a:t>
-            </a:r>
-            <a:r>
-              <a:rPr lang="en-US" sz="1800" dirty="0" err="1">
-                <a:solidFill>
-                  <a:srgbClr val="073763"/>
-                </a:solidFill>
-                <a:latin typeface="Calibri"/>
-                <a:ea typeface="Calibri"/>
-                <a:cs typeface="Calibri"/>
-                <a:sym typeface="Calibri"/>
-              </a:rPr>
-              <a:t>água</a:t>
-            </a:r>
-            <a:r>
-              <a:rPr lang="en-US" sz="1800" dirty="0">
-                <a:solidFill>
-                  <a:srgbClr val="073763"/>
-                </a:solidFill>
-                <a:latin typeface="Calibri"/>
-                <a:ea typeface="Calibri"/>
-                <a:cs typeface="Calibri"/>
-                <a:sym typeface="Calibri"/>
-              </a:rPr>
-              <a:t> </a:t>
-            </a:r>
-            <a:r>
-              <a:rPr lang="en-US" sz="1800" dirty="0">
+              <a:rPr lang="pt-BR" sz="1600" dirty="0">
                 <a:solidFill>
                   <a:srgbClr val="073763"/>
                 </a:solidFill>
@@ -18832,7 +18958,7 @@
         <p:fade/>
       </p:transition>
     </mc:Choice>
-    <mc:Fallback xmlns="" xmlns:mv="urn:schemas-microsoft-com:mac:vml" xmlns:c="http://schemas.openxmlformats.org/drawingml/2006/chart" xmlns:dgm="http://schemas.openxmlformats.org/drawingml/2006/diagram" xmlns:o="urn:schemas-microsoft-com:office:office" xmlns:v="urn:schemas-microsoft-com:vml" xmlns:pvml="urn:schemas-microsoft-com:office:powerpoint" xmlns:com="http://schemas.openxmlformats.org/drawingml/2006/compatibility" xmlns:p15="http://schemas.microsoft.com/office/powerpoint/2012/main" xmlns:ahyp="http://schemas.microsoft.com/office/drawing/2018/hyperlinkcolor">
+    <mc:Fallback xmlns:ahyp="http://schemas.microsoft.com/office/drawing/2018/hyperlinkcolor" xmlns:p15="http://schemas.microsoft.com/office/powerpoint/2012/main" xmlns:com="http://schemas.openxmlformats.org/drawingml/2006/compatibility" xmlns:pvml="urn:schemas-microsoft-com:office:powerpoint" xmlns:v="urn:schemas-microsoft-com:vml" xmlns:o="urn:schemas-microsoft-com:office:office" xmlns:dgm="http://schemas.openxmlformats.org/drawingml/2006/diagram" xmlns:c="http://schemas.openxmlformats.org/drawingml/2006/chart" xmlns:mv="urn:schemas-microsoft-com:mac:vml" xmlns="">
       <p:transition spd="slow">
         <p:fade/>
       </p:transition>
@@ -19188,7 +19314,7 @@
               <a:buNone/>
             </a:pPr>
             <a:r>
-              <a:rPr lang="en-US" sz="4000" b="1" dirty="0" err="1">
+              <a:rPr lang="en-US" sz="4000" b="1">
                 <a:solidFill>
                   <a:srgbClr val="073763"/>
                 </a:solidFill>
@@ -19199,7 +19325,7 @@
               </a:rPr>
               <a:t>Desafio</a:t>
             </a:r>
-            <a:endParaRPr sz="4000" b="1" dirty="0">
+            <a:endParaRPr lang="en-US" sz="4000" b="1" dirty="0">
               <a:solidFill>
                 <a:srgbClr val="073763"/>
               </a:solidFill>
@@ -19284,7 +19410,7 @@
               <a:buNone/>
             </a:pPr>
             <a:r>
-              <a:rPr lang="en-US" dirty="0" err="1">
+              <a:rPr lang="pt-BR" dirty="0">
                 <a:solidFill>
                   <a:srgbClr val="073763"/>
                 </a:solidFill>
@@ -19293,10 +19419,10 @@
                 <a:cs typeface="Calibri"/>
                 <a:sym typeface="Calibri"/>
               </a:rPr>
-              <a:t>Desenvolvimento</a:t>
+              <a:t>Desenvolvimento de projeto </a:t>
             </a:r>
             <a:r>
-              <a:rPr lang="en-US" dirty="0">
+              <a:rPr lang="pt-BR" dirty="0" err="1">
                 <a:solidFill>
                   <a:srgbClr val="073763"/>
                 </a:solidFill>
@@ -19305,10 +19431,10 @@
                 <a:cs typeface="Calibri"/>
                 <a:sym typeface="Calibri"/>
               </a:rPr>
-              <a:t> de </a:t>
+              <a:t>EverisStore</a:t>
             </a:r>
             <a:r>
-              <a:rPr lang="en-US" dirty="0" err="1">
+              <a:rPr lang="pt-BR" dirty="0">
                 <a:solidFill>
                   <a:srgbClr val="073763"/>
                 </a:solidFill>
@@ -19317,10 +19443,10 @@
                 <a:cs typeface="Calibri"/>
                 <a:sym typeface="Calibri"/>
               </a:rPr>
-              <a:t>projeto</a:t>
+              <a:t>, referente a um modelo de E-commerce, utilizando Web API Core com .NET 5.x e software de </a:t>
             </a:r>
             <a:r>
-              <a:rPr lang="en-US" dirty="0">
+              <a:rPr lang="pt-BR" dirty="0" err="1">
                 <a:solidFill>
                   <a:srgbClr val="073763"/>
                 </a:solidFill>
@@ -19329,10 +19455,10 @@
                 <a:cs typeface="Calibri"/>
                 <a:sym typeface="Calibri"/>
               </a:rPr>
-              <a:t> </a:t>
+              <a:t>Rest</a:t>
             </a:r>
             <a:r>
-              <a:rPr lang="en-US" dirty="0" err="1">
+              <a:rPr lang="pt-BR" dirty="0">
                 <a:solidFill>
                   <a:srgbClr val="073763"/>
                 </a:solidFill>
@@ -19341,10 +19467,10 @@
                 <a:cs typeface="Calibri"/>
                 <a:sym typeface="Calibri"/>
               </a:rPr>
-              <a:t>everisStore</a:t>
+              <a:t> API do </a:t>
             </a:r>
             <a:r>
-              <a:rPr lang="en-US" dirty="0">
+              <a:rPr lang="pt-BR" dirty="0" err="1">
                 <a:solidFill>
                   <a:srgbClr val="073763"/>
                 </a:solidFill>
@@ -19353,10 +19479,10 @@
                 <a:cs typeface="Calibri"/>
                 <a:sym typeface="Calibri"/>
               </a:rPr>
-              <a:t>, </a:t>
+              <a:t>Postman</a:t>
             </a:r>
             <a:r>
-              <a:rPr lang="en-US" dirty="0" err="1">
+              <a:rPr lang="pt-BR" dirty="0">
                 <a:solidFill>
                   <a:srgbClr val="073763"/>
                 </a:solidFill>
@@ -19365,101 +19491,8 @@
                 <a:cs typeface="Calibri"/>
                 <a:sym typeface="Calibri"/>
               </a:rPr>
-              <a:t>referente</a:t>
+              <a:t>.</a:t>
             </a:r>
-            <a:r>
-              <a:rPr lang="en-US" dirty="0">
-                <a:solidFill>
-                  <a:srgbClr val="073763"/>
-                </a:solidFill>
-                <a:latin typeface="Calibri"/>
-                <a:ea typeface="Calibri"/>
-                <a:cs typeface="Calibri"/>
-                <a:sym typeface="Calibri"/>
-              </a:rPr>
-              <a:t> a um </a:t>
-            </a:r>
-            <a:r>
-              <a:rPr lang="en-US" dirty="0" err="1">
-                <a:solidFill>
-                  <a:srgbClr val="073763"/>
-                </a:solidFill>
-                <a:latin typeface="Calibri"/>
-                <a:ea typeface="Calibri"/>
-                <a:cs typeface="Calibri"/>
-                <a:sym typeface="Calibri"/>
-              </a:rPr>
-              <a:t>modelo</a:t>
-            </a:r>
-            <a:r>
-              <a:rPr lang="en-US" dirty="0">
-                <a:solidFill>
-                  <a:srgbClr val="073763"/>
-                </a:solidFill>
-                <a:latin typeface="Calibri"/>
-                <a:ea typeface="Calibri"/>
-                <a:cs typeface="Calibri"/>
-                <a:sym typeface="Calibri"/>
-              </a:rPr>
-              <a:t> de E-commerce, </a:t>
-            </a:r>
-            <a:r>
-              <a:rPr lang="en-US" dirty="0" err="1">
-                <a:solidFill>
-                  <a:srgbClr val="073763"/>
-                </a:solidFill>
-                <a:latin typeface="Calibri"/>
-                <a:ea typeface="Calibri"/>
-                <a:cs typeface="Calibri"/>
-                <a:sym typeface="Calibri"/>
-              </a:rPr>
-              <a:t>utilizando</a:t>
-            </a:r>
-            <a:r>
-              <a:rPr lang="en-US" dirty="0">
-                <a:solidFill>
-                  <a:srgbClr val="073763"/>
-                </a:solidFill>
-                <a:latin typeface="Calibri"/>
-                <a:ea typeface="Calibri"/>
-                <a:cs typeface="Calibri"/>
-                <a:sym typeface="Calibri"/>
-              </a:rPr>
-              <a:t> API Core </a:t>
-            </a:r>
-            <a:r>
-              <a:rPr lang="en-US" dirty="0" err="1">
-                <a:solidFill>
-                  <a:srgbClr val="073763"/>
-                </a:solidFill>
-                <a:latin typeface="Calibri"/>
-                <a:ea typeface="Calibri"/>
-                <a:cs typeface="Calibri"/>
-                <a:sym typeface="Calibri"/>
-              </a:rPr>
-              <a:t>utilizando</a:t>
-            </a:r>
-            <a:r>
-              <a:rPr lang="en-US" dirty="0">
-                <a:solidFill>
-                  <a:srgbClr val="073763"/>
-                </a:solidFill>
-                <a:latin typeface="Calibri"/>
-                <a:ea typeface="Calibri"/>
-                <a:cs typeface="Calibri"/>
-                <a:sym typeface="Calibri"/>
-              </a:rPr>
-              <a:t> .NET 5.x e software de Rest API do Postman.</a:t>
-            </a:r>
-            <a:endParaRPr dirty="0">
-              <a:solidFill>
-                <a:srgbClr val="073763"/>
-              </a:solidFill>
-              <a:latin typeface="Calibri"/>
-              <a:ea typeface="Calibri"/>
-              <a:cs typeface="Calibri"/>
-              <a:sym typeface="Calibri"/>
-            </a:endParaRPr>
           </a:p>
         </p:txBody>
       </p:sp>
@@ -19536,7 +19569,7 @@
         <p:fade/>
       </p:transition>
     </mc:Choice>
-    <mc:Fallback xmlns="" xmlns:mv="urn:schemas-microsoft-com:mac:vml" xmlns:c="http://schemas.openxmlformats.org/drawingml/2006/chart" xmlns:dgm="http://schemas.openxmlformats.org/drawingml/2006/diagram" xmlns:o="urn:schemas-microsoft-com:office:office" xmlns:v="urn:schemas-microsoft-com:vml" xmlns:pvml="urn:schemas-microsoft-com:office:powerpoint" xmlns:com="http://schemas.openxmlformats.org/drawingml/2006/compatibility" xmlns:p15="http://schemas.microsoft.com/office/powerpoint/2012/main" xmlns:ahyp="http://schemas.microsoft.com/office/drawing/2018/hyperlinkcolor">
+    <mc:Fallback xmlns:ahyp="http://schemas.microsoft.com/office/drawing/2018/hyperlinkcolor" xmlns:p15="http://schemas.microsoft.com/office/powerpoint/2012/main" xmlns:com="http://schemas.openxmlformats.org/drawingml/2006/compatibility" xmlns:pvml="urn:schemas-microsoft-com:office:powerpoint" xmlns:v="urn:schemas-microsoft-com:vml" xmlns:o="urn:schemas-microsoft-com:office:office" xmlns:dgm="http://schemas.openxmlformats.org/drawingml/2006/diagram" xmlns:c="http://schemas.openxmlformats.org/drawingml/2006/chart" xmlns:mv="urn:schemas-microsoft-com:mac:vml" xmlns="">
       <p:transition spd="slow">
         <p:fade/>
       </p:transition>
@@ -19753,6 +19786,345 @@
                 <a:cs typeface="Century Gothic"/>
                 <a:sym typeface="Century Gothic"/>
               </a:rPr>
+              <a:t> API Rest</a:t>
+            </a:r>
+            <a:endParaRPr sz="4000" b="1" dirty="0">
+              <a:solidFill>
+                <a:srgbClr val="073763"/>
+              </a:solidFill>
+              <a:latin typeface="Century Gothic"/>
+              <a:ea typeface="Century Gothic"/>
+              <a:cs typeface="Century Gothic"/>
+              <a:sym typeface="Century Gothic"/>
+            </a:endParaRPr>
+          </a:p>
+        </p:txBody>
+      </p:sp>
+      <p:pic>
+        <p:nvPicPr>
+          <p:cNvPr id="93" name="Google Shape;93;p3"/>
+          <p:cNvPicPr preferRelativeResize="0"/>
+          <p:nvPr/>
+        </p:nvPicPr>
+        <p:blipFill rotWithShape="1">
+          <a:blip r:embed="rId3">
+            <a:alphaModFix/>
+          </a:blip>
+          <a:srcRect/>
+          <a:stretch/>
+        </p:blipFill>
+        <p:spPr>
+          <a:xfrm>
+            <a:off x="311700" y="243014"/>
+            <a:ext cx="1698849" cy="591351"/>
+          </a:xfrm>
+          <a:prstGeom prst="rect">
+            <a:avLst/>
+          </a:prstGeom>
+          <a:noFill/>
+          <a:ln>
+            <a:noFill/>
+          </a:ln>
+        </p:spPr>
+      </p:pic>
+      <p:sp>
+        <p:nvSpPr>
+          <p:cNvPr id="95" name="Google Shape;95;p3"/>
+          <p:cNvSpPr/>
+          <p:nvPr/>
+        </p:nvSpPr>
+        <p:spPr>
+          <a:xfrm>
+            <a:off x="0" y="5077717"/>
+            <a:ext cx="9144000" cy="57300"/>
+          </a:xfrm>
+          <a:prstGeom prst="rect">
+            <a:avLst/>
+          </a:prstGeom>
+          <a:solidFill>
+            <a:srgbClr val="F78321"/>
+          </a:solidFill>
+          <a:ln w="9525" cap="flat" cmpd="sng">
+            <a:solidFill>
+              <a:srgbClr val="F78321"/>
+            </a:solidFill>
+            <a:prstDash val="solid"/>
+            <a:round/>
+            <a:headEnd type="none" w="sm" len="sm"/>
+            <a:tailEnd type="none" w="sm" len="sm"/>
+          </a:ln>
+        </p:spPr>
+        <p:txBody>
+          <a:bodyPr spcFirstLastPara="1" wrap="square" lIns="91425" tIns="91425" rIns="91425" bIns="91425" anchor="ctr" anchorCtr="0">
+            <a:noAutofit/>
+          </a:bodyPr>
+          <a:lstStyle/>
+          <a:p>
+            <a:pPr marL="0" marR="0" lvl="0" indent="0" algn="l" rtl="0">
+              <a:lnSpc>
+                <a:spcPct val="100000"/>
+              </a:lnSpc>
+              <a:spcBef>
+                <a:spcPts val="0"/>
+              </a:spcBef>
+              <a:spcAft>
+                <a:spcPts val="0"/>
+              </a:spcAft>
+              <a:buClr>
+                <a:srgbClr val="000000"/>
+              </a:buClr>
+              <a:buSzPts val="1400"/>
+              <a:buFont typeface="Arial"/>
+              <a:buNone/>
+            </a:pPr>
+            <a:endParaRPr sz="1400" b="0" i="0" u="none" strike="noStrike" cap="none">
+              <a:solidFill>
+                <a:srgbClr val="000000"/>
+              </a:solidFill>
+              <a:latin typeface="Arial"/>
+              <a:ea typeface="Arial"/>
+              <a:cs typeface="Arial"/>
+              <a:sym typeface="Arial"/>
+            </a:endParaRPr>
+          </a:p>
+        </p:txBody>
+      </p:sp>
+      <p:sp>
+        <p:nvSpPr>
+          <p:cNvPr id="2" name="TextBox 1">
+            <a:extLst>
+              <a:ext uri="{FF2B5EF4-FFF2-40B4-BE49-F238E27FC236}">
+                <a16:creationId xmlns:a16="http://schemas.microsoft.com/office/drawing/2014/main" id="{97A4FD57-0768-4D78-92E9-BFB2F59C419D}"/>
+              </a:ext>
+            </a:extLst>
+          </p:cNvPr>
+          <p:cNvSpPr txBox="1"/>
+          <p:nvPr/>
+        </p:nvSpPr>
+        <p:spPr>
+          <a:xfrm>
+            <a:off x="403123" y="1667680"/>
+            <a:ext cx="8347587" cy="1384995"/>
+          </a:xfrm>
+          <a:prstGeom prst="rect">
+            <a:avLst/>
+          </a:prstGeom>
+          <a:noFill/>
+        </p:spPr>
+        <p:txBody>
+          <a:bodyPr wrap="square" rtlCol="0">
+            <a:spAutoFit/>
+          </a:bodyPr>
+          <a:lstStyle/>
+          <a:p>
+            <a:r>
+              <a:rPr lang="pt-BR" sz="2800" b="0" i="0" dirty="0">
+                <a:solidFill>
+                  <a:srgbClr val="333333"/>
+                </a:solidFill>
+                <a:effectLst/>
+                <a:latin typeface="Roboto" panose="020B0604020202020204" pitchFamily="2" charset="0"/>
+              </a:rPr>
+              <a:t>O acrônimo </a:t>
+            </a:r>
+            <a:r>
+              <a:rPr lang="pt-BR" sz="2800" b="1" i="0" dirty="0">
+                <a:solidFill>
+                  <a:srgbClr val="333333"/>
+                </a:solidFill>
+                <a:effectLst/>
+                <a:latin typeface="Roboto" panose="020B0604020202020204" pitchFamily="2" charset="0"/>
+              </a:rPr>
+              <a:t>API</a:t>
+            </a:r>
+            <a:r>
+              <a:rPr lang="pt-BR" sz="2800" b="0" i="0" dirty="0">
+                <a:solidFill>
+                  <a:srgbClr val="333333"/>
+                </a:solidFill>
+                <a:effectLst/>
+                <a:latin typeface="Roboto" panose="020B0604020202020204" pitchFamily="2" charset="0"/>
+              </a:rPr>
+              <a:t> que provém do inglês </a:t>
+            </a:r>
+            <a:r>
+              <a:rPr lang="pt-BR" sz="2800" b="1" i="1" dirty="0">
+                <a:solidFill>
+                  <a:srgbClr val="333333"/>
+                </a:solidFill>
+                <a:effectLst/>
+                <a:latin typeface="Roboto" panose="020B0604020202020204" pitchFamily="2" charset="0"/>
+              </a:rPr>
+              <a:t>Application Programming Interface</a:t>
+            </a:r>
+            <a:r>
+              <a:rPr lang="pt-BR" sz="2800" b="0" i="0" dirty="0">
+                <a:solidFill>
+                  <a:srgbClr val="333333"/>
+                </a:solidFill>
+                <a:effectLst/>
+                <a:latin typeface="Roboto" panose="020B0604020202020204" pitchFamily="2" charset="0"/>
+              </a:rPr>
+              <a:t> (Em português, significa Interface de Programação de Aplicações)</a:t>
+            </a:r>
+            <a:endParaRPr lang="en-US" sz="2800" dirty="0"/>
+          </a:p>
+        </p:txBody>
+      </p:sp>
+    </p:spTree>
+    <p:extLst>
+      <p:ext uri="{BB962C8B-B14F-4D97-AF65-F5344CB8AC3E}">
+        <p14:creationId xmlns:p14="http://schemas.microsoft.com/office/powerpoint/2010/main" val="1280265048"/>
+      </p:ext>
+    </p:extLst>
+  </p:cSld>
+  <p:clrMapOvr>
+    <a:masterClrMapping/>
+  </p:clrMapOvr>
+  <mc:AlternateContent xmlns:mc="http://schemas.openxmlformats.org/markup-compatibility/2006" xmlns:p14="http://schemas.microsoft.com/office/powerpoint/2010/main">
+    <mc:Choice Requires="p14">
+      <p:transition spd="med" p14:dur="700">
+        <p:fade/>
+      </p:transition>
+    </mc:Choice>
+    <mc:Fallback xmlns="">
+      <p:transition spd="med">
+        <p:fade/>
+      </p:transition>
+    </mc:Fallback>
+  </mc:AlternateContent>
+</p:sld>
+</file>
+
+<file path=ppt/slides/slide6.xml><?xml version="1.0" encoding="utf-8"?>
+<p:sld xmlns:a="http://schemas.openxmlformats.org/drawingml/2006/main" xmlns:r="http://schemas.openxmlformats.org/officeDocument/2006/relationships" xmlns:p="http://schemas.openxmlformats.org/presentationml/2006/main">
+  <p:cSld>
+    <p:bg>
+      <p:bgPr>
+        <a:solidFill>
+          <a:srgbClr val="FFFFFF"/>
+        </a:solidFill>
+        <a:effectLst/>
+      </p:bgPr>
+    </p:bg>
+    <p:spTree>
+      <p:nvGrpSpPr>
+        <p:cNvPr id="1" name="Shape 91"/>
+        <p:cNvGrpSpPr/>
+        <p:nvPr/>
+      </p:nvGrpSpPr>
+      <p:grpSpPr>
+        <a:xfrm>
+          <a:off x="0" y="0"/>
+          <a:ext cx="0" cy="0"/>
+          <a:chOff x="0" y="0"/>
+          <a:chExt cx="0" cy="0"/>
+        </a:xfrm>
+      </p:grpSpPr>
+      <p:sp>
+        <p:nvSpPr>
+          <p:cNvPr id="92" name="Google Shape;92;p3"/>
+          <p:cNvSpPr txBox="1">
+            <a:spLocks noGrp="1"/>
+          </p:cNvSpPr>
+          <p:nvPr>
+            <p:ph type="subTitle" idx="1"/>
+          </p:nvPr>
+        </p:nvSpPr>
+        <p:spPr>
+          <a:xfrm>
+            <a:off x="1270000" y="305700"/>
+            <a:ext cx="7633420" cy="591300"/>
+          </a:xfrm>
+          <a:prstGeom prst="rect">
+            <a:avLst/>
+          </a:prstGeom>
+          <a:noFill/>
+          <a:ln>
+            <a:noFill/>
+          </a:ln>
+        </p:spPr>
+        <p:txBody>
+          <a:bodyPr spcFirstLastPara="1" wrap="square" lIns="91425" tIns="91425" rIns="91425" bIns="91425" anchor="ctr" anchorCtr="0">
+            <a:noAutofit/>
+          </a:bodyPr>
+          <a:lstStyle/>
+          <a:p>
+            <a:pPr marL="0" lvl="0" indent="0" algn="ctr" rtl="0">
+              <a:lnSpc>
+                <a:spcPct val="100000"/>
+              </a:lnSpc>
+              <a:spcBef>
+                <a:spcPts val="0"/>
+              </a:spcBef>
+              <a:spcAft>
+                <a:spcPts val="0"/>
+              </a:spcAft>
+              <a:buClr>
+                <a:schemeClr val="dk1"/>
+              </a:buClr>
+              <a:buSzPts val="1100"/>
+              <a:buFont typeface="Arial"/>
+              <a:buNone/>
+            </a:pPr>
+            <a:r>
+              <a:rPr lang="en-US" sz="4000" b="1" dirty="0">
+                <a:solidFill>
+                  <a:srgbClr val="073763"/>
+                </a:solidFill>
+                <a:latin typeface="Century Gothic"/>
+                <a:ea typeface="Century Gothic"/>
+                <a:cs typeface="Century Gothic"/>
+                <a:sym typeface="Century Gothic"/>
+              </a:rPr>
+              <a:t>Um </a:t>
+            </a:r>
+            <a:r>
+              <a:rPr lang="pt-BR" sz="4000" b="1" dirty="0">
+                <a:solidFill>
+                  <a:srgbClr val="073763"/>
+                </a:solidFill>
+                <a:latin typeface="Century Gothic"/>
+                <a:ea typeface="Century Gothic"/>
+                <a:cs typeface="Century Gothic"/>
+                <a:sym typeface="Century Gothic"/>
+              </a:rPr>
+              <a:t>pouco</a:t>
+            </a:r>
+            <a:r>
+              <a:rPr lang="en-US" sz="4000" b="1" dirty="0">
+                <a:solidFill>
+                  <a:srgbClr val="073763"/>
+                </a:solidFill>
+                <a:latin typeface="Century Gothic"/>
+                <a:ea typeface="Century Gothic"/>
+                <a:cs typeface="Century Gothic"/>
+                <a:sym typeface="Century Gothic"/>
+              </a:rPr>
+              <a:t> </a:t>
+            </a:r>
+            <a:r>
+              <a:rPr lang="en-US" sz="4000" b="1" dirty="0" err="1">
+                <a:solidFill>
+                  <a:srgbClr val="073763"/>
+                </a:solidFill>
+                <a:latin typeface="Century Gothic"/>
+                <a:ea typeface="Century Gothic"/>
+                <a:cs typeface="Century Gothic"/>
+                <a:sym typeface="Century Gothic"/>
+              </a:rPr>
+              <a:t>sobre</a:t>
+            </a:r>
+            <a:r>
+              <a:rPr lang="en-US" sz="4000" b="1" dirty="0">
+                <a:solidFill>
+                  <a:srgbClr val="073763"/>
+                </a:solidFill>
+                <a:latin typeface="Century Gothic"/>
+                <a:ea typeface="Century Gothic"/>
+                <a:cs typeface="Century Gothic"/>
+                <a:sym typeface="Century Gothic"/>
+              </a:rPr>
               <a:t> API</a:t>
             </a:r>
             <a:endParaRPr sz="4000" b="1" dirty="0">
@@ -19913,13 +20285,13 @@
   <p:clrMapOvr>
     <a:masterClrMapping/>
   </p:clrMapOvr>
-  <mc:AlternateContent xmlns:mc="http://schemas.openxmlformats.org/markup-compatibility/2006">
-    <mc:Choice xmlns:p14="http://schemas.microsoft.com/office/powerpoint/2010/main" Requires="p14">
+  <mc:AlternateContent xmlns:mc="http://schemas.openxmlformats.org/markup-compatibility/2006" xmlns:p14="http://schemas.microsoft.com/office/powerpoint/2010/main">
+    <mc:Choice Requires="p14">
       <p:transition spd="med" p14:dur="700">
         <p:fade/>
       </p:transition>
     </mc:Choice>
-    <mc:Fallback>
+    <mc:Fallback xmlns="">
       <p:transition spd="med">
         <p:fade/>
       </p:transition>
@@ -19928,7 +20300,7 @@
 </p:sld>
 </file>
 
-<file path=ppt/slides/slide6.xml><?xml version="1.0" encoding="utf-8"?>
+<file path=ppt/slides/slide7.xml><?xml version="1.0" encoding="utf-8"?>
 <p:sld xmlns:a="http://schemas.openxmlformats.org/drawingml/2006/main" xmlns:r="http://schemas.openxmlformats.org/officeDocument/2006/relationships" xmlns:p="http://schemas.openxmlformats.org/presentationml/2006/main">
   <p:cSld>
     <p:bg>
@@ -19965,8 +20337,8 @@
         </p:nvSpPr>
         <p:spPr>
           <a:xfrm>
-            <a:off x="1270000" y="305700"/>
-            <a:ext cx="7633420" cy="591300"/>
+            <a:off x="311700" y="305700"/>
+            <a:ext cx="8520600" cy="591300"/>
           </a:xfrm>
           <a:prstGeom prst="rect">
             <a:avLst/>
@@ -20160,105 +20532,70 @@
           </a:p>
         </p:txBody>
       </p:sp>
-      <p:sp>
-        <p:nvSpPr>
-          <p:cNvPr id="2" name="TextBox 1">
+      <p:pic>
+        <p:nvPicPr>
+          <p:cNvPr id="2050" name="Picture 2" descr="API RESTful – JR Dev – Learining day after day the ecosystem in JS">
             <a:extLst>
               <a:ext uri="{FF2B5EF4-FFF2-40B4-BE49-F238E27FC236}">
-                <a16:creationId xmlns:a16="http://schemas.microsoft.com/office/drawing/2014/main" id="{97A4FD57-0768-4D78-92E9-BFB2F59C419D}"/>
+                <a16:creationId xmlns:a16="http://schemas.microsoft.com/office/drawing/2014/main" id="{973414E3-9C13-4BAE-9DE9-0EAC57BB9D64}"/>
               </a:ext>
             </a:extLst>
           </p:cNvPr>
-          <p:cNvSpPr txBox="1"/>
+          <p:cNvPicPr>
+            <a:picLocks noChangeAspect="1" noChangeArrowheads="1"/>
+          </p:cNvPicPr>
           <p:nvPr/>
-        </p:nvSpPr>
-        <p:spPr>
+        </p:nvPicPr>
+        <p:blipFill>
+          <a:blip r:embed="rId4">
+            <a:extLst>
+              <a:ext uri="{28A0092B-C50C-407E-A947-70E740481C1C}">
+                <a14:useLocalDpi xmlns:a14="http://schemas.microsoft.com/office/drawing/2010/main" val="0"/>
+              </a:ext>
+            </a:extLst>
+          </a:blip>
+          <a:srcRect/>
+          <a:stretch>
+            <a:fillRect/>
+          </a:stretch>
+        </p:blipFill>
+        <p:spPr bwMode="auto">
           <a:xfrm>
-            <a:off x="403123" y="1667680"/>
-            <a:ext cx="8347587" cy="1384995"/>
+            <a:off x="2010549" y="1037590"/>
+            <a:ext cx="4512310" cy="3384233"/>
           </a:xfrm>
           <a:prstGeom prst="rect">
             <a:avLst/>
           </a:prstGeom>
           <a:noFill/>
+          <a:extLst>
+            <a:ext uri="{909E8E84-426E-40DD-AFC4-6F175D3DCCD1}">
+              <a14:hiddenFill xmlns:a14="http://schemas.microsoft.com/office/drawing/2010/main">
+                <a:solidFill>
+                  <a:srgbClr val="FFFFFF"/>
+                </a:solidFill>
+              </a14:hiddenFill>
+            </a:ext>
+          </a:extLst>
         </p:spPr>
-        <p:txBody>
-          <a:bodyPr wrap="square" rtlCol="0">
-            <a:spAutoFit/>
-          </a:bodyPr>
-          <a:lstStyle/>
-          <a:p>
-            <a:r>
-              <a:rPr lang="pt-BR" sz="2800" b="0" i="0" dirty="0">
-                <a:solidFill>
-                  <a:srgbClr val="333333"/>
-                </a:solidFill>
-                <a:effectLst/>
-                <a:latin typeface="Roboto" panose="020B0604020202020204" pitchFamily="2" charset="0"/>
-              </a:rPr>
-              <a:t>O acrônimo </a:t>
-            </a:r>
-            <a:r>
-              <a:rPr lang="pt-BR" sz="2800" b="1" i="0" dirty="0">
-                <a:solidFill>
-                  <a:srgbClr val="333333"/>
-                </a:solidFill>
-                <a:effectLst/>
-                <a:latin typeface="Roboto" panose="020B0604020202020204" pitchFamily="2" charset="0"/>
-              </a:rPr>
-              <a:t>API</a:t>
-            </a:r>
-            <a:r>
-              <a:rPr lang="pt-BR" sz="2800" b="0" i="0" dirty="0">
-                <a:solidFill>
-                  <a:srgbClr val="333333"/>
-                </a:solidFill>
-                <a:effectLst/>
-                <a:latin typeface="Roboto" panose="020B0604020202020204" pitchFamily="2" charset="0"/>
-              </a:rPr>
-              <a:t> que provém do inglês </a:t>
-            </a:r>
-            <a:r>
-              <a:rPr lang="pt-BR" sz="2800" b="1" i="1" dirty="0">
-                <a:solidFill>
-                  <a:srgbClr val="333333"/>
-                </a:solidFill>
-                <a:effectLst/>
-                <a:latin typeface="Roboto" panose="020B0604020202020204" pitchFamily="2" charset="0"/>
-              </a:rPr>
-              <a:t>Application Programming Interface</a:t>
-            </a:r>
-            <a:r>
-              <a:rPr lang="pt-BR" sz="2800" b="0" i="0" dirty="0">
-                <a:solidFill>
-                  <a:srgbClr val="333333"/>
-                </a:solidFill>
-                <a:effectLst/>
-                <a:latin typeface="Roboto" panose="020B0604020202020204" pitchFamily="2" charset="0"/>
-              </a:rPr>
-              <a:t> (Em português, significa Interface de Programação de Aplicações)</a:t>
-            </a:r>
-            <a:endParaRPr lang="en-US" sz="2800" dirty="0"/>
-          </a:p>
-        </p:txBody>
-      </p:sp>
+      </p:pic>
     </p:spTree>
     <p:extLst>
       <p:ext uri="{BB962C8B-B14F-4D97-AF65-F5344CB8AC3E}">
-        <p14:creationId xmlns:p14="http://schemas.microsoft.com/office/powerpoint/2010/main" val="1280265048"/>
+        <p14:creationId xmlns:p14="http://schemas.microsoft.com/office/powerpoint/2010/main" val="4283491488"/>
       </p:ext>
     </p:extLst>
   </p:cSld>
   <p:clrMapOvr>
     <a:masterClrMapping/>
   </p:clrMapOvr>
-  <mc:AlternateContent xmlns:mc="http://schemas.openxmlformats.org/markup-compatibility/2006">
-    <mc:Choice xmlns:p14="http://schemas.microsoft.com/office/powerpoint/2010/main" Requires="p14">
+  <mc:AlternateContent xmlns:mc="http://schemas.openxmlformats.org/markup-compatibility/2006" xmlns:p14="http://schemas.microsoft.com/office/powerpoint/2010/main">
+    <mc:Choice Requires="p14">
       <p:transition spd="med" p14:dur="700">
         <p:fade/>
       </p:transition>
     </mc:Choice>
-    <mc:Fallback>
+    <mc:Fallback xmlns="">
       <p:transition spd="med">
         <p:fade/>
       </p:transition>
@@ -20267,7 +20604,7 @@
 </p:sld>
 </file>
 
-<file path=ppt/slides/slide7.xml><?xml version="1.0" encoding="utf-8"?>
+<file path=ppt/slides/slide8.xml><?xml version="1.0" encoding="utf-8"?>
 <p:sld xmlns:a="http://schemas.openxmlformats.org/drawingml/2006/main" xmlns:r="http://schemas.openxmlformats.org/officeDocument/2006/relationships" xmlns:p="http://schemas.openxmlformats.org/presentationml/2006/main">
   <p:cSld>
     <p:bg>
@@ -20304,8 +20641,8 @@
         </p:nvSpPr>
         <p:spPr>
           <a:xfrm>
-            <a:off x="311700" y="305700"/>
-            <a:ext cx="8520600" cy="591300"/>
+            <a:off x="1200150" y="305700"/>
+            <a:ext cx="7632150" cy="591300"/>
           </a:xfrm>
           <a:prstGeom prst="rect">
             <a:avLst/>
@@ -20339,7 +20676,7 @@
               <a:buNone/>
             </a:pPr>
             <a:r>
-              <a:rPr lang="en-US" sz="4000" b="1" dirty="0">
+              <a:rPr lang="en-US" sz="4000" b="1" dirty="0" err="1">
                 <a:solidFill>
                   <a:srgbClr val="073763"/>
                 </a:solidFill>
@@ -20348,43 +20685,7 @@
                 <a:cs typeface="Century Gothic"/>
                 <a:sym typeface="Century Gothic"/>
               </a:rPr>
-              <a:t>Um </a:t>
-            </a:r>
-            <a:r>
-              <a:rPr lang="en-US" sz="4000" b="1" dirty="0" err="1">
-                <a:solidFill>
-                  <a:srgbClr val="073763"/>
-                </a:solidFill>
-                <a:latin typeface="Century Gothic"/>
-                <a:ea typeface="Century Gothic"/>
-                <a:cs typeface="Century Gothic"/>
-                <a:sym typeface="Century Gothic"/>
-              </a:rPr>
-              <a:t>pouco</a:t>
-            </a:r>
-            <a:r>
-              <a:rPr lang="en-US" sz="4000" b="1" dirty="0">
-                <a:solidFill>
-                  <a:srgbClr val="073763"/>
-                </a:solidFill>
-                <a:latin typeface="Century Gothic"/>
-                <a:ea typeface="Century Gothic"/>
-                <a:cs typeface="Century Gothic"/>
-                <a:sym typeface="Century Gothic"/>
-              </a:rPr>
-              <a:t> </a:t>
-            </a:r>
-            <a:r>
-              <a:rPr lang="en-US" sz="4000" b="1" dirty="0" err="1">
-                <a:solidFill>
-                  <a:srgbClr val="073763"/>
-                </a:solidFill>
-                <a:latin typeface="Century Gothic"/>
-                <a:ea typeface="Century Gothic"/>
-                <a:cs typeface="Century Gothic"/>
-                <a:sym typeface="Century Gothic"/>
-              </a:rPr>
-              <a:t>sobre</a:t>
+              <a:t>Estrutura</a:t>
             </a:r>
             <a:r>
               <a:rPr lang="en-US" sz="4000" b="1" dirty="0">
@@ -20501,310 +20802,6 @@
       </p:sp>
       <p:pic>
         <p:nvPicPr>
-          <p:cNvPr id="2050" name="Picture 2" descr="API RESTful – JR Dev – Learining day after day the ecosystem in JS">
-            <a:extLst>
-              <a:ext uri="{FF2B5EF4-FFF2-40B4-BE49-F238E27FC236}">
-                <a16:creationId xmlns:a16="http://schemas.microsoft.com/office/drawing/2014/main" id="{973414E3-9C13-4BAE-9DE9-0EAC57BB9D64}"/>
-              </a:ext>
-            </a:extLst>
-          </p:cNvPr>
-          <p:cNvPicPr>
-            <a:picLocks noChangeAspect="1" noChangeArrowheads="1"/>
-          </p:cNvPicPr>
-          <p:nvPr/>
-        </p:nvPicPr>
-        <p:blipFill>
-          <a:blip r:embed="rId4">
-            <a:extLst>
-              <a:ext uri="{28A0092B-C50C-407E-A947-70E740481C1C}">
-                <a14:useLocalDpi xmlns:a14="http://schemas.microsoft.com/office/drawing/2010/main" val="0"/>
-              </a:ext>
-            </a:extLst>
-          </a:blip>
-          <a:srcRect/>
-          <a:stretch>
-            <a:fillRect/>
-          </a:stretch>
-        </p:blipFill>
-        <p:spPr bwMode="auto">
-          <a:xfrm>
-            <a:off x="2010549" y="1037590"/>
-            <a:ext cx="4512310" cy="3384233"/>
-          </a:xfrm>
-          <a:prstGeom prst="rect">
-            <a:avLst/>
-          </a:prstGeom>
-          <a:noFill/>
-          <a:extLst>
-            <a:ext uri="{909E8E84-426E-40DD-AFC4-6F175D3DCCD1}">
-              <a14:hiddenFill xmlns:a14="http://schemas.microsoft.com/office/drawing/2010/main">
-                <a:solidFill>
-                  <a:srgbClr val="FFFFFF"/>
-                </a:solidFill>
-              </a14:hiddenFill>
-            </a:ext>
-          </a:extLst>
-        </p:spPr>
-      </p:pic>
-    </p:spTree>
-    <p:extLst>
-      <p:ext uri="{BB962C8B-B14F-4D97-AF65-F5344CB8AC3E}">
-        <p14:creationId xmlns:p14="http://schemas.microsoft.com/office/powerpoint/2010/main" val="4283491488"/>
-      </p:ext>
-    </p:extLst>
-  </p:cSld>
-  <p:clrMapOvr>
-    <a:masterClrMapping/>
-  </p:clrMapOvr>
-  <mc:AlternateContent xmlns:mc="http://schemas.openxmlformats.org/markup-compatibility/2006">
-    <mc:Choice xmlns:p14="http://schemas.microsoft.com/office/powerpoint/2010/main" Requires="p14">
-      <p:transition spd="med" p14:dur="700">
-        <p:fade/>
-      </p:transition>
-    </mc:Choice>
-    <mc:Fallback>
-      <p:transition spd="med">
-        <p:fade/>
-      </p:transition>
-    </mc:Fallback>
-  </mc:AlternateContent>
-</p:sld>
-</file>
-
-<file path=ppt/slides/slide8.xml><?xml version="1.0" encoding="utf-8"?>
-<p:sld xmlns:a="http://schemas.openxmlformats.org/drawingml/2006/main" xmlns:r="http://schemas.openxmlformats.org/officeDocument/2006/relationships" xmlns:p="http://schemas.openxmlformats.org/presentationml/2006/main">
-  <p:cSld>
-    <p:bg>
-      <p:bgPr>
-        <a:solidFill>
-          <a:srgbClr val="FFFFFF"/>
-        </a:solidFill>
-        <a:effectLst/>
-      </p:bgPr>
-    </p:bg>
-    <p:spTree>
-      <p:nvGrpSpPr>
-        <p:cNvPr id="1" name="Shape 91"/>
-        <p:cNvGrpSpPr/>
-        <p:nvPr/>
-      </p:nvGrpSpPr>
-      <p:grpSpPr>
-        <a:xfrm>
-          <a:off x="0" y="0"/>
-          <a:ext cx="0" cy="0"/>
-          <a:chOff x="0" y="0"/>
-          <a:chExt cx="0" cy="0"/>
-        </a:xfrm>
-      </p:grpSpPr>
-      <p:sp>
-        <p:nvSpPr>
-          <p:cNvPr id="92" name="Google Shape;92;p3"/>
-          <p:cNvSpPr txBox="1">
-            <a:spLocks noGrp="1"/>
-          </p:cNvSpPr>
-          <p:nvPr>
-            <p:ph type="subTitle" idx="1"/>
-          </p:nvPr>
-        </p:nvSpPr>
-        <p:spPr>
-          <a:xfrm>
-            <a:off x="1200150" y="305700"/>
-            <a:ext cx="7632150" cy="591300"/>
-          </a:xfrm>
-          <a:prstGeom prst="rect">
-            <a:avLst/>
-          </a:prstGeom>
-          <a:noFill/>
-          <a:ln>
-            <a:noFill/>
-          </a:ln>
-        </p:spPr>
-        <p:txBody>
-          <a:bodyPr spcFirstLastPara="1" wrap="square" lIns="91425" tIns="91425" rIns="91425" bIns="91425" anchor="ctr" anchorCtr="0">
-            <a:noAutofit/>
-          </a:bodyPr>
-          <a:lstStyle/>
-          <a:p>
-            <a:pPr marL="0" lvl="0" indent="0" algn="ctr" rtl="0">
-              <a:lnSpc>
-                <a:spcPct val="100000"/>
-              </a:lnSpc>
-              <a:spcBef>
-                <a:spcPts val="0"/>
-              </a:spcBef>
-              <a:spcAft>
-                <a:spcPts val="0"/>
-              </a:spcAft>
-              <a:buClr>
-                <a:schemeClr val="dk1"/>
-              </a:buClr>
-              <a:buSzPts val="1100"/>
-              <a:buFont typeface="Arial"/>
-              <a:buNone/>
-            </a:pPr>
-            <a:r>
-              <a:rPr lang="en-US" sz="4000" b="1" dirty="0">
-                <a:solidFill>
-                  <a:srgbClr val="073763"/>
-                </a:solidFill>
-                <a:latin typeface="Century Gothic"/>
-                <a:ea typeface="Century Gothic"/>
-                <a:cs typeface="Century Gothic"/>
-                <a:sym typeface="Century Gothic"/>
-              </a:rPr>
-              <a:t>Um </a:t>
-            </a:r>
-            <a:r>
-              <a:rPr lang="en-US" sz="4000" b="1" dirty="0" err="1">
-                <a:solidFill>
-                  <a:srgbClr val="073763"/>
-                </a:solidFill>
-                <a:latin typeface="Century Gothic"/>
-                <a:ea typeface="Century Gothic"/>
-                <a:cs typeface="Century Gothic"/>
-                <a:sym typeface="Century Gothic"/>
-              </a:rPr>
-              <a:t>pouco</a:t>
-            </a:r>
-            <a:r>
-              <a:rPr lang="en-US" sz="4000" b="1" dirty="0">
-                <a:solidFill>
-                  <a:srgbClr val="073763"/>
-                </a:solidFill>
-                <a:latin typeface="Century Gothic"/>
-                <a:ea typeface="Century Gothic"/>
-                <a:cs typeface="Century Gothic"/>
-                <a:sym typeface="Century Gothic"/>
-              </a:rPr>
-              <a:t> </a:t>
-            </a:r>
-            <a:r>
-              <a:rPr lang="en-US" sz="4000" b="1" dirty="0" err="1">
-                <a:solidFill>
-                  <a:srgbClr val="073763"/>
-                </a:solidFill>
-                <a:latin typeface="Century Gothic"/>
-                <a:ea typeface="Century Gothic"/>
-                <a:cs typeface="Century Gothic"/>
-                <a:sym typeface="Century Gothic"/>
-              </a:rPr>
-              <a:t>sobre</a:t>
-            </a:r>
-            <a:r>
-              <a:rPr lang="en-US" sz="4000" b="1" dirty="0">
-                <a:solidFill>
-                  <a:srgbClr val="073763"/>
-                </a:solidFill>
-                <a:latin typeface="Century Gothic"/>
-                <a:ea typeface="Century Gothic"/>
-                <a:cs typeface="Century Gothic"/>
-                <a:sym typeface="Century Gothic"/>
-              </a:rPr>
-              <a:t> API Rest</a:t>
-            </a:r>
-            <a:endParaRPr sz="4000" b="1" dirty="0">
-              <a:solidFill>
-                <a:srgbClr val="073763"/>
-              </a:solidFill>
-              <a:latin typeface="Century Gothic"/>
-              <a:ea typeface="Century Gothic"/>
-              <a:cs typeface="Century Gothic"/>
-              <a:sym typeface="Century Gothic"/>
-            </a:endParaRPr>
-          </a:p>
-        </p:txBody>
-      </p:sp>
-      <p:pic>
-        <p:nvPicPr>
-          <p:cNvPr id="93" name="Google Shape;93;p3"/>
-          <p:cNvPicPr preferRelativeResize="0"/>
-          <p:nvPr/>
-        </p:nvPicPr>
-        <p:blipFill rotWithShape="1">
-          <a:blip r:embed="rId3">
-            <a:alphaModFix/>
-          </a:blip>
-          <a:srcRect/>
-          <a:stretch/>
-        </p:blipFill>
-        <p:spPr>
-          <a:xfrm>
-            <a:off x="311700" y="243014"/>
-            <a:ext cx="1698849" cy="591351"/>
-          </a:xfrm>
-          <a:prstGeom prst="rect">
-            <a:avLst/>
-          </a:prstGeom>
-          <a:noFill/>
-          <a:ln>
-            <a:noFill/>
-          </a:ln>
-        </p:spPr>
-      </p:pic>
-      <p:sp>
-        <p:nvSpPr>
-          <p:cNvPr id="95" name="Google Shape;95;p3"/>
-          <p:cNvSpPr/>
-          <p:nvPr/>
-        </p:nvSpPr>
-        <p:spPr>
-          <a:xfrm>
-            <a:off x="0" y="5077717"/>
-            <a:ext cx="9144000" cy="57300"/>
-          </a:xfrm>
-          <a:prstGeom prst="rect">
-            <a:avLst/>
-          </a:prstGeom>
-          <a:solidFill>
-            <a:srgbClr val="F78321"/>
-          </a:solidFill>
-          <a:ln w="9525" cap="flat" cmpd="sng">
-            <a:solidFill>
-              <a:srgbClr val="F78321"/>
-            </a:solidFill>
-            <a:prstDash val="solid"/>
-            <a:round/>
-            <a:headEnd type="none" w="sm" len="sm"/>
-            <a:tailEnd type="none" w="sm" len="sm"/>
-          </a:ln>
-        </p:spPr>
-        <p:txBody>
-          <a:bodyPr spcFirstLastPara="1" wrap="square" lIns="91425" tIns="91425" rIns="91425" bIns="91425" anchor="ctr" anchorCtr="0">
-            <a:noAutofit/>
-          </a:bodyPr>
-          <a:lstStyle/>
-          <a:p>
-            <a:pPr marL="0" marR="0" lvl="0" indent="0" algn="l" rtl="0">
-              <a:lnSpc>
-                <a:spcPct val="100000"/>
-              </a:lnSpc>
-              <a:spcBef>
-                <a:spcPts val="0"/>
-              </a:spcBef>
-              <a:spcAft>
-                <a:spcPts val="0"/>
-              </a:spcAft>
-              <a:buClr>
-                <a:srgbClr val="000000"/>
-              </a:buClr>
-              <a:buSzPts val="1400"/>
-              <a:buFont typeface="Arial"/>
-              <a:buNone/>
-            </a:pPr>
-            <a:endParaRPr sz="1400" b="0" i="0" u="none" strike="noStrike" cap="none">
-              <a:solidFill>
-                <a:srgbClr val="000000"/>
-              </a:solidFill>
-              <a:latin typeface="Arial"/>
-              <a:ea typeface="Arial"/>
-              <a:cs typeface="Arial"/>
-              <a:sym typeface="Arial"/>
-            </a:endParaRPr>
-          </a:p>
-        </p:txBody>
-      </p:sp>
-      <p:pic>
-        <p:nvPicPr>
           <p:cNvPr id="3074" name="Picture 2">
             <a:extLst>
               <a:ext uri="{FF2B5EF4-FFF2-40B4-BE49-F238E27FC236}">
@@ -20860,13 +20857,13 @@
   <p:clrMapOvr>
     <a:masterClrMapping/>
   </p:clrMapOvr>
-  <mc:AlternateContent xmlns:mc="http://schemas.openxmlformats.org/markup-compatibility/2006">
-    <mc:Choice xmlns:p14="http://schemas.microsoft.com/office/powerpoint/2010/main" Requires="p14">
+  <mc:AlternateContent xmlns:mc="http://schemas.openxmlformats.org/markup-compatibility/2006" xmlns:p14="http://schemas.microsoft.com/office/powerpoint/2010/main">
+    <mc:Choice Requires="p14">
       <p:transition spd="med" p14:dur="700">
         <p:fade/>
       </p:transition>
     </mc:Choice>
-    <mc:Fallback>
+    <mc:Fallback xmlns="">
       <p:transition spd="med">
         <p:fade/>
       </p:transition>
@@ -22019,6 +22016,16 @@
             </a:p>
             <a:p>
               <a:pPr algn="l"/>
+              <a:endParaRPr lang="pt-BR" sz="1200" b="0" i="0" dirty="0">
+                <a:solidFill>
+                  <a:srgbClr val="666666"/>
+                </a:solidFill>
+                <a:effectLst/>
+                <a:latin typeface="Century Gothic" panose="020B0502020202020204" pitchFamily="34" charset="0"/>
+              </a:endParaRPr>
+            </a:p>
+            <a:p>
+              <a:pPr algn="l"/>
               <a:r>
                 <a:rPr lang="pt-BR" sz="1200" b="0" i="0" dirty="0">
                   <a:solidFill>

</xml_diff>

<commit_message>
fix: updated slide apresentação
</commit_message>
<xml_diff>
--- a/Slide/Projeto everis -  Criando uma API REST com .Net Core.pptx
+++ b/Slide/Projeto everis -  Criando uma API REST com .Net Core.pptx
@@ -308,7 +308,7 @@
       </p15:sldGuideLst>
     </p:ext>
     <p:ext uri="http://customooxmlschemas.google.com/">
-      <go:slidesCustomData xmlns:go="http://customooxmlschemas.google.com/" xmlns:ahyp="http://schemas.microsoft.com/office/drawing/2018/hyperlinkcolor" xmlns:p15="http://schemas.microsoft.com/office/powerpoint/2012/main" xmlns:p14="http://schemas.microsoft.com/office/powerpoint/2010/main" xmlns:com="http://schemas.openxmlformats.org/drawingml/2006/compatibility" xmlns:pvml="urn:schemas-microsoft-com:office:powerpoint" xmlns:v="urn:schemas-microsoft-com:vml" xmlns:o="urn:schemas-microsoft-com:office:office" xmlns:dgm="http://schemas.openxmlformats.org/drawingml/2006/diagram" xmlns:c="http://schemas.openxmlformats.org/drawingml/2006/chart" xmlns:mv="urn:schemas-microsoft-com:mac:vml" xmlns:mc="http://schemas.openxmlformats.org/markup-compatibility/2006" xmlns="" r:id="rId41" roundtripDataSignature="AMtx7mhLG0qHwc5KaOFWU3d3cgClDfJ2aA=="/>
+      <go:slidesCustomData xmlns="" xmlns:mc="http://schemas.openxmlformats.org/markup-compatibility/2006" xmlns:mv="urn:schemas-microsoft-com:mac:vml" xmlns:c="http://schemas.openxmlformats.org/drawingml/2006/chart" xmlns:dgm="http://schemas.openxmlformats.org/drawingml/2006/diagram" xmlns:o="urn:schemas-microsoft-com:office:office" xmlns:v="urn:schemas-microsoft-com:vml" xmlns:pvml="urn:schemas-microsoft-com:office:powerpoint" xmlns:com="http://schemas.openxmlformats.org/drawingml/2006/compatibility" xmlns:p14="http://schemas.microsoft.com/office/powerpoint/2010/main" xmlns:p15="http://schemas.microsoft.com/office/powerpoint/2012/main" xmlns:ahyp="http://schemas.microsoft.com/office/drawing/2018/hyperlinkcolor" xmlns:go="http://customooxmlschemas.google.com/" r:id="rId41" roundtripDataSignature="AMtx7mhLG0qHwc5KaOFWU3d3cgClDfJ2aA=="/>
     </p:ext>
   </p:extLst>
 </p:presentation>
@@ -9038,7 +9038,7 @@
         <p:fade/>
       </p:transition>
     </mc:Choice>
-    <mc:Fallback xmlns:ahyp="http://schemas.microsoft.com/office/drawing/2018/hyperlinkcolor" xmlns:p15="http://schemas.microsoft.com/office/powerpoint/2012/main" xmlns:com="http://schemas.openxmlformats.org/drawingml/2006/compatibility" xmlns:pvml="urn:schemas-microsoft-com:office:powerpoint" xmlns:v="urn:schemas-microsoft-com:vml" xmlns:o="urn:schemas-microsoft-com:office:office" xmlns:dgm="http://schemas.openxmlformats.org/drawingml/2006/diagram" xmlns:c="http://schemas.openxmlformats.org/drawingml/2006/chart" xmlns:mv="urn:schemas-microsoft-com:mac:vml" xmlns="">
+    <mc:Fallback xmlns="" xmlns:mv="urn:schemas-microsoft-com:mac:vml" xmlns:c="http://schemas.openxmlformats.org/drawingml/2006/chart" xmlns:dgm="http://schemas.openxmlformats.org/drawingml/2006/diagram" xmlns:o="urn:schemas-microsoft-com:office:office" xmlns:v="urn:schemas-microsoft-com:vml" xmlns:pvml="urn:schemas-microsoft-com:office:powerpoint" xmlns:com="http://schemas.openxmlformats.org/drawingml/2006/compatibility" xmlns:p15="http://schemas.microsoft.com/office/powerpoint/2012/main" xmlns:ahyp="http://schemas.microsoft.com/office/drawing/2018/hyperlinkcolor">
       <p:transition spd="slow">
         <p:fade/>
       </p:transition>
@@ -9374,13 +9374,13 @@
   <p:clrMapOvr>
     <a:masterClrMapping/>
   </p:clrMapOvr>
-  <mc:AlternateContent xmlns:mc="http://schemas.openxmlformats.org/markup-compatibility/2006">
-    <mc:Choice xmlns:p14="http://schemas.microsoft.com/office/powerpoint/2010/main" Requires="p14">
+  <mc:AlternateContent xmlns:mc="http://schemas.openxmlformats.org/markup-compatibility/2006" xmlns:p14="http://schemas.microsoft.com/office/powerpoint/2010/main">
+    <mc:Choice Requires="p14">
       <p:transition spd="med" p14:dur="700">
         <p:fade/>
       </p:transition>
     </mc:Choice>
-    <mc:Fallback>
+    <mc:Fallback xmlns="">
       <p:transition spd="med">
         <p:fade/>
       </p:transition>
@@ -10030,7 +10030,7 @@
         <p:fade/>
       </p:transition>
     </mc:Choice>
-    <mc:Fallback xmlns:ahyp="http://schemas.microsoft.com/office/drawing/2018/hyperlinkcolor" xmlns:p15="http://schemas.microsoft.com/office/powerpoint/2012/main" xmlns:com="http://schemas.openxmlformats.org/drawingml/2006/compatibility" xmlns:pvml="urn:schemas-microsoft-com:office:powerpoint" xmlns:v="urn:schemas-microsoft-com:vml" xmlns:o="urn:schemas-microsoft-com:office:office" xmlns:dgm="http://schemas.openxmlformats.org/drawingml/2006/diagram" xmlns:c="http://schemas.openxmlformats.org/drawingml/2006/chart" xmlns:mv="urn:schemas-microsoft-com:mac:vml" xmlns="">
+    <mc:Fallback xmlns="" xmlns:mv="urn:schemas-microsoft-com:mac:vml" xmlns:c="http://schemas.openxmlformats.org/drawingml/2006/chart" xmlns:dgm="http://schemas.openxmlformats.org/drawingml/2006/diagram" xmlns:o="urn:schemas-microsoft-com:office:office" xmlns:v="urn:schemas-microsoft-com:vml" xmlns:pvml="urn:schemas-microsoft-com:office:powerpoint" xmlns:com="http://schemas.openxmlformats.org/drawingml/2006/compatibility" xmlns:p15="http://schemas.microsoft.com/office/powerpoint/2012/main" xmlns:ahyp="http://schemas.microsoft.com/office/drawing/2018/hyperlinkcolor">
       <p:transition spd="slow">
         <p:fade/>
       </p:transition>
@@ -11392,7 +11392,7 @@
         <p:fade/>
       </p:transition>
     </mc:Choice>
-    <mc:Fallback xmlns:ahyp="http://schemas.microsoft.com/office/drawing/2018/hyperlinkcolor" xmlns:p15="http://schemas.microsoft.com/office/powerpoint/2012/main" xmlns:com="http://schemas.openxmlformats.org/drawingml/2006/compatibility" xmlns:pvml="urn:schemas-microsoft-com:office:powerpoint" xmlns:v="urn:schemas-microsoft-com:vml" xmlns:o="urn:schemas-microsoft-com:office:office" xmlns:dgm="http://schemas.openxmlformats.org/drawingml/2006/diagram" xmlns:c="http://schemas.openxmlformats.org/drawingml/2006/chart" xmlns:mv="urn:schemas-microsoft-com:mac:vml" xmlns="">
+    <mc:Fallback xmlns="" xmlns:mv="urn:schemas-microsoft-com:mac:vml" xmlns:c="http://schemas.openxmlformats.org/drawingml/2006/chart" xmlns:dgm="http://schemas.openxmlformats.org/drawingml/2006/diagram" xmlns:o="urn:schemas-microsoft-com:office:office" xmlns:v="urn:schemas-microsoft-com:vml" xmlns:pvml="urn:schemas-microsoft-com:office:powerpoint" xmlns:com="http://schemas.openxmlformats.org/drawingml/2006/compatibility" xmlns:p15="http://schemas.microsoft.com/office/powerpoint/2012/main" xmlns:ahyp="http://schemas.microsoft.com/office/drawing/2018/hyperlinkcolor">
       <p:transition spd="slow">
         <p:fade/>
       </p:transition>
@@ -12063,7 +12063,7 @@
         <p:fade/>
       </p:transition>
     </mc:Choice>
-    <mc:Fallback xmlns:ahyp="http://schemas.microsoft.com/office/drawing/2018/hyperlinkcolor" xmlns:p15="http://schemas.microsoft.com/office/powerpoint/2012/main" xmlns:com="http://schemas.openxmlformats.org/drawingml/2006/compatibility" xmlns:pvml="urn:schemas-microsoft-com:office:powerpoint" xmlns:v="urn:schemas-microsoft-com:vml" xmlns:o="urn:schemas-microsoft-com:office:office" xmlns:dgm="http://schemas.openxmlformats.org/drawingml/2006/diagram" xmlns:c="http://schemas.openxmlformats.org/drawingml/2006/chart" xmlns:mv="urn:schemas-microsoft-com:mac:vml" xmlns="">
+    <mc:Fallback xmlns="" xmlns:mv="urn:schemas-microsoft-com:mac:vml" xmlns:c="http://schemas.openxmlformats.org/drawingml/2006/chart" xmlns:dgm="http://schemas.openxmlformats.org/drawingml/2006/diagram" xmlns:o="urn:schemas-microsoft-com:office:office" xmlns:v="urn:schemas-microsoft-com:vml" xmlns:pvml="urn:schemas-microsoft-com:office:powerpoint" xmlns:com="http://schemas.openxmlformats.org/drawingml/2006/compatibility" xmlns:p15="http://schemas.microsoft.com/office/powerpoint/2012/main" xmlns:ahyp="http://schemas.microsoft.com/office/drawing/2018/hyperlinkcolor">
       <p:transition spd="slow">
         <p:fade/>
       </p:transition>
@@ -12651,7 +12651,7 @@
         <p:fade/>
       </p:transition>
     </mc:Choice>
-    <mc:Fallback xmlns:ahyp="http://schemas.microsoft.com/office/drawing/2018/hyperlinkcolor" xmlns:p15="http://schemas.microsoft.com/office/powerpoint/2012/main" xmlns:com="http://schemas.openxmlformats.org/drawingml/2006/compatibility" xmlns:pvml="urn:schemas-microsoft-com:office:powerpoint" xmlns:v="urn:schemas-microsoft-com:vml" xmlns:o="urn:schemas-microsoft-com:office:office" xmlns:dgm="http://schemas.openxmlformats.org/drawingml/2006/diagram" xmlns:c="http://schemas.openxmlformats.org/drawingml/2006/chart" xmlns:mv="urn:schemas-microsoft-com:mac:vml" xmlns="">
+    <mc:Fallback xmlns="" xmlns:mv="urn:schemas-microsoft-com:mac:vml" xmlns:c="http://schemas.openxmlformats.org/drawingml/2006/chart" xmlns:dgm="http://schemas.openxmlformats.org/drawingml/2006/diagram" xmlns:o="urn:schemas-microsoft-com:office:office" xmlns:v="urn:schemas-microsoft-com:vml" xmlns:pvml="urn:schemas-microsoft-com:office:powerpoint" xmlns:com="http://schemas.openxmlformats.org/drawingml/2006/compatibility" xmlns:p15="http://schemas.microsoft.com/office/powerpoint/2012/main" xmlns:ahyp="http://schemas.microsoft.com/office/drawing/2018/hyperlinkcolor">
       <p:transition spd="slow">
         <p:fade/>
       </p:transition>
@@ -13504,7 +13504,7 @@
         <p:fade/>
       </p:transition>
     </mc:Choice>
-    <mc:Fallback xmlns:ahyp="http://schemas.microsoft.com/office/drawing/2018/hyperlinkcolor" xmlns:p15="http://schemas.microsoft.com/office/powerpoint/2012/main" xmlns:com="http://schemas.openxmlformats.org/drawingml/2006/compatibility" xmlns:pvml="urn:schemas-microsoft-com:office:powerpoint" xmlns:v="urn:schemas-microsoft-com:vml" xmlns:o="urn:schemas-microsoft-com:office:office" xmlns:dgm="http://schemas.openxmlformats.org/drawingml/2006/diagram" xmlns:c="http://schemas.openxmlformats.org/drawingml/2006/chart" xmlns:mv="urn:schemas-microsoft-com:mac:vml" xmlns="">
+    <mc:Fallback xmlns="" xmlns:mv="urn:schemas-microsoft-com:mac:vml" xmlns:c="http://schemas.openxmlformats.org/drawingml/2006/chart" xmlns:dgm="http://schemas.openxmlformats.org/drawingml/2006/diagram" xmlns:o="urn:schemas-microsoft-com:office:office" xmlns:v="urn:schemas-microsoft-com:vml" xmlns:pvml="urn:schemas-microsoft-com:office:powerpoint" xmlns:com="http://schemas.openxmlformats.org/drawingml/2006/compatibility" xmlns:p15="http://schemas.microsoft.com/office/powerpoint/2012/main" xmlns:ahyp="http://schemas.microsoft.com/office/drawing/2018/hyperlinkcolor">
       <p:transition spd="slow">
         <p:fade/>
       </p:transition>
@@ -13687,7 +13687,7 @@
                 <a:cs typeface="Calibri"/>
                 <a:sym typeface="Calibri"/>
               </a:rPr>
-              <a:t>Entendo</a:t>
+              <a:t>Entendendo</a:t>
             </a:r>
             <a:r>
               <a:rPr lang="en-US" sz="2400" dirty="0">
@@ -13740,7 +13740,7 @@
                 <a:cs typeface="Calibri"/>
                 <a:sym typeface="Calibri"/>
               </a:rPr>
-              <a:t>Entendo</a:t>
+              <a:t>Entendendo</a:t>
             </a:r>
             <a:r>
               <a:rPr lang="en-US" sz="2400" dirty="0">
@@ -13919,7 +13919,7 @@
         <p:fade/>
       </p:transition>
     </mc:Choice>
-    <mc:Fallback xmlns:ahyp="http://schemas.microsoft.com/office/drawing/2018/hyperlinkcolor" xmlns:p15="http://schemas.microsoft.com/office/powerpoint/2012/main" xmlns:com="http://schemas.openxmlformats.org/drawingml/2006/compatibility" xmlns:pvml="urn:schemas-microsoft-com:office:powerpoint" xmlns:v="urn:schemas-microsoft-com:vml" xmlns:o="urn:schemas-microsoft-com:office:office" xmlns:dgm="http://schemas.openxmlformats.org/drawingml/2006/diagram" xmlns:c="http://schemas.openxmlformats.org/drawingml/2006/chart" xmlns:mv="urn:schemas-microsoft-com:mac:vml" xmlns="">
+    <mc:Fallback xmlns="" xmlns:mv="urn:schemas-microsoft-com:mac:vml" xmlns:c="http://schemas.openxmlformats.org/drawingml/2006/chart" xmlns:dgm="http://schemas.openxmlformats.org/drawingml/2006/diagram" xmlns:o="urn:schemas-microsoft-com:office:office" xmlns:v="urn:schemas-microsoft-com:vml" xmlns:pvml="urn:schemas-microsoft-com:office:powerpoint" xmlns:com="http://schemas.openxmlformats.org/drawingml/2006/compatibility" xmlns:p15="http://schemas.microsoft.com/office/powerpoint/2012/main" xmlns:ahyp="http://schemas.microsoft.com/office/drawing/2018/hyperlinkcolor">
       <p:transition spd="slow">
         <p:fade/>
       </p:transition>
@@ -14723,7 +14723,7 @@
         <p:fade/>
       </p:transition>
     </mc:Choice>
-    <mc:Fallback xmlns:ahyp="http://schemas.microsoft.com/office/drawing/2018/hyperlinkcolor" xmlns:p15="http://schemas.microsoft.com/office/powerpoint/2012/main" xmlns:com="http://schemas.openxmlformats.org/drawingml/2006/compatibility" xmlns:pvml="urn:schemas-microsoft-com:office:powerpoint" xmlns:v="urn:schemas-microsoft-com:vml" xmlns:o="urn:schemas-microsoft-com:office:office" xmlns:dgm="http://schemas.openxmlformats.org/drawingml/2006/diagram" xmlns:c="http://schemas.openxmlformats.org/drawingml/2006/chart" xmlns:mv="urn:schemas-microsoft-com:mac:vml" xmlns="">
+    <mc:Fallback xmlns="" xmlns:mv="urn:schemas-microsoft-com:mac:vml" xmlns:c="http://schemas.openxmlformats.org/drawingml/2006/chart" xmlns:dgm="http://schemas.openxmlformats.org/drawingml/2006/diagram" xmlns:o="urn:schemas-microsoft-com:office:office" xmlns:v="urn:schemas-microsoft-com:vml" xmlns:pvml="urn:schemas-microsoft-com:office:powerpoint" xmlns:com="http://schemas.openxmlformats.org/drawingml/2006/compatibility" xmlns:p15="http://schemas.microsoft.com/office/powerpoint/2012/main" xmlns:ahyp="http://schemas.microsoft.com/office/drawing/2018/hyperlinkcolor">
       <p:transition spd="slow">
         <p:fade/>
       </p:transition>
@@ -14938,7 +14938,7 @@
                 <a:cs typeface="Calibri"/>
                 <a:sym typeface="Calibri"/>
               </a:rPr>
-              <a:t> a classes de </a:t>
+              <a:t> as classes de </a:t>
             </a:r>
             <a:r>
               <a:rPr lang="en-US" sz="2400" dirty="0" err="1">
@@ -15015,7 +15015,7 @@
                 <a:cs typeface="Calibri"/>
                 <a:sym typeface="Calibri"/>
               </a:rPr>
-              <a:t> a </a:t>
+              <a:t> as </a:t>
             </a:r>
             <a:r>
               <a:rPr lang="en-US" sz="2400" dirty="0" err="1">
@@ -15098,7 +15098,7 @@
                 <a:cs typeface="Calibri"/>
                 <a:sym typeface="Calibri"/>
               </a:rPr>
-              <a:t>Configuração</a:t>
+              <a:t>Configurações</a:t>
             </a:r>
             <a:r>
               <a:rPr lang="en-US" sz="2400" dirty="0">
@@ -15169,7 +15169,7 @@
                 <a:cs typeface="Calibri"/>
                 <a:sym typeface="Calibri"/>
               </a:rPr>
-              <a:t>Especificando parâmetros opcionais, valores padrão e restrições da rota de atributo</a:t>
+              <a:t>Especificando parâmetros opcionais, valores padrão e restrições da rota por atributo</a:t>
             </a:r>
             <a:r>
               <a:rPr lang="en-US" sz="2400" dirty="0">
@@ -15311,7 +15311,7 @@
         <p:fade/>
       </p:transition>
     </mc:Choice>
-    <mc:Fallback xmlns:ahyp="http://schemas.microsoft.com/office/drawing/2018/hyperlinkcolor" xmlns:p15="http://schemas.microsoft.com/office/powerpoint/2012/main" xmlns:com="http://schemas.openxmlformats.org/drawingml/2006/compatibility" xmlns:pvml="urn:schemas-microsoft-com:office:powerpoint" xmlns:v="urn:schemas-microsoft-com:vml" xmlns:o="urn:schemas-microsoft-com:office:office" xmlns:dgm="http://schemas.openxmlformats.org/drawingml/2006/diagram" xmlns:c="http://schemas.openxmlformats.org/drawingml/2006/chart" xmlns:mv="urn:schemas-microsoft-com:mac:vml" xmlns="">
+    <mc:Fallback xmlns="" xmlns:mv="urn:schemas-microsoft-com:mac:vml" xmlns:c="http://schemas.openxmlformats.org/drawingml/2006/chart" xmlns:dgm="http://schemas.openxmlformats.org/drawingml/2006/diagram" xmlns:o="urn:schemas-microsoft-com:office:office" xmlns:v="urn:schemas-microsoft-com:vml" xmlns:pvml="urn:schemas-microsoft-com:office:powerpoint" xmlns:com="http://schemas.openxmlformats.org/drawingml/2006/compatibility" xmlns:p15="http://schemas.microsoft.com/office/powerpoint/2012/main" xmlns:ahyp="http://schemas.microsoft.com/office/drawing/2018/hyperlinkcolor">
       <p:transition spd="slow">
         <p:fade/>
       </p:transition>
@@ -16213,7 +16213,7 @@
         <p:fade/>
       </p:transition>
     </mc:Choice>
-    <mc:Fallback xmlns:ahyp="http://schemas.microsoft.com/office/drawing/2018/hyperlinkcolor" xmlns:p15="http://schemas.microsoft.com/office/powerpoint/2012/main" xmlns:com="http://schemas.openxmlformats.org/drawingml/2006/compatibility" xmlns:pvml="urn:schemas-microsoft-com:office:powerpoint" xmlns:v="urn:schemas-microsoft-com:vml" xmlns:o="urn:schemas-microsoft-com:office:office" xmlns:dgm="http://schemas.openxmlformats.org/drawingml/2006/diagram" xmlns:c="http://schemas.openxmlformats.org/drawingml/2006/chart" xmlns:mv="urn:schemas-microsoft-com:mac:vml" xmlns="">
+    <mc:Fallback xmlns="" xmlns:mv="urn:schemas-microsoft-com:mac:vml" xmlns:c="http://schemas.openxmlformats.org/drawingml/2006/chart" xmlns:dgm="http://schemas.openxmlformats.org/drawingml/2006/diagram" xmlns:o="urn:schemas-microsoft-com:office:office" xmlns:v="urn:schemas-microsoft-com:vml" xmlns:pvml="urn:schemas-microsoft-com:office:powerpoint" xmlns:com="http://schemas.openxmlformats.org/drawingml/2006/compatibility" xmlns:p15="http://schemas.microsoft.com/office/powerpoint/2012/main" xmlns:ahyp="http://schemas.microsoft.com/office/drawing/2018/hyperlinkcolor">
       <p:transition spd="slow">
         <p:fade/>
       </p:transition>
@@ -16288,14 +16288,38 @@
             <a:r>
               <a:rPr lang="en-US" sz="2000" dirty="0">
                 <a:solidFill>
-                  <a:srgbClr val="404040"/>
+                  <a:srgbClr val="92D050"/>
                 </a:solidFill>
                 <a:latin typeface="Century Gothic"/>
                 <a:ea typeface="Century Gothic"/>
                 <a:cs typeface="Century Gothic"/>
                 <a:sym typeface="Century Gothic"/>
               </a:rPr>
-              <a:t>[Thiago Almeida]</a:t>
+              <a:t>{</a:t>
+            </a:r>
+            <a:r>
+              <a:rPr lang="en-US" sz="2000" dirty="0">
+                <a:solidFill>
+                  <a:srgbClr val="404040"/>
+                </a:solidFill>
+                <a:latin typeface="Century Gothic"/>
+                <a:ea typeface="Century Gothic"/>
+                <a:cs typeface="Century Gothic"/>
+                <a:sym typeface="Century Gothic"/>
+              </a:rPr>
+              <a:t>Thiago Almeida</a:t>
+            </a:r>
+            <a:r>
+              <a:rPr lang="en-US" sz="2000" dirty="0">
+                <a:solidFill>
+                  <a:srgbClr val="92D050"/>
+                </a:solidFill>
+                <a:latin typeface="Century Gothic"/>
+                <a:ea typeface="Century Gothic"/>
+                <a:cs typeface="Century Gothic"/>
+                <a:sym typeface="Century Gothic"/>
+              </a:rPr>
+              <a:t>}</a:t>
             </a:r>
             <a:br>
               <a:rPr lang="en-US" sz="2000" dirty="0">
@@ -16318,11 +16342,23 @@
                 <a:cs typeface="Century Gothic"/>
                 <a:sym typeface="Century Gothic"/>
               </a:rPr>
-              <a:t>[Developer ]</a:t>
+              <a:t>Developer – </a:t>
+            </a:r>
+            <a:r>
+              <a:rPr lang="en-US" sz="1500" dirty="0" err="1">
+                <a:solidFill>
+                  <a:srgbClr val="404040"/>
+                </a:solidFill>
+                <a:latin typeface="Century Gothic"/>
+                <a:ea typeface="Century Gothic"/>
+                <a:cs typeface="Century Gothic"/>
+                <a:sym typeface="Century Gothic"/>
+              </a:rPr>
+              <a:t>everis</a:t>
             </a:r>
             <a:endParaRPr sz="1500" dirty="0">
               <a:solidFill>
-                <a:srgbClr val="404040"/>
+                <a:srgbClr val="92D050"/>
               </a:solidFill>
               <a:latin typeface="Century Gothic"/>
               <a:ea typeface="Century Gothic"/>
@@ -16969,7 +17005,7 @@
                 <a:cs typeface="Calibri"/>
                 <a:sym typeface="Calibri"/>
               </a:rPr>
-              <a:t>Parâmetros</a:t>
+              <a:t>parâmetros</a:t>
             </a:r>
             <a:r>
               <a:rPr lang="en-US" sz="2400" dirty="0">
@@ -17100,7 +17136,7 @@
         <p:fade/>
       </p:transition>
     </mc:Choice>
-    <mc:Fallback xmlns:ahyp="http://schemas.microsoft.com/office/drawing/2018/hyperlinkcolor" xmlns:p15="http://schemas.microsoft.com/office/powerpoint/2012/main" xmlns:com="http://schemas.openxmlformats.org/drawingml/2006/compatibility" xmlns:pvml="urn:schemas-microsoft-com:office:powerpoint" xmlns:v="urn:schemas-microsoft-com:vml" xmlns:o="urn:schemas-microsoft-com:office:office" xmlns:dgm="http://schemas.openxmlformats.org/drawingml/2006/diagram" xmlns:c="http://schemas.openxmlformats.org/drawingml/2006/chart" xmlns:mv="urn:schemas-microsoft-com:mac:vml" xmlns="">
+    <mc:Fallback xmlns="" xmlns:mv="urn:schemas-microsoft-com:mac:vml" xmlns:c="http://schemas.openxmlformats.org/drawingml/2006/chart" xmlns:dgm="http://schemas.openxmlformats.org/drawingml/2006/diagram" xmlns:o="urn:schemas-microsoft-com:office:office" xmlns:v="urn:schemas-microsoft-com:vml" xmlns:pvml="urn:schemas-microsoft-com:office:powerpoint" xmlns:com="http://schemas.openxmlformats.org/drawingml/2006/compatibility" xmlns:p15="http://schemas.microsoft.com/office/powerpoint/2012/main" xmlns:ahyp="http://schemas.microsoft.com/office/drawing/2018/hyperlinkcolor">
       <p:transition spd="slow">
         <p:fade/>
       </p:transition>
@@ -18653,7 +18689,7 @@
         <p:fade/>
       </p:transition>
     </mc:Choice>
-    <mc:Fallback xmlns:ahyp="http://schemas.microsoft.com/office/drawing/2018/hyperlinkcolor" xmlns:p15="http://schemas.microsoft.com/office/powerpoint/2012/main" xmlns:com="http://schemas.openxmlformats.org/drawingml/2006/compatibility" xmlns:pvml="urn:schemas-microsoft-com:office:powerpoint" xmlns:v="urn:schemas-microsoft-com:vml" xmlns:o="urn:schemas-microsoft-com:office:office" xmlns:dgm="http://schemas.openxmlformats.org/drawingml/2006/diagram" xmlns:c="http://schemas.openxmlformats.org/drawingml/2006/chart" xmlns:mv="urn:schemas-microsoft-com:mac:vml" xmlns="">
+    <mc:Fallback xmlns="" xmlns:mv="urn:schemas-microsoft-com:mac:vml" xmlns:c="http://schemas.openxmlformats.org/drawingml/2006/chart" xmlns:dgm="http://schemas.openxmlformats.org/drawingml/2006/diagram" xmlns:o="urn:schemas-microsoft-com:office:office" xmlns:v="urn:schemas-microsoft-com:vml" xmlns:pvml="urn:schemas-microsoft-com:office:powerpoint" xmlns:com="http://schemas.openxmlformats.org/drawingml/2006/compatibility" xmlns:p15="http://schemas.microsoft.com/office/powerpoint/2012/main" xmlns:ahyp="http://schemas.microsoft.com/office/drawing/2018/hyperlinkcolor">
       <p:transition spd="slow">
         <p:fade/>
       </p:transition>
@@ -19265,7 +19301,7 @@
         <p:fade/>
       </p:transition>
     </mc:Choice>
-    <mc:Fallback xmlns:ahyp="http://schemas.microsoft.com/office/drawing/2018/hyperlinkcolor" xmlns:p15="http://schemas.microsoft.com/office/powerpoint/2012/main" xmlns:com="http://schemas.openxmlformats.org/drawingml/2006/compatibility" xmlns:pvml="urn:schemas-microsoft-com:office:powerpoint" xmlns:v="urn:schemas-microsoft-com:vml" xmlns:o="urn:schemas-microsoft-com:office:office" xmlns:dgm="http://schemas.openxmlformats.org/drawingml/2006/diagram" xmlns:c="http://schemas.openxmlformats.org/drawingml/2006/chart" xmlns:mv="urn:schemas-microsoft-com:mac:vml" xmlns="">
+    <mc:Fallback xmlns="" xmlns:mv="urn:schemas-microsoft-com:mac:vml" xmlns:c="http://schemas.openxmlformats.org/drawingml/2006/chart" xmlns:dgm="http://schemas.openxmlformats.org/drawingml/2006/diagram" xmlns:o="urn:schemas-microsoft-com:office:office" xmlns:v="urn:schemas-microsoft-com:vml" xmlns:pvml="urn:schemas-microsoft-com:office:powerpoint" xmlns:com="http://schemas.openxmlformats.org/drawingml/2006/compatibility" xmlns:p15="http://schemas.microsoft.com/office/powerpoint/2012/main" xmlns:ahyp="http://schemas.microsoft.com/office/drawing/2018/hyperlinkcolor">
       <p:transition spd="slow">
         <p:fade/>
       </p:transition>
@@ -19700,7 +19736,7 @@
           </a:bodyPr>
           <a:lstStyle/>
           <a:p>
-            <a:pPr marL="0" lvl="1" indent="0" algn="ctr" rtl="0">
+            <a:pPr marL="0" lvl="1" indent="0" algn="just" rtl="0">
               <a:lnSpc>
                 <a:spcPct val="100000"/>
               </a:lnSpc>
@@ -19738,7 +19774,7 @@
                 <a:cs typeface="Calibri"/>
                 <a:sym typeface="Calibri"/>
               </a:rPr>
-              <a:t>EverisStore</a:t>
+              <a:t>everisStore</a:t>
             </a:r>
             <a:r>
               <a:rPr lang="pt-BR" dirty="0">
@@ -19750,7 +19786,7 @@
                 <a:cs typeface="Calibri"/>
                 <a:sym typeface="Calibri"/>
               </a:rPr>
-              <a:t>, referente a um modelo de E-commerce, utilizando Web API Core com .NET 5.x e software de </a:t>
+              <a:t>, referente a um modelo de e-commerce, utilizando API Core com .NET 5 e software de </a:t>
             </a:r>
             <a:r>
               <a:rPr lang="pt-BR" dirty="0" err="1">
@@ -19876,7 +19912,7 @@
         <p:fade/>
       </p:transition>
     </mc:Choice>
-    <mc:Fallback xmlns:ahyp="http://schemas.microsoft.com/office/drawing/2018/hyperlinkcolor" xmlns:p15="http://schemas.microsoft.com/office/powerpoint/2012/main" xmlns:com="http://schemas.openxmlformats.org/drawingml/2006/compatibility" xmlns:pvml="urn:schemas-microsoft-com:office:powerpoint" xmlns:v="urn:schemas-microsoft-com:vml" xmlns:o="urn:schemas-microsoft-com:office:office" xmlns:dgm="http://schemas.openxmlformats.org/drawingml/2006/diagram" xmlns:c="http://schemas.openxmlformats.org/drawingml/2006/chart" xmlns:mv="urn:schemas-microsoft-com:mac:vml" xmlns="">
+    <mc:Fallback xmlns="" xmlns:mv="urn:schemas-microsoft-com:mac:vml" xmlns:c="http://schemas.openxmlformats.org/drawingml/2006/chart" xmlns:dgm="http://schemas.openxmlformats.org/drawingml/2006/diagram" xmlns:o="urn:schemas-microsoft-com:office:office" xmlns:v="urn:schemas-microsoft-com:vml" xmlns:pvml="urn:schemas-microsoft-com:office:powerpoint" xmlns:com="http://schemas.openxmlformats.org/drawingml/2006/compatibility" xmlns:p15="http://schemas.microsoft.com/office/powerpoint/2012/main" xmlns:ahyp="http://schemas.microsoft.com/office/drawing/2018/hyperlinkcolor">
       <p:transition spd="slow">
         <p:fade/>
       </p:transition>
@@ -20224,6 +20260,7 @@
           </a:bodyPr>
           <a:lstStyle/>
           <a:p>
+            <a:pPr algn="just"/>
             <a:r>
               <a:rPr lang="pt-BR" sz="2800" b="0" i="0" dirty="0">
                 <a:solidFill>
@@ -21719,7 +21756,7 @@
               </a:r>
             </a:p>
             <a:p>
-              <a:pPr algn="l"/>
+              <a:pPr algn="just"/>
               <a:r>
                 <a:rPr lang="pt-BR" sz="1200" b="0" i="0" dirty="0">
                   <a:solidFill>
@@ -22012,7 +22049,7 @@
             <a:bodyPr rtlCol="0" anchor="ctr"/>
             <a:lstStyle/>
             <a:p>
-              <a:pPr algn="l"/>
+              <a:pPr algn="just"/>
               <a:r>
                 <a:rPr lang="pt-BR" sz="1200" b="0" i="0" dirty="0">
                   <a:solidFill>
@@ -22345,7 +22382,6 @@
               </a:r>
             </a:p>
             <a:p>
-              <a:pPr algn="l"/>
               <a:r>
                 <a:rPr lang="pt-BR" sz="1200" b="0" i="0" dirty="0">
                   <a:solidFill>
@@ -22752,7 +22788,7 @@
               </a:endParaRPr>
             </a:p>
             <a:p>
-              <a:pPr algn="l"/>
+              <a:pPr algn="just"/>
               <a:r>
                 <a:rPr lang="pt-BR" sz="1000" b="0" i="0" dirty="0">
                   <a:solidFill>

</xml_diff>